<commit_message>
update ppt 1 insert slide
</commit_message>
<xml_diff>
--- a/Git Workflow.pptx
+++ b/Git Workflow.pptx
@@ -8,23 +8,24 @@
     <p:sldId id="263" r:id="rId2"/>
     <p:sldId id="265" r:id="rId3"/>
     <p:sldId id="266" r:id="rId4"/>
-    <p:sldId id="268" r:id="rId5"/>
-    <p:sldId id="269" r:id="rId6"/>
-    <p:sldId id="270" r:id="rId7"/>
-    <p:sldId id="271" r:id="rId8"/>
-    <p:sldId id="272" r:id="rId9"/>
-    <p:sldId id="273" r:id="rId10"/>
-    <p:sldId id="274" r:id="rId11"/>
-    <p:sldId id="275" r:id="rId12"/>
-    <p:sldId id="276" r:id="rId13"/>
-    <p:sldId id="277" r:id="rId14"/>
-    <p:sldId id="278" r:id="rId15"/>
-    <p:sldId id="279" r:id="rId16"/>
-    <p:sldId id="280" r:id="rId17"/>
-    <p:sldId id="281" r:id="rId18"/>
-    <p:sldId id="282" r:id="rId19"/>
-    <p:sldId id="283" r:id="rId20"/>
-    <p:sldId id="284" r:id="rId21"/>
+    <p:sldId id="285" r:id="rId5"/>
+    <p:sldId id="268" r:id="rId6"/>
+    <p:sldId id="269" r:id="rId7"/>
+    <p:sldId id="270" r:id="rId8"/>
+    <p:sldId id="271" r:id="rId9"/>
+    <p:sldId id="272" r:id="rId10"/>
+    <p:sldId id="273" r:id="rId11"/>
+    <p:sldId id="274" r:id="rId12"/>
+    <p:sldId id="275" r:id="rId13"/>
+    <p:sldId id="276" r:id="rId14"/>
+    <p:sldId id="277" r:id="rId15"/>
+    <p:sldId id="278" r:id="rId16"/>
+    <p:sldId id="279" r:id="rId17"/>
+    <p:sldId id="280" r:id="rId18"/>
+    <p:sldId id="281" r:id="rId19"/>
+    <p:sldId id="282" r:id="rId20"/>
+    <p:sldId id="283" r:id="rId21"/>
+    <p:sldId id="284" r:id="rId22"/>
   </p:sldIdLst>
   <p:sldSz cx="9144000" cy="6858000" type="screen4x3"/>
   <p:notesSz cx="6858000" cy="9144000"/>
@@ -4065,6 +4066,160 @@
           <a:lstStyle/>
           <a:p>
             <a:r>
+              <a:rPr lang="en-US" b="0" dirty="0" err="1"/>
+              <a:t>发出Pull</a:t>
+            </a:r>
+            <a:r>
+              <a:rPr lang="en-US" b="0" dirty="0"/>
+              <a:t> Request</a:t>
+            </a:r>
+          </a:p>
+        </p:txBody>
+      </p:sp>
+      <p:sp>
+        <p:nvSpPr>
+          <p:cNvPr id="3" name="TextBox 2"/>
+          <p:cNvSpPr txBox="1"/>
+          <p:nvPr/>
+        </p:nvSpPr>
+        <p:spPr>
+          <a:xfrm>
+            <a:off x="250825" y="1143000"/>
+            <a:ext cx="8207375" cy="369332"/>
+          </a:xfrm>
+          <a:prstGeom prst="rect">
+            <a:avLst/>
+          </a:prstGeom>
+          <a:noFill/>
+        </p:spPr>
+        <p:txBody>
+          <a:bodyPr wrap="square" rtlCol="0">
+            <a:spAutoFit/>
+          </a:bodyPr>
+          <a:lstStyle/>
+          <a:p>
+            <a:r>
+              <a:rPr lang="zh-CN" altLang="en-US" dirty="0"/>
+              <a:t>请求别人进行代码</a:t>
+            </a:r>
+            <a:r>
+              <a:rPr lang="en-US" altLang="zh-CN" dirty="0"/>
+              <a:t>review</a:t>
+            </a:r>
+            <a:r>
+              <a:rPr lang="zh-CN" altLang="en-US" dirty="0"/>
+              <a:t>，确认可以合并到</a:t>
+            </a:r>
+            <a:r>
+              <a:rPr lang="en-US" altLang="zh-CN" dirty="0"/>
+              <a:t>master</a:t>
+            </a:r>
+            <a:r>
+              <a:rPr lang="zh-CN" altLang="en-US" dirty="0"/>
+              <a:t>。</a:t>
+            </a:r>
+            <a:endParaRPr lang="en-US" dirty="0"/>
+          </a:p>
+        </p:txBody>
+      </p:sp>
+    </p:spTree>
+    <p:extLst>
+      <p:ext uri="{BB962C8B-B14F-4D97-AF65-F5344CB8AC3E}">
+        <p14:creationId xmlns:p14="http://schemas.microsoft.com/office/powerpoint/2010/main" val="1052432323"/>
+      </p:ext>
+    </p:extLst>
+  </p:cSld>
+  <p:clrMapOvr>
+    <a:masterClrMapping/>
+  </p:clrMapOvr>
+  <p:timing>
+    <p:tnLst>
+      <p:par>
+        <p:cTn id="1" dur="indefinite" restart="never" nodeType="tmRoot"/>
+      </p:par>
+    </p:tnLst>
+  </p:timing>
+</p:sld>
+</file>
+
+<file path=ppt/slides/slide11.xml><?xml version="1.0" encoding="utf-8"?>
+<p:sld xmlns:a="http://schemas.openxmlformats.org/drawingml/2006/main" xmlns:r="http://schemas.openxmlformats.org/officeDocument/2006/relationships" xmlns:p="http://schemas.openxmlformats.org/presentationml/2006/main">
+  <p:cSld>
+    <p:spTree>
+      <p:nvGrpSpPr>
+        <p:cNvPr id="1" name=""/>
+        <p:cNvGrpSpPr/>
+        <p:nvPr/>
+      </p:nvGrpSpPr>
+      <p:grpSpPr>
+        <a:xfrm>
+          <a:off x="0" y="0"/>
+          <a:ext cx="0" cy="0"/>
+          <a:chOff x="0" y="0"/>
+          <a:chExt cx="0" cy="0"/>
+        </a:xfrm>
+      </p:grpSpPr>
+      <p:sp>
+        <p:nvSpPr>
+          <p:cNvPr id="4" name="Date Placeholder 3"/>
+          <p:cNvSpPr>
+            <a:spLocks noGrp="1"/>
+          </p:cNvSpPr>
+          <p:nvPr>
+            <p:ph type="dt" sz="half" idx="10"/>
+          </p:nvPr>
+        </p:nvSpPr>
+        <p:spPr/>
+        <p:txBody>
+          <a:bodyPr/>
+          <a:lstStyle/>
+          <a:p>
+            <a:r>
+              <a:rPr lang="en-US" altLang="ko-KR" dirty="0" err="1" smtClean="0"/>
+              <a:t>www.ooooo.com</a:t>
+            </a:r>
+            <a:endParaRPr lang="en-US" altLang="ko-KR" dirty="0"/>
+          </a:p>
+        </p:txBody>
+      </p:sp>
+      <p:sp>
+        <p:nvSpPr>
+          <p:cNvPr id="5" name="Footer Placeholder 4"/>
+          <p:cNvSpPr>
+            <a:spLocks noGrp="1"/>
+          </p:cNvSpPr>
+          <p:nvPr>
+            <p:ph type="ftr" sz="quarter" idx="11"/>
+          </p:nvPr>
+        </p:nvSpPr>
+        <p:spPr/>
+        <p:txBody>
+          <a:bodyPr/>
+          <a:lstStyle/>
+          <a:p>
+            <a:r>
+              <a:rPr lang="en-US" altLang="ko-KR"/>
+              <a:t>Company Logo</a:t>
+            </a:r>
+          </a:p>
+        </p:txBody>
+      </p:sp>
+      <p:sp>
+        <p:nvSpPr>
+          <p:cNvPr id="37890" name="Rectangle 2"/>
+          <p:cNvSpPr>
+            <a:spLocks noGrp="1" noChangeArrowheads="1"/>
+          </p:cNvSpPr>
+          <p:nvPr>
+            <p:ph type="title"/>
+          </p:nvPr>
+        </p:nvSpPr>
+        <p:spPr/>
+        <p:txBody>
+          <a:bodyPr/>
+          <a:lstStyle/>
+          <a:p>
+            <a:r>
               <a:rPr lang="en-US" altLang="zh-CN" b="0" dirty="0" smtClean="0"/>
               <a:t>Git</a:t>
             </a:r>
@@ -4184,261 +4339,6 @@
 </p:sld>
 </file>
 
-<file path=ppt/slides/slide11.xml><?xml version="1.0" encoding="utf-8"?>
-<p:sld xmlns:a="http://schemas.openxmlformats.org/drawingml/2006/main" xmlns:r="http://schemas.openxmlformats.org/officeDocument/2006/relationships" xmlns:p="http://schemas.openxmlformats.org/presentationml/2006/main">
-  <p:cSld>
-    <p:spTree>
-      <p:nvGrpSpPr>
-        <p:cNvPr id="1" name=""/>
-        <p:cNvGrpSpPr/>
-        <p:nvPr/>
-      </p:nvGrpSpPr>
-      <p:grpSpPr>
-        <a:xfrm>
-          <a:off x="0" y="0"/>
-          <a:ext cx="0" cy="0"/>
-          <a:chOff x="0" y="0"/>
-          <a:chExt cx="0" cy="0"/>
-        </a:xfrm>
-      </p:grpSpPr>
-      <p:sp>
-        <p:nvSpPr>
-          <p:cNvPr id="4" name="Date Placeholder 3"/>
-          <p:cNvSpPr>
-            <a:spLocks noGrp="1"/>
-          </p:cNvSpPr>
-          <p:nvPr>
-            <p:ph type="dt" sz="half" idx="10"/>
-          </p:nvPr>
-        </p:nvSpPr>
-        <p:spPr/>
-        <p:txBody>
-          <a:bodyPr/>
-          <a:lstStyle/>
-          <a:p>
-            <a:r>
-              <a:rPr lang="en-US" altLang="ko-KR" dirty="0" err="1" smtClean="0"/>
-              <a:t>www.ooooo.com</a:t>
-            </a:r>
-            <a:endParaRPr lang="en-US" altLang="ko-KR" dirty="0"/>
-          </a:p>
-        </p:txBody>
-      </p:sp>
-      <p:sp>
-        <p:nvSpPr>
-          <p:cNvPr id="5" name="Footer Placeholder 4"/>
-          <p:cNvSpPr>
-            <a:spLocks noGrp="1"/>
-          </p:cNvSpPr>
-          <p:nvPr>
-            <p:ph type="ftr" sz="quarter" idx="11"/>
-          </p:nvPr>
-        </p:nvSpPr>
-        <p:spPr/>
-        <p:txBody>
-          <a:bodyPr/>
-          <a:lstStyle/>
-          <a:p>
-            <a:r>
-              <a:rPr lang="en-US" altLang="ko-KR"/>
-              <a:t>Company Logo</a:t>
-            </a:r>
-          </a:p>
-        </p:txBody>
-      </p:sp>
-      <p:sp>
-        <p:nvSpPr>
-          <p:cNvPr id="37890" name="Rectangle 2"/>
-          <p:cNvSpPr>
-            <a:spLocks noGrp="1" noChangeArrowheads="1"/>
-          </p:cNvSpPr>
-          <p:nvPr>
-            <p:ph type="title"/>
-          </p:nvPr>
-        </p:nvSpPr>
-        <p:spPr/>
-        <p:txBody>
-          <a:bodyPr/>
-          <a:lstStyle/>
-          <a:p>
-            <a:r>
-              <a:rPr lang="zh-CN" altLang="en-US" b="0" dirty="0"/>
-              <a:t>新建代码库</a:t>
-            </a:r>
-          </a:p>
-        </p:txBody>
-      </p:sp>
-      <p:sp>
-        <p:nvSpPr>
-          <p:cNvPr id="3" name="TextBox 2"/>
-          <p:cNvSpPr txBox="1"/>
-          <p:nvPr/>
-        </p:nvSpPr>
-        <p:spPr>
-          <a:xfrm>
-            <a:off x="250825" y="1143000"/>
-            <a:ext cx="8207375" cy="2308324"/>
-          </a:xfrm>
-          <a:prstGeom prst="rect">
-            <a:avLst/>
-          </a:prstGeom>
-          <a:noFill/>
-        </p:spPr>
-        <p:txBody>
-          <a:bodyPr wrap="square" rtlCol="0">
-            <a:spAutoFit/>
-          </a:bodyPr>
-          <a:lstStyle/>
-          <a:p>
-            <a:r>
-              <a:rPr lang="en-US" altLang="zh-CN" dirty="0"/>
-              <a:t># </a:t>
-            </a:r>
-            <a:r>
-              <a:rPr lang="zh-CN" altLang="en-US" dirty="0"/>
-              <a:t>在当前目录新建一个</a:t>
-            </a:r>
-            <a:r>
-              <a:rPr lang="en-US" altLang="zh-CN" dirty="0"/>
-              <a:t>Git</a:t>
-            </a:r>
-            <a:r>
-              <a:rPr lang="zh-CN" altLang="en-US" dirty="0"/>
-              <a:t>代码库 </a:t>
-            </a:r>
-            <a:endParaRPr lang="zh-CN" altLang="en-US" dirty="0" smtClean="0"/>
-          </a:p>
-          <a:p>
-            <a:r>
-              <a:rPr lang="en-US" altLang="zh-CN" dirty="0" smtClean="0"/>
-              <a:t>$ </a:t>
-            </a:r>
-            <a:r>
-              <a:rPr lang="en-US" altLang="zh-CN" dirty="0" err="1"/>
-              <a:t>git</a:t>
-            </a:r>
-            <a:r>
-              <a:rPr lang="en-US" altLang="zh-CN" dirty="0"/>
-              <a:t> </a:t>
-            </a:r>
-            <a:r>
-              <a:rPr lang="en-US" altLang="zh-CN" dirty="0" err="1"/>
-              <a:t>init</a:t>
-            </a:r>
-            <a:r>
-              <a:rPr lang="en-US" altLang="zh-CN" dirty="0"/>
-              <a:t> </a:t>
-            </a:r>
-            <a:endParaRPr lang="zh-CN" altLang="en-US" dirty="0" smtClean="0"/>
-          </a:p>
-          <a:p>
-            <a:endParaRPr lang="zh-CN" altLang="en-US" dirty="0" smtClean="0"/>
-          </a:p>
-          <a:p>
-            <a:r>
-              <a:rPr lang="en-US" altLang="zh-CN" dirty="0" smtClean="0"/>
-              <a:t># </a:t>
-            </a:r>
-            <a:r>
-              <a:rPr lang="zh-CN" altLang="en-US" dirty="0"/>
-              <a:t>新建一个目录，将其初始化为</a:t>
-            </a:r>
-            <a:r>
-              <a:rPr lang="en-US" altLang="zh-CN" dirty="0"/>
-              <a:t>Git</a:t>
-            </a:r>
-            <a:r>
-              <a:rPr lang="zh-CN" altLang="en-US" dirty="0"/>
-              <a:t>代码库 </a:t>
-            </a:r>
-            <a:endParaRPr lang="zh-CN" altLang="en-US" dirty="0" smtClean="0"/>
-          </a:p>
-          <a:p>
-            <a:r>
-              <a:rPr lang="en-US" altLang="zh-CN" dirty="0" smtClean="0"/>
-              <a:t>$ </a:t>
-            </a:r>
-            <a:r>
-              <a:rPr lang="en-US" altLang="zh-CN" dirty="0" err="1"/>
-              <a:t>git</a:t>
-            </a:r>
-            <a:r>
-              <a:rPr lang="en-US" altLang="zh-CN" dirty="0"/>
-              <a:t> </a:t>
-            </a:r>
-            <a:r>
-              <a:rPr lang="en-US" altLang="zh-CN" dirty="0" err="1"/>
-              <a:t>init</a:t>
-            </a:r>
-            <a:r>
-              <a:rPr lang="en-US" altLang="zh-CN" dirty="0"/>
-              <a:t> [project-name]</a:t>
-            </a:r>
-            <a:r>
-              <a:rPr lang="zh-CN" altLang="en-US" dirty="0"/>
-              <a:t> </a:t>
-            </a:r>
-            <a:endParaRPr lang="zh-CN" altLang="en-US" dirty="0" smtClean="0"/>
-          </a:p>
-          <a:p>
-            <a:endParaRPr lang="zh-CN" altLang="en-US" dirty="0" smtClean="0"/>
-          </a:p>
-          <a:p>
-            <a:r>
-              <a:rPr lang="en-US" altLang="zh-CN" dirty="0" smtClean="0"/>
-              <a:t># </a:t>
-            </a:r>
-            <a:r>
-              <a:rPr lang="zh-CN" altLang="en-US" dirty="0"/>
-              <a:t>下载一个项目和它的整个代码历史 </a:t>
-            </a:r>
-            <a:endParaRPr lang="zh-CN" altLang="en-US" dirty="0" smtClean="0"/>
-          </a:p>
-          <a:p>
-            <a:r>
-              <a:rPr lang="en-US" altLang="zh-CN" dirty="0" smtClean="0"/>
-              <a:t>$ </a:t>
-            </a:r>
-            <a:r>
-              <a:rPr lang="en-US" altLang="zh-CN" dirty="0" err="1"/>
-              <a:t>git</a:t>
-            </a:r>
-            <a:r>
-              <a:rPr lang="en-US" altLang="zh-CN" dirty="0"/>
-              <a:t> clone [</a:t>
-            </a:r>
-            <a:r>
-              <a:rPr lang="en-US" altLang="zh-CN" dirty="0" err="1"/>
-              <a:t>url</a:t>
-            </a:r>
-            <a:r>
-              <a:rPr lang="en-US" altLang="zh-CN" dirty="0"/>
-              <a:t>]</a:t>
-            </a:r>
-            <a:endParaRPr lang="en-US" dirty="0"/>
-          </a:p>
-        </p:txBody>
-      </p:sp>
-    </p:spTree>
-    <p:extLst>
-      <p:ext uri="{BB962C8B-B14F-4D97-AF65-F5344CB8AC3E}">
-        <p14:creationId xmlns:p14="http://schemas.microsoft.com/office/powerpoint/2010/main" val="32377926"/>
-      </p:ext>
-    </p:extLst>
-  </p:cSld>
-  <p:clrMapOvr>
-    <a:masterClrMapping/>
-  </p:clrMapOvr>
-  <p:timing>
-    <p:tnLst>
-      <p:par>
-        <p:cTn id="1" dur="indefinite" restart="never" nodeType="tmRoot"/>
-      </p:par>
-    </p:tnLst>
-  </p:timing>
-</p:sld>
-</file>
-
 <file path=ppt/slides/slide12.xml><?xml version="1.0" encoding="utf-8"?>
 <p:sld xmlns:a="http://schemas.openxmlformats.org/drawingml/2006/main" xmlns:r="http://schemas.openxmlformats.org/officeDocument/2006/relationships" xmlns:p="http://schemas.openxmlformats.org/presentationml/2006/main">
   <p:cSld>
@@ -4517,8 +4417,8 @@
           <a:lstStyle/>
           <a:p>
             <a:r>
-              <a:rPr lang="ja-JP" altLang="en-US" b="0" dirty="0"/>
-              <a:t>配置</a:t>
+              <a:rPr lang="zh-CN" altLang="en-US" b="0" dirty="0"/>
+              <a:t>新建代码库</a:t>
             </a:r>
           </a:p>
         </p:txBody>
@@ -4532,7 +4432,7 @@
         <p:spPr>
           <a:xfrm>
             <a:off x="250825" y="1143000"/>
-            <a:ext cx="8207375" cy="2585323"/>
+            <a:ext cx="8207375" cy="2308324"/>
           </a:xfrm>
           <a:prstGeom prst="rect">
             <a:avLst/>
@@ -4546,157 +4446,138 @@
           <a:lstStyle/>
           <a:p>
             <a:r>
-              <a:rPr lang="en-US" dirty="0"/>
+              <a:rPr lang="en-US" altLang="zh-CN" dirty="0"/>
               <a:t># </a:t>
             </a:r>
             <a:r>
-              <a:rPr lang="en-US" dirty="0" err="1"/>
-              <a:t>显示当前的Git配置</a:t>
-            </a:r>
-            <a:r>
-              <a:rPr lang="en-US" dirty="0"/>
+              <a:rPr lang="zh-CN" altLang="en-US" dirty="0"/>
+              <a:t>在当前目录新建一个</a:t>
+            </a:r>
+            <a:r>
+              <a:rPr lang="en-US" altLang="zh-CN" dirty="0"/>
+              <a:t>Git</a:t>
+            </a:r>
+            <a:r>
+              <a:rPr lang="zh-CN" altLang="en-US" dirty="0"/>
+              <a:t>代码库 </a:t>
+            </a:r>
+            <a:endParaRPr lang="zh-CN" altLang="en-US" dirty="0" smtClean="0"/>
+          </a:p>
+          <a:p>
+            <a:r>
+              <a:rPr lang="en-US" altLang="zh-CN" dirty="0" smtClean="0"/>
+              <a:t>$ </a:t>
+            </a:r>
+            <a:r>
+              <a:rPr lang="en-US" altLang="zh-CN" dirty="0" err="1"/>
+              <a:t>git</a:t>
+            </a:r>
+            <a:r>
+              <a:rPr lang="en-US" altLang="zh-CN" dirty="0"/>
               <a:t> </a:t>
             </a:r>
+            <a:r>
+              <a:rPr lang="en-US" altLang="zh-CN" dirty="0" err="1"/>
+              <a:t>init</a:t>
+            </a:r>
+            <a:r>
+              <a:rPr lang="en-US" altLang="zh-CN" dirty="0"/>
+              <a:t> </a:t>
+            </a:r>
             <a:endParaRPr lang="zh-CN" altLang="en-US" dirty="0" smtClean="0"/>
           </a:p>
           <a:p>
-            <a:r>
-              <a:rPr lang="en-US" dirty="0" smtClean="0"/>
+            <a:endParaRPr lang="zh-CN" altLang="en-US" dirty="0" smtClean="0"/>
+          </a:p>
+          <a:p>
+            <a:r>
+              <a:rPr lang="en-US" altLang="zh-CN" dirty="0" smtClean="0"/>
+              <a:t># </a:t>
+            </a:r>
+            <a:r>
+              <a:rPr lang="zh-CN" altLang="en-US" dirty="0"/>
+              <a:t>新建一个目录，将其初始化为</a:t>
+            </a:r>
+            <a:r>
+              <a:rPr lang="en-US" altLang="zh-CN" dirty="0"/>
+              <a:t>Git</a:t>
+            </a:r>
+            <a:r>
+              <a:rPr lang="zh-CN" altLang="en-US" dirty="0"/>
+              <a:t>代码库 </a:t>
+            </a:r>
+            <a:endParaRPr lang="zh-CN" altLang="en-US" dirty="0" smtClean="0"/>
+          </a:p>
+          <a:p>
+            <a:r>
+              <a:rPr lang="en-US" altLang="zh-CN" dirty="0" smtClean="0"/>
               <a:t>$ </a:t>
             </a:r>
             <a:r>
-              <a:rPr lang="en-US" dirty="0" err="1"/>
-              <a:t>git</a:t>
-            </a:r>
-            <a:r>
-              <a:rPr lang="en-US" dirty="0"/>
+              <a:rPr lang="en-US" altLang="zh-CN" dirty="0" err="1"/>
+              <a:t>git</a:t>
+            </a:r>
+            <a:r>
+              <a:rPr lang="en-US" altLang="zh-CN" dirty="0"/>
               <a:t> </a:t>
             </a:r>
             <a:r>
-              <a:rPr lang="en-US" dirty="0" err="1"/>
-              <a:t>config</a:t>
-            </a:r>
-            <a:r>
-              <a:rPr lang="en-US" dirty="0"/>
-              <a:t> --list </a:t>
+              <a:rPr lang="en-US" altLang="zh-CN" dirty="0" err="1"/>
+              <a:t>init</a:t>
+            </a:r>
+            <a:r>
+              <a:rPr lang="en-US" altLang="zh-CN" dirty="0"/>
+              <a:t> [project-name]</a:t>
+            </a:r>
+            <a:r>
+              <a:rPr lang="zh-CN" altLang="en-US" dirty="0"/>
+              <a:t> </a:t>
             </a:r>
             <a:endParaRPr lang="zh-CN" altLang="en-US" dirty="0" smtClean="0"/>
           </a:p>
           <a:p>
-            <a:endParaRPr lang="zh-CN" altLang="en-US" dirty="0"/>
-          </a:p>
-          <a:p>
-            <a:r>
-              <a:rPr lang="en-US" dirty="0" smtClean="0"/>
+            <a:endParaRPr lang="zh-CN" altLang="en-US" dirty="0" smtClean="0"/>
+          </a:p>
+          <a:p>
+            <a:r>
+              <a:rPr lang="en-US" altLang="zh-CN" dirty="0" smtClean="0"/>
               <a:t># </a:t>
             </a:r>
             <a:r>
-              <a:rPr lang="en-US" dirty="0" err="1"/>
-              <a:t>编辑Git配置文件</a:t>
-            </a:r>
-            <a:r>
-              <a:rPr lang="en-US" dirty="0"/>
-              <a:t> </a:t>
+              <a:rPr lang="zh-CN" altLang="en-US" dirty="0"/>
+              <a:t>下载一个项目和它的整个代码历史 </a:t>
             </a:r>
             <a:endParaRPr lang="zh-CN" altLang="en-US" dirty="0" smtClean="0"/>
           </a:p>
           <a:p>
             <a:r>
-              <a:rPr lang="en-US" dirty="0" smtClean="0"/>
+              <a:rPr lang="en-US" altLang="zh-CN" dirty="0" smtClean="0"/>
               <a:t>$ </a:t>
             </a:r>
             <a:r>
-              <a:rPr lang="en-US" dirty="0" err="1"/>
-              <a:t>git</a:t>
-            </a:r>
-            <a:r>
-              <a:rPr lang="en-US" dirty="0"/>
-              <a:t> </a:t>
-            </a:r>
-            <a:r>
-              <a:rPr lang="en-US" dirty="0" err="1"/>
-              <a:t>config</a:t>
-            </a:r>
-            <a:r>
-              <a:rPr lang="en-US" dirty="0"/>
-              <a:t> -e [--global] </a:t>
-            </a:r>
-            <a:endParaRPr lang="zh-CN" altLang="en-US" dirty="0" smtClean="0"/>
-          </a:p>
-          <a:p>
-            <a:endParaRPr lang="zh-CN" altLang="en-US" dirty="0" smtClean="0"/>
-          </a:p>
-          <a:p>
-            <a:r>
-              <a:rPr lang="en-US" dirty="0" smtClean="0"/>
-              <a:t># </a:t>
-            </a:r>
-            <a:r>
-              <a:rPr lang="en-US" dirty="0"/>
-              <a:t>设置提交代码时的用户信息 </a:t>
-            </a:r>
-            <a:endParaRPr lang="zh-CN" altLang="en-US" dirty="0" smtClean="0"/>
-          </a:p>
-          <a:p>
-            <a:r>
-              <a:rPr lang="en-US" dirty="0" smtClean="0"/>
-              <a:t>$ </a:t>
-            </a:r>
-            <a:r>
-              <a:rPr lang="en-US" dirty="0" err="1"/>
-              <a:t>git</a:t>
-            </a:r>
-            <a:r>
-              <a:rPr lang="en-US" dirty="0"/>
-              <a:t> </a:t>
-            </a:r>
-            <a:r>
-              <a:rPr lang="en-US" dirty="0" err="1"/>
-              <a:t>config</a:t>
-            </a:r>
-            <a:r>
-              <a:rPr lang="en-US" dirty="0"/>
-              <a:t> [--global] </a:t>
-            </a:r>
-            <a:r>
-              <a:rPr lang="en-US" dirty="0" err="1"/>
-              <a:t>user.name</a:t>
-            </a:r>
-            <a:r>
-              <a:rPr lang="en-US" dirty="0"/>
-              <a:t> "[name]" $ </a:t>
-            </a:r>
-            <a:r>
-              <a:rPr lang="en-US" dirty="0" err="1"/>
-              <a:t>git</a:t>
-            </a:r>
-            <a:r>
-              <a:rPr lang="en-US" dirty="0"/>
-              <a:t> </a:t>
-            </a:r>
-            <a:r>
-              <a:rPr lang="en-US" dirty="0" err="1"/>
-              <a:t>config</a:t>
-            </a:r>
-            <a:r>
-              <a:rPr lang="en-US" dirty="0"/>
-              <a:t> [--global] </a:t>
-            </a:r>
-            <a:r>
-              <a:rPr lang="en-US" dirty="0" err="1"/>
-              <a:t>user.email</a:t>
-            </a:r>
-            <a:r>
-              <a:rPr lang="en-US" dirty="0"/>
-              <a:t> "[email address]"</a:t>
-            </a:r>
+              <a:rPr lang="en-US" altLang="zh-CN" dirty="0" err="1"/>
+              <a:t>git</a:t>
+            </a:r>
+            <a:r>
+              <a:rPr lang="en-US" altLang="zh-CN" dirty="0"/>
+              <a:t> clone [</a:t>
+            </a:r>
+            <a:r>
+              <a:rPr lang="en-US" altLang="zh-CN" dirty="0" err="1"/>
+              <a:t>url</a:t>
+            </a:r>
+            <a:r>
+              <a:rPr lang="en-US" altLang="zh-CN" dirty="0"/>
+              <a:t>]</a:t>
+            </a:r>
+            <a:endParaRPr lang="en-US" dirty="0"/>
           </a:p>
         </p:txBody>
       </p:sp>
     </p:spTree>
     <p:extLst>
       <p:ext uri="{BB962C8B-B14F-4D97-AF65-F5344CB8AC3E}">
-        <p14:creationId xmlns:p14="http://schemas.microsoft.com/office/powerpoint/2010/main" val="1656373695"/>
+        <p14:creationId xmlns:p14="http://schemas.microsoft.com/office/powerpoint/2010/main" val="32377926"/>
       </p:ext>
     </p:extLst>
   </p:cSld>
@@ -4791,18 +4672,9 @@
           <a:lstStyle/>
           <a:p>
             <a:r>
-              <a:rPr lang="mr-IN" b="0" dirty="0" err="1"/>
-              <a:t>增加</a:t>
-            </a:r>
-            <a:r>
-              <a:rPr lang="mr-IN" b="0" dirty="0"/>
-              <a:t>/</a:t>
-            </a:r>
-            <a:r>
-              <a:rPr lang="mr-IN" b="0" dirty="0" err="1"/>
-              <a:t>删除文件</a:t>
-            </a:r>
-            <a:endParaRPr lang="mr-IN" b="0" dirty="0"/>
+              <a:rPr lang="ja-JP" altLang="en-US" b="0" dirty="0"/>
+              <a:t>配置</a:t>
+            </a:r>
           </a:p>
         </p:txBody>
       </p:sp>
@@ -4814,8 +4686,8 @@
         </p:nvSpPr>
         <p:spPr>
           <a:xfrm>
-            <a:off x="246814" y="985087"/>
-            <a:ext cx="8439986" cy="5632311"/>
+            <a:off x="250825" y="1143000"/>
+            <a:ext cx="8207375" cy="2585323"/>
           </a:xfrm>
           <a:prstGeom prst="rect">
             <a:avLst/>
@@ -4830,7 +4702,15 @@
           <a:p>
             <a:r>
               <a:rPr lang="en-US" dirty="0"/>
-              <a:t># 添加指定文件到暂存区 </a:t>
+              <a:t># </a:t>
+            </a:r>
+            <a:r>
+              <a:rPr lang="en-US" dirty="0" err="1"/>
+              <a:t>显示当前的Git配置</a:t>
+            </a:r>
+            <a:r>
+              <a:rPr lang="en-US" dirty="0"/>
+              <a:t> </a:t>
             </a:r>
             <a:endParaRPr lang="zh-CN" altLang="en-US" dirty="0" smtClean="0"/>
           </a:p>
@@ -4845,7 +4725,15 @@
             </a:r>
             <a:r>
               <a:rPr lang="en-US" dirty="0"/>
-              <a:t> add [file1] [file2] ... </a:t>
+              <a:t> </a:t>
+            </a:r>
+            <a:r>
+              <a:rPr lang="en-US" dirty="0" err="1"/>
+              <a:t>config</a:t>
+            </a:r>
+            <a:r>
+              <a:rPr lang="en-US" dirty="0"/>
+              <a:t> --list </a:t>
             </a:r>
             <a:endParaRPr lang="zh-CN" altLang="en-US" dirty="0" smtClean="0"/>
           </a:p>
@@ -4858,8 +4746,12 @@
               <a:t># </a:t>
             </a:r>
             <a:r>
-              <a:rPr lang="en-US" dirty="0"/>
-              <a:t>添加指定目录到暂存区，包括子目录 </a:t>
+              <a:rPr lang="en-US" dirty="0" err="1"/>
+              <a:t>编辑Git配置文件</a:t>
+            </a:r>
+            <a:r>
+              <a:rPr lang="en-US" dirty="0"/>
+              <a:t> </a:t>
             </a:r>
             <a:endParaRPr lang="zh-CN" altLang="en-US" dirty="0" smtClean="0"/>
           </a:p>
@@ -4874,20 +4766,20 @@
             </a:r>
             <a:r>
               <a:rPr lang="en-US" dirty="0"/>
-              <a:t> add [</a:t>
-            </a:r>
-            <a:r>
-              <a:rPr lang="en-US" dirty="0" err="1"/>
-              <a:t>dir</a:t>
-            </a:r>
-            <a:r>
-              <a:rPr lang="en-US" dirty="0"/>
-              <a:t>] </a:t>
+              <a:t> </a:t>
+            </a:r>
+            <a:r>
+              <a:rPr lang="en-US" dirty="0" err="1"/>
+              <a:t>config</a:t>
+            </a:r>
+            <a:r>
+              <a:rPr lang="en-US" dirty="0"/>
+              <a:t> -e [--global] </a:t>
             </a:r>
             <a:endParaRPr lang="zh-CN" altLang="en-US" dirty="0" smtClean="0"/>
           </a:p>
           <a:p>
-            <a:endParaRPr lang="zh-CN" altLang="en-US" dirty="0"/>
+            <a:endParaRPr lang="zh-CN" altLang="en-US" dirty="0" smtClean="0"/>
           </a:p>
           <a:p>
             <a:r>
@@ -4896,7 +4788,7 @@
             </a:r>
             <a:r>
               <a:rPr lang="en-US" dirty="0"/>
-              <a:t>添加当前目录的所有文件到暂存区 </a:t>
+              <a:t>设置提交代码时的用户信息 </a:t>
             </a:r>
             <a:endParaRPr lang="zh-CN" altLang="en-US" dirty="0" smtClean="0"/>
           </a:p>
@@ -4911,94 +4803,23 @@
             </a:r>
             <a:r>
               <a:rPr lang="en-US" dirty="0"/>
-              <a:t> add . </a:t>
-            </a:r>
-            <a:endParaRPr lang="zh-CN" altLang="en-US" dirty="0" smtClean="0"/>
-          </a:p>
-          <a:p>
-            <a:endParaRPr lang="zh-CN" altLang="en-US" dirty="0"/>
-          </a:p>
-          <a:p>
-            <a:r>
-              <a:rPr lang="en-US" dirty="0" smtClean="0"/>
-              <a:t># </a:t>
-            </a:r>
-            <a:r>
-              <a:rPr lang="en-US" dirty="0"/>
-              <a:t>对于同一个文件的多处变化，可以实现分次提交 </a:t>
-            </a:r>
-            <a:endParaRPr lang="zh-CN" altLang="en-US" dirty="0" smtClean="0"/>
-          </a:p>
-          <a:p>
-            <a:r>
-              <a:rPr lang="en-US" dirty="0" smtClean="0"/>
-              <a:t>$ </a:t>
-            </a:r>
-            <a:r>
-              <a:rPr lang="en-US" dirty="0" err="1"/>
-              <a:t>git</a:t>
-            </a:r>
-            <a:r>
-              <a:rPr lang="en-US" dirty="0"/>
-              <a:t> add -p </a:t>
-            </a:r>
-            <a:endParaRPr lang="zh-CN" altLang="en-US" dirty="0" smtClean="0"/>
-          </a:p>
-          <a:p>
-            <a:endParaRPr lang="zh-CN" altLang="en-US" dirty="0"/>
-          </a:p>
-          <a:p>
-            <a:r>
-              <a:rPr lang="en-US" dirty="0" smtClean="0"/>
-              <a:t># </a:t>
-            </a:r>
-            <a:r>
-              <a:rPr lang="en-US" dirty="0"/>
-              <a:t>删除工作区文件，并且将这次删除放入暂存区 </a:t>
-            </a:r>
-            <a:endParaRPr lang="zh-CN" altLang="en-US" dirty="0" smtClean="0"/>
-          </a:p>
-          <a:p>
-            <a:r>
-              <a:rPr lang="en-US" dirty="0" smtClean="0"/>
-              <a:t>$ </a:t>
-            </a:r>
-            <a:r>
-              <a:rPr lang="en-US" dirty="0" err="1"/>
-              <a:t>git</a:t>
-            </a:r>
-            <a:r>
-              <a:rPr lang="en-US" dirty="0"/>
               <a:t> </a:t>
             </a:r>
             <a:r>
               <a:rPr lang="en-US" dirty="0" err="1"/>
-              <a:t>rm</a:t>
-            </a:r>
-            <a:r>
-              <a:rPr lang="en-US" dirty="0"/>
-              <a:t> [file1] [file2] ... </a:t>
-            </a:r>
-            <a:endParaRPr lang="zh-CN" altLang="en-US" dirty="0" smtClean="0"/>
-          </a:p>
-          <a:p>
-            <a:endParaRPr lang="zh-CN" altLang="en-US" dirty="0"/>
-          </a:p>
-          <a:p>
-            <a:r>
-              <a:rPr lang="en-US" dirty="0" smtClean="0"/>
-              <a:t># </a:t>
-            </a:r>
-            <a:r>
-              <a:rPr lang="en-US" dirty="0"/>
-              <a:t>停止追踪指定文件，但该文件会保留在工作区 </a:t>
-            </a:r>
-            <a:endParaRPr lang="zh-CN" altLang="en-US" dirty="0" smtClean="0"/>
-          </a:p>
-          <a:p>
-            <a:r>
-              <a:rPr lang="en-US" dirty="0" smtClean="0"/>
-              <a:t>$ </a:t>
+              <a:t>config</a:t>
+            </a:r>
+            <a:r>
+              <a:rPr lang="en-US" dirty="0"/>
+              <a:t> [--global] </a:t>
+            </a:r>
+            <a:r>
+              <a:rPr lang="en-US" dirty="0" err="1"/>
+              <a:t>user.name</a:t>
+            </a:r>
+            <a:r>
+              <a:rPr lang="en-US" dirty="0"/>
+              <a:t> "[name]" $ </a:t>
             </a:r>
             <a:r>
               <a:rPr lang="en-US" dirty="0" err="1"/>
@@ -5010,40 +4831,19 @@
             </a:r>
             <a:r>
               <a:rPr lang="en-US" dirty="0" err="1"/>
-              <a:t>rm</a:t>
-            </a:r>
-            <a:r>
-              <a:rPr lang="en-US" dirty="0"/>
-              <a:t> --cached [file] </a:t>
-            </a:r>
-            <a:endParaRPr lang="zh-CN" altLang="en-US" dirty="0" smtClean="0"/>
-          </a:p>
-          <a:p>
-            <a:endParaRPr lang="zh-CN" altLang="en-US" dirty="0"/>
-          </a:p>
-          <a:p>
-            <a:r>
-              <a:rPr lang="en-US" dirty="0" smtClean="0"/>
-              <a:t># </a:t>
-            </a:r>
-            <a:r>
-              <a:rPr lang="en-US" dirty="0"/>
-              <a:t>改名文件，并且将这个改名放入暂存区 </a:t>
-            </a:r>
-            <a:endParaRPr lang="zh-CN" altLang="en-US" dirty="0" smtClean="0"/>
-          </a:p>
-          <a:p>
-            <a:r>
-              <a:rPr lang="en-US" dirty="0" smtClean="0"/>
-              <a:t>$ </a:t>
-            </a:r>
-            <a:r>
-              <a:rPr lang="en-US" dirty="0" err="1"/>
-              <a:t>git</a:t>
-            </a:r>
-            <a:r>
-              <a:rPr lang="en-US" dirty="0"/>
-              <a:t> mv [file-original] [file-renamed]</a:t>
+              <a:t>config</a:t>
+            </a:r>
+            <a:r>
+              <a:rPr lang="en-US" dirty="0"/>
+              <a:t> [--global] </a:t>
+            </a:r>
+            <a:r>
+              <a:rPr lang="en-US" dirty="0" err="1"/>
+              <a:t>user.email</a:t>
+            </a:r>
+            <a:r>
+              <a:rPr lang="en-US" dirty="0"/>
+              <a:t> "[email address]"</a:t>
             </a:r>
           </a:p>
         </p:txBody>
@@ -5051,7 +4851,7 @@
     </p:spTree>
     <p:extLst>
       <p:ext uri="{BB962C8B-B14F-4D97-AF65-F5344CB8AC3E}">
-        <p14:creationId xmlns:p14="http://schemas.microsoft.com/office/powerpoint/2010/main" val="39396587"/>
+        <p14:creationId xmlns:p14="http://schemas.microsoft.com/office/powerpoint/2010/main" val="1656373695"/>
       </p:ext>
     </p:extLst>
   </p:cSld>
@@ -5146,9 +4946,18 @@
           <a:lstStyle/>
           <a:p>
             <a:r>
-              <a:rPr lang="zh-CN" altLang="en-US" b="0" dirty="0"/>
-              <a:t>代码提交</a:t>
-            </a:r>
+              <a:rPr lang="mr-IN" b="0" dirty="0" err="1"/>
+              <a:t>增加</a:t>
+            </a:r>
+            <a:r>
+              <a:rPr lang="mr-IN" b="0" dirty="0"/>
+              <a:t>/</a:t>
+            </a:r>
+            <a:r>
+              <a:rPr lang="mr-IN" b="0" dirty="0" err="1"/>
+              <a:t>删除文件</a:t>
+            </a:r>
+            <a:endParaRPr lang="mr-IN" b="0" dirty="0"/>
           </a:p>
         </p:txBody>
       </p:sp>
@@ -5160,8 +4969,8 @@
         </p:nvSpPr>
         <p:spPr>
           <a:xfrm>
-            <a:off x="250825" y="1143000"/>
-            <a:ext cx="8207375" cy="5355312"/>
+            <a:off x="246814" y="985087"/>
+            <a:ext cx="8439986" cy="5632311"/>
           </a:xfrm>
           <a:prstGeom prst="rect">
             <a:avLst/>
@@ -5176,7 +4985,7 @@
           <a:p>
             <a:r>
               <a:rPr lang="en-US" dirty="0"/>
-              <a:t># 提交暂存区到仓库区 </a:t>
+              <a:t># 添加指定文件到暂存区 </a:t>
             </a:r>
             <a:endParaRPr lang="zh-CN" altLang="en-US" dirty="0" smtClean="0"/>
           </a:p>
@@ -5191,7 +5000,7 @@
             </a:r>
             <a:r>
               <a:rPr lang="en-US" dirty="0"/>
-              <a:t> commit -m [message] </a:t>
+              <a:t> add [file1] [file2] ... </a:t>
             </a:r>
             <a:endParaRPr lang="zh-CN" altLang="en-US" dirty="0" smtClean="0"/>
           </a:p>
@@ -5205,7 +5014,7 @@
             </a:r>
             <a:r>
               <a:rPr lang="en-US" dirty="0"/>
-              <a:t>提交暂存区的指定文件到仓库区 </a:t>
+              <a:t>添加指定目录到暂存区，包括子目录 </a:t>
             </a:r>
             <a:endParaRPr lang="zh-CN" altLang="en-US" dirty="0" smtClean="0"/>
           </a:p>
@@ -5220,7 +5029,15 @@
             </a:r>
             <a:r>
               <a:rPr lang="en-US" dirty="0"/>
-              <a:t> commit [file1] [file2] ... -m [message] </a:t>
+              <a:t> add [</a:t>
+            </a:r>
+            <a:r>
+              <a:rPr lang="en-US" dirty="0" err="1"/>
+              <a:t>dir</a:t>
+            </a:r>
+            <a:r>
+              <a:rPr lang="en-US" dirty="0"/>
+              <a:t>] </a:t>
             </a:r>
             <a:endParaRPr lang="zh-CN" altLang="en-US" dirty="0" smtClean="0"/>
           </a:p>
@@ -5233,12 +5050,8 @@
               <a:t># </a:t>
             </a:r>
             <a:r>
-              <a:rPr lang="en-US" dirty="0" err="1"/>
-              <a:t>提交工作区自上次commit之后的变化，直接到仓库区</a:t>
-            </a:r>
-            <a:r>
-              <a:rPr lang="en-US" dirty="0"/>
-              <a:t> </a:t>
+              <a:rPr lang="en-US" dirty="0"/>
+              <a:t>添加当前目录的所有文件到暂存区 </a:t>
             </a:r>
             <a:endParaRPr lang="zh-CN" altLang="en-US" dirty="0" smtClean="0"/>
           </a:p>
@@ -5253,7 +5066,7 @@
             </a:r>
             <a:r>
               <a:rPr lang="en-US" dirty="0"/>
-              <a:t> commit -a </a:t>
+              <a:t> add . </a:t>
             </a:r>
             <a:endParaRPr lang="zh-CN" altLang="en-US" dirty="0" smtClean="0"/>
           </a:p>
@@ -5266,12 +5079,8 @@
               <a:t># </a:t>
             </a:r>
             <a:r>
-              <a:rPr lang="en-US" dirty="0" err="1"/>
-              <a:t>提交时显示所有diff信息</a:t>
-            </a:r>
-            <a:r>
-              <a:rPr lang="en-US" dirty="0"/>
-              <a:t> </a:t>
+              <a:rPr lang="en-US" dirty="0"/>
+              <a:t>对于同一个文件的多处变化，可以实现分次提交 </a:t>
             </a:r>
             <a:endParaRPr lang="zh-CN" altLang="en-US" dirty="0" smtClean="0"/>
           </a:p>
@@ -5286,7 +5095,7 @@
             </a:r>
             <a:r>
               <a:rPr lang="en-US" dirty="0"/>
-              <a:t> commit -v </a:t>
+              <a:t> add -p </a:t>
             </a:r>
             <a:endParaRPr lang="zh-CN" altLang="en-US" dirty="0" smtClean="0"/>
           </a:p>
@@ -5299,12 +5108,31 @@
               <a:t># </a:t>
             </a:r>
             <a:r>
-              <a:rPr lang="en-US" dirty="0" err="1"/>
-              <a:t>使用一次新的commit，替代上一次提交</a:t>
+              <a:rPr lang="en-US" dirty="0"/>
+              <a:t>删除工作区文件，并且将这次删除放入暂存区 </a:t>
+            </a:r>
+            <a:endParaRPr lang="zh-CN" altLang="en-US" dirty="0" smtClean="0"/>
+          </a:p>
+          <a:p>
+            <a:r>
+              <a:rPr lang="en-US" dirty="0" smtClean="0"/>
+              <a:t>$ </a:t>
+            </a:r>
+            <a:r>
+              <a:rPr lang="en-US" dirty="0" err="1"/>
+              <a:t>git</a:t>
             </a:r>
             <a:r>
               <a:rPr lang="en-US" dirty="0"/>
               <a:t> </a:t>
+            </a:r>
+            <a:r>
+              <a:rPr lang="en-US" dirty="0" err="1"/>
+              <a:t>rm</a:t>
+            </a:r>
+            <a:r>
+              <a:rPr lang="en-US" dirty="0"/>
+              <a:t> [file1] [file2] ... </a:t>
             </a:r>
             <a:endParaRPr lang="zh-CN" altLang="en-US" dirty="0" smtClean="0"/>
           </a:p>
@@ -5317,12 +5145,8 @@
               <a:t># </a:t>
             </a:r>
             <a:r>
-              <a:rPr lang="en-US" dirty="0" err="1"/>
-              <a:t>如果代码没有任何新变化，则用来改写上一次commit的提交信息</a:t>
-            </a:r>
-            <a:r>
-              <a:rPr lang="en-US" dirty="0"/>
-              <a:t> </a:t>
+              <a:rPr lang="en-US" dirty="0"/>
+              <a:t>停止追踪指定文件，但该文件会保留在工作区 </a:t>
             </a:r>
             <a:endParaRPr lang="zh-CN" altLang="en-US" dirty="0" smtClean="0"/>
           </a:p>
@@ -5337,7 +5161,15 @@
             </a:r>
             <a:r>
               <a:rPr lang="en-US" dirty="0"/>
-              <a:t> commit --amend -m [message] </a:t>
+              <a:t> </a:t>
+            </a:r>
+            <a:r>
+              <a:rPr lang="en-US" dirty="0" err="1"/>
+              <a:t>rm</a:t>
+            </a:r>
+            <a:r>
+              <a:rPr lang="en-US" dirty="0"/>
+              <a:t> --cached [file] </a:t>
             </a:r>
             <a:endParaRPr lang="zh-CN" altLang="en-US" dirty="0" smtClean="0"/>
           </a:p>
@@ -5350,12 +5182,8 @@
               <a:t># </a:t>
             </a:r>
             <a:r>
-              <a:rPr lang="en-US" dirty="0" err="1"/>
-              <a:t>重做上一次commit，并包括指定文件的新变化</a:t>
-            </a:r>
-            <a:r>
-              <a:rPr lang="en-US" dirty="0"/>
-              <a:t> </a:t>
+              <a:rPr lang="en-US" dirty="0"/>
+              <a:t>改名文件，并且将这个改名放入暂存区 </a:t>
             </a:r>
             <a:endParaRPr lang="zh-CN" altLang="en-US" dirty="0" smtClean="0"/>
           </a:p>
@@ -5370,7 +5198,7 @@
             </a:r>
             <a:r>
               <a:rPr lang="en-US" dirty="0"/>
-              <a:t> commit --amend [file1] [file2] ...</a:t>
+              <a:t> mv [file-original] [file-renamed]</a:t>
             </a:r>
           </a:p>
         </p:txBody>
@@ -5378,7 +5206,7 @@
     </p:spTree>
     <p:extLst>
       <p:ext uri="{BB962C8B-B14F-4D97-AF65-F5344CB8AC3E}">
-        <p14:creationId xmlns:p14="http://schemas.microsoft.com/office/powerpoint/2010/main" val="609267122"/>
+        <p14:creationId xmlns:p14="http://schemas.microsoft.com/office/powerpoint/2010/main" val="39396587"/>
       </p:ext>
     </p:extLst>
   </p:cSld>
@@ -5473,8 +5301,8 @@
           <a:lstStyle/>
           <a:p>
             <a:r>
-              <a:rPr lang="en-US" b="0" dirty="0"/>
-              <a:t>分支</a:t>
+              <a:rPr lang="zh-CN" altLang="en-US" b="0" dirty="0"/>
+              <a:t>代码提交</a:t>
             </a:r>
           </a:p>
         </p:txBody>
@@ -5488,7 +5316,7 @@
         <p:spPr>
           <a:xfrm>
             <a:off x="250825" y="1143000"/>
-            <a:ext cx="8207375" cy="3693319"/>
+            <a:ext cx="8207375" cy="5355312"/>
           </a:xfrm>
           <a:prstGeom prst="rect">
             <a:avLst/>
@@ -5503,7 +5331,7 @@
           <a:p>
             <a:r>
               <a:rPr lang="en-US" dirty="0"/>
-              <a:t># 列出所有本地分支 </a:t>
+              <a:t># 提交暂存区到仓库区 </a:t>
             </a:r>
             <a:endParaRPr lang="zh-CN" altLang="en-US" dirty="0" smtClean="0"/>
           </a:p>
@@ -5518,9 +5346,12 @@
             </a:r>
             <a:r>
               <a:rPr lang="en-US" dirty="0"/>
-              <a:t> branch </a:t>
+              <a:t> commit -m [message] </a:t>
             </a:r>
             <a:endParaRPr lang="zh-CN" altLang="en-US" dirty="0" smtClean="0"/>
+          </a:p>
+          <a:p>
+            <a:endParaRPr lang="zh-CN" altLang="en-US" dirty="0"/>
           </a:p>
           <a:p>
             <a:r>
@@ -5529,7 +5360,7 @@
             </a:r>
             <a:r>
               <a:rPr lang="en-US" dirty="0"/>
-              <a:t>列出所有远程分支 </a:t>
+              <a:t>提交暂存区的指定文件到仓库区 </a:t>
             </a:r>
             <a:endParaRPr lang="zh-CN" altLang="en-US" dirty="0" smtClean="0"/>
           </a:p>
@@ -5544,135 +5375,157 @@
             </a:r>
             <a:r>
               <a:rPr lang="en-US" dirty="0"/>
-              <a:t> branch -r # 列出所有本地分支和远程分支 $ </a:t>
-            </a:r>
-            <a:r>
-              <a:rPr lang="en-US" dirty="0" err="1"/>
-              <a:t>git</a:t>
-            </a:r>
-            <a:r>
-              <a:rPr lang="en-US" dirty="0"/>
-              <a:t> branch -a # 新建一个分支，但依然停留在当前分支 $ </a:t>
-            </a:r>
-            <a:r>
-              <a:rPr lang="en-US" dirty="0" err="1"/>
-              <a:t>git</a:t>
-            </a:r>
-            <a:r>
-              <a:rPr lang="en-US" dirty="0"/>
-              <a:t> branch [branch-name] # 新建一个分支，并切换到该分支 $ </a:t>
-            </a:r>
-            <a:r>
-              <a:rPr lang="en-US" dirty="0" err="1"/>
-              <a:t>git</a:t>
-            </a:r>
-            <a:r>
-              <a:rPr lang="en-US" dirty="0"/>
-              <a:t> checkout -b [branch] # </a:t>
-            </a:r>
-            <a:r>
-              <a:rPr lang="en-US" dirty="0" err="1"/>
-              <a:t>新建一个分支，指向指定commit</a:t>
-            </a:r>
-            <a:r>
-              <a:rPr lang="en-US" dirty="0"/>
-              <a:t> $ </a:t>
-            </a:r>
-            <a:r>
-              <a:rPr lang="en-US" dirty="0" err="1"/>
-              <a:t>git</a:t>
-            </a:r>
-            <a:r>
-              <a:rPr lang="en-US" dirty="0"/>
-              <a:t> branch [branch] [commit] # 新建一个分支，与指定的远程分支建立追踪关系 $ </a:t>
-            </a:r>
-            <a:r>
-              <a:rPr lang="en-US" dirty="0" err="1"/>
-              <a:t>git</a:t>
-            </a:r>
-            <a:r>
-              <a:rPr lang="en-US" dirty="0"/>
-              <a:t> branch --track [branch] [remote-branch] # 切换到指定分支，并更新工作区 $ </a:t>
-            </a:r>
-            <a:r>
-              <a:rPr lang="en-US" dirty="0" err="1"/>
-              <a:t>git</a:t>
-            </a:r>
-            <a:r>
-              <a:rPr lang="en-US" dirty="0"/>
-              <a:t> checkout [branch-name] # 切换到上一个分支 $ </a:t>
-            </a:r>
-            <a:r>
-              <a:rPr lang="en-US" dirty="0" err="1"/>
-              <a:t>git</a:t>
-            </a:r>
-            <a:r>
-              <a:rPr lang="en-US" dirty="0"/>
-              <a:t> checkout - # 建立追踪关系，在现有分支与指定的远程分支之间 $ </a:t>
-            </a:r>
-            <a:r>
-              <a:rPr lang="en-US" dirty="0" err="1"/>
-              <a:t>git</a:t>
-            </a:r>
-            <a:r>
-              <a:rPr lang="en-US" dirty="0"/>
-              <a:t> branch --set-upstream [branch] [remote-branch] # 合并指定分支到当前分支 $ </a:t>
-            </a:r>
-            <a:r>
-              <a:rPr lang="en-US" dirty="0" err="1"/>
-              <a:t>git</a:t>
-            </a:r>
-            <a:r>
-              <a:rPr lang="en-US" dirty="0"/>
-              <a:t> merge [branch] # </a:t>
-            </a:r>
-            <a:r>
-              <a:rPr lang="en-US" dirty="0" err="1"/>
-              <a:t>选择一个commit，合并进当前分支</a:t>
-            </a:r>
-            <a:r>
-              <a:rPr lang="en-US" dirty="0"/>
-              <a:t> $ </a:t>
-            </a:r>
-            <a:r>
-              <a:rPr lang="en-US" dirty="0" err="1"/>
-              <a:t>git</a:t>
-            </a:r>
-            <a:r>
-              <a:rPr lang="en-US" dirty="0"/>
-              <a:t> cherry-pick [commit] # 删除分支 $ </a:t>
-            </a:r>
-            <a:r>
-              <a:rPr lang="en-US" dirty="0" err="1"/>
-              <a:t>git</a:t>
-            </a:r>
-            <a:r>
-              <a:rPr lang="en-US" dirty="0"/>
-              <a:t> branch -d [branch-name] # 删除远程分支 $ </a:t>
-            </a:r>
-            <a:r>
-              <a:rPr lang="en-US" dirty="0" err="1"/>
-              <a:t>git</a:t>
-            </a:r>
-            <a:r>
-              <a:rPr lang="en-US" dirty="0"/>
-              <a:t> push origin --delete [branch-name] $ </a:t>
-            </a:r>
-            <a:r>
-              <a:rPr lang="en-US" dirty="0" err="1"/>
-              <a:t>git</a:t>
-            </a:r>
-            <a:r>
-              <a:rPr lang="en-US" dirty="0"/>
-              <a:t> branch -</a:t>
-            </a:r>
-            <a:r>
-              <a:rPr lang="en-US" dirty="0" err="1"/>
-              <a:t>dr</a:t>
-            </a:r>
-            <a:r>
-              <a:rPr lang="en-US" dirty="0"/>
-              <a:t> [remote/branch]</a:t>
+              <a:t> commit [file1] [file2] ... -m [message] </a:t>
+            </a:r>
+            <a:endParaRPr lang="zh-CN" altLang="en-US" dirty="0" smtClean="0"/>
+          </a:p>
+          <a:p>
+            <a:endParaRPr lang="zh-CN" altLang="en-US" dirty="0"/>
+          </a:p>
+          <a:p>
+            <a:r>
+              <a:rPr lang="en-US" dirty="0" smtClean="0"/>
+              <a:t># </a:t>
+            </a:r>
+            <a:r>
+              <a:rPr lang="en-US" dirty="0" err="1"/>
+              <a:t>提交工作区自上次commit之后的变化，直接到仓库区</a:t>
+            </a:r>
+            <a:r>
+              <a:rPr lang="en-US" dirty="0"/>
+              <a:t> </a:t>
+            </a:r>
+            <a:endParaRPr lang="zh-CN" altLang="en-US" dirty="0" smtClean="0"/>
+          </a:p>
+          <a:p>
+            <a:r>
+              <a:rPr lang="en-US" dirty="0" smtClean="0"/>
+              <a:t>$ </a:t>
+            </a:r>
+            <a:r>
+              <a:rPr lang="en-US" dirty="0" err="1"/>
+              <a:t>git</a:t>
+            </a:r>
+            <a:r>
+              <a:rPr lang="en-US" dirty="0"/>
+              <a:t> commit -a </a:t>
+            </a:r>
+            <a:endParaRPr lang="zh-CN" altLang="en-US" dirty="0" smtClean="0"/>
+          </a:p>
+          <a:p>
+            <a:endParaRPr lang="zh-CN" altLang="en-US" dirty="0"/>
+          </a:p>
+          <a:p>
+            <a:r>
+              <a:rPr lang="en-US" dirty="0" smtClean="0"/>
+              <a:t># </a:t>
+            </a:r>
+            <a:r>
+              <a:rPr lang="en-US" dirty="0" err="1"/>
+              <a:t>提交时显示所有diff信息</a:t>
+            </a:r>
+            <a:r>
+              <a:rPr lang="en-US" dirty="0"/>
+              <a:t> </a:t>
+            </a:r>
+            <a:endParaRPr lang="zh-CN" altLang="en-US" dirty="0" smtClean="0"/>
+          </a:p>
+          <a:p>
+            <a:r>
+              <a:rPr lang="en-US" dirty="0" smtClean="0"/>
+              <a:t>$ </a:t>
+            </a:r>
+            <a:r>
+              <a:rPr lang="en-US" dirty="0" err="1"/>
+              <a:t>git</a:t>
+            </a:r>
+            <a:r>
+              <a:rPr lang="en-US" dirty="0"/>
+              <a:t> commit -v </a:t>
+            </a:r>
+            <a:endParaRPr lang="zh-CN" altLang="en-US" dirty="0" smtClean="0"/>
+          </a:p>
+          <a:p>
+            <a:endParaRPr lang="zh-CN" altLang="en-US" dirty="0"/>
+          </a:p>
+          <a:p>
+            <a:r>
+              <a:rPr lang="en-US" dirty="0" smtClean="0"/>
+              <a:t># </a:t>
+            </a:r>
+            <a:r>
+              <a:rPr lang="en-US" dirty="0" err="1"/>
+              <a:t>使用一次新的commit，替代上一次提交</a:t>
+            </a:r>
+            <a:r>
+              <a:rPr lang="en-US" dirty="0"/>
+              <a:t> </a:t>
+            </a:r>
+            <a:endParaRPr lang="zh-CN" altLang="en-US" dirty="0" smtClean="0"/>
+          </a:p>
+          <a:p>
+            <a:endParaRPr lang="zh-CN" altLang="en-US" dirty="0"/>
+          </a:p>
+          <a:p>
+            <a:r>
+              <a:rPr lang="en-US" dirty="0" smtClean="0"/>
+              <a:t># </a:t>
+            </a:r>
+            <a:r>
+              <a:rPr lang="en-US" dirty="0" err="1"/>
+              <a:t>如果代码没有任何新变化，则用来改写上一次commit的提交信息</a:t>
+            </a:r>
+            <a:r>
+              <a:rPr lang="en-US" dirty="0"/>
+              <a:t> </a:t>
+            </a:r>
+            <a:endParaRPr lang="zh-CN" altLang="en-US" dirty="0" smtClean="0"/>
+          </a:p>
+          <a:p>
+            <a:r>
+              <a:rPr lang="en-US" dirty="0" smtClean="0"/>
+              <a:t>$ </a:t>
+            </a:r>
+            <a:r>
+              <a:rPr lang="en-US" dirty="0" err="1"/>
+              <a:t>git</a:t>
+            </a:r>
+            <a:r>
+              <a:rPr lang="en-US" dirty="0"/>
+              <a:t> commit --amend -m [message] </a:t>
+            </a:r>
+            <a:endParaRPr lang="zh-CN" altLang="en-US" dirty="0" smtClean="0"/>
+          </a:p>
+          <a:p>
+            <a:endParaRPr lang="zh-CN" altLang="en-US" dirty="0"/>
+          </a:p>
+          <a:p>
+            <a:r>
+              <a:rPr lang="en-US" dirty="0" smtClean="0"/>
+              <a:t># </a:t>
+            </a:r>
+            <a:r>
+              <a:rPr lang="en-US" dirty="0" err="1"/>
+              <a:t>重做上一次commit，并包括指定文件的新变化</a:t>
+            </a:r>
+            <a:r>
+              <a:rPr lang="en-US" dirty="0"/>
+              <a:t> </a:t>
+            </a:r>
+            <a:endParaRPr lang="zh-CN" altLang="en-US" dirty="0" smtClean="0"/>
+          </a:p>
+          <a:p>
+            <a:r>
+              <a:rPr lang="en-US" dirty="0" smtClean="0"/>
+              <a:t>$ </a:t>
+            </a:r>
+            <a:r>
+              <a:rPr lang="en-US" dirty="0" err="1"/>
+              <a:t>git</a:t>
+            </a:r>
+            <a:r>
+              <a:rPr lang="en-US" dirty="0"/>
+              <a:t> commit --amend [file1] [file2] ...</a:t>
             </a:r>
           </a:p>
         </p:txBody>
@@ -5680,7 +5533,7 @@
     </p:spTree>
     <p:extLst>
       <p:ext uri="{BB962C8B-B14F-4D97-AF65-F5344CB8AC3E}">
-        <p14:creationId xmlns:p14="http://schemas.microsoft.com/office/powerpoint/2010/main" val="137075088"/>
+        <p14:creationId xmlns:p14="http://schemas.microsoft.com/office/powerpoint/2010/main" val="609267122"/>
       </p:ext>
     </p:extLst>
   </p:cSld>
@@ -5775,8 +5628,8 @@
           <a:lstStyle/>
           <a:p>
             <a:r>
-              <a:rPr lang="zh-CN" altLang="en-US" b="0" dirty="0"/>
-              <a:t>标签</a:t>
+              <a:rPr lang="en-US" b="0" dirty="0"/>
+              <a:t>分支</a:t>
             </a:r>
           </a:p>
         </p:txBody>
@@ -5790,7 +5643,7 @@
         <p:spPr>
           <a:xfrm>
             <a:off x="250825" y="1143000"/>
-            <a:ext cx="8207375" cy="1477328"/>
+            <a:ext cx="8207375" cy="3693319"/>
           </a:xfrm>
           <a:prstGeom prst="rect">
             <a:avLst/>
@@ -5805,11 +5658,76 @@
           <a:p>
             <a:r>
               <a:rPr lang="en-US" dirty="0"/>
+              <a:t># 列出所有本地分支 </a:t>
+            </a:r>
+            <a:endParaRPr lang="zh-CN" altLang="en-US" dirty="0" smtClean="0"/>
+          </a:p>
+          <a:p>
+            <a:r>
+              <a:rPr lang="en-US" dirty="0" smtClean="0"/>
+              <a:t>$ </a:t>
+            </a:r>
+            <a:r>
+              <a:rPr lang="en-US" dirty="0" err="1"/>
+              <a:t>git</a:t>
+            </a:r>
+            <a:r>
+              <a:rPr lang="en-US" dirty="0"/>
+              <a:t> branch </a:t>
+            </a:r>
+            <a:endParaRPr lang="zh-CN" altLang="en-US" dirty="0" smtClean="0"/>
+          </a:p>
+          <a:p>
+            <a:r>
+              <a:rPr lang="en-US" dirty="0" smtClean="0"/>
               <a:t># </a:t>
             </a:r>
             <a:r>
-              <a:rPr lang="en-US" dirty="0" err="1"/>
-              <a:t>列出所有tag</a:t>
+              <a:rPr lang="en-US" dirty="0"/>
+              <a:t>列出所有远程分支 </a:t>
+            </a:r>
+            <a:endParaRPr lang="zh-CN" altLang="en-US" dirty="0" smtClean="0"/>
+          </a:p>
+          <a:p>
+            <a:r>
+              <a:rPr lang="en-US" dirty="0" smtClean="0"/>
+              <a:t>$ </a:t>
+            </a:r>
+            <a:r>
+              <a:rPr lang="en-US" dirty="0" err="1"/>
+              <a:t>git</a:t>
+            </a:r>
+            <a:r>
+              <a:rPr lang="en-US" dirty="0"/>
+              <a:t> branch -r # 列出所有本地分支和远程分支 $ </a:t>
+            </a:r>
+            <a:r>
+              <a:rPr lang="en-US" dirty="0" err="1"/>
+              <a:t>git</a:t>
+            </a:r>
+            <a:r>
+              <a:rPr lang="en-US" dirty="0"/>
+              <a:t> branch -a # 新建一个分支，但依然停留在当前分支 $ </a:t>
+            </a:r>
+            <a:r>
+              <a:rPr lang="en-US" dirty="0" err="1"/>
+              <a:t>git</a:t>
+            </a:r>
+            <a:r>
+              <a:rPr lang="en-US" dirty="0"/>
+              <a:t> branch [branch-name] # 新建一个分支，并切换到该分支 $ </a:t>
+            </a:r>
+            <a:r>
+              <a:rPr lang="en-US" dirty="0" err="1"/>
+              <a:t>git</a:t>
+            </a:r>
+            <a:r>
+              <a:rPr lang="en-US" dirty="0"/>
+              <a:t> checkout -b [branch] # </a:t>
+            </a:r>
+            <a:r>
+              <a:rPr lang="en-US" dirty="0" err="1"/>
+              <a:t>新建一个分支，指向指定commit</a:t>
             </a:r>
             <a:r>
               <a:rPr lang="en-US" dirty="0"/>
@@ -5821,11 +5739,51 @@
             </a:r>
             <a:r>
               <a:rPr lang="en-US" dirty="0"/>
-              <a:t> tag # </a:t>
-            </a:r>
-            <a:r>
-              <a:rPr lang="en-US" dirty="0" err="1"/>
-              <a:t>新建一个tag在当前commit</a:t>
+              <a:t> branch [branch] [commit] # 新建一个分支，与指定的远程分支建立追踪关系 $ </a:t>
+            </a:r>
+            <a:r>
+              <a:rPr lang="en-US" dirty="0" err="1"/>
+              <a:t>git</a:t>
+            </a:r>
+            <a:r>
+              <a:rPr lang="en-US" dirty="0"/>
+              <a:t> branch --track [branch] [remote-branch] # 切换到指定分支，并更新工作区 $ </a:t>
+            </a:r>
+            <a:r>
+              <a:rPr lang="en-US" dirty="0" err="1"/>
+              <a:t>git</a:t>
+            </a:r>
+            <a:r>
+              <a:rPr lang="en-US" dirty="0"/>
+              <a:t> checkout [branch-name] # 切换到上一个分支 $ </a:t>
+            </a:r>
+            <a:r>
+              <a:rPr lang="en-US" dirty="0" err="1"/>
+              <a:t>git</a:t>
+            </a:r>
+            <a:r>
+              <a:rPr lang="en-US" dirty="0"/>
+              <a:t> checkout - # 建立追踪关系，在现有分支与指定的远程分支之间 $ </a:t>
+            </a:r>
+            <a:r>
+              <a:rPr lang="en-US" dirty="0" err="1"/>
+              <a:t>git</a:t>
+            </a:r>
+            <a:r>
+              <a:rPr lang="en-US" dirty="0"/>
+              <a:t> branch --set-upstream [branch] [remote-branch] # 合并指定分支到当前分支 $ </a:t>
+            </a:r>
+            <a:r>
+              <a:rPr lang="en-US" dirty="0" err="1"/>
+              <a:t>git</a:t>
+            </a:r>
+            <a:r>
+              <a:rPr lang="en-US" dirty="0"/>
+              <a:t> merge [branch] # </a:t>
+            </a:r>
+            <a:r>
+              <a:rPr lang="en-US" dirty="0" err="1"/>
+              <a:t>选择一个commit，合并进当前分支</a:t>
             </a:r>
             <a:r>
               <a:rPr lang="en-US" dirty="0"/>
@@ -5837,127 +5795,39 @@
             </a:r>
             <a:r>
               <a:rPr lang="en-US" dirty="0"/>
-              <a:t> tag [tag] # </a:t>
-            </a:r>
-            <a:r>
-              <a:rPr lang="en-US" dirty="0" err="1"/>
-              <a:t>新建一个tag在指定commit</a:t>
-            </a:r>
-            <a:r>
-              <a:rPr lang="en-US" dirty="0"/>
-              <a:t> $ </a:t>
-            </a:r>
-            <a:r>
-              <a:rPr lang="en-US" dirty="0" err="1"/>
-              <a:t>git</a:t>
-            </a:r>
-            <a:r>
-              <a:rPr lang="en-US" dirty="0"/>
-              <a:t> tag [tag] [commit] # </a:t>
-            </a:r>
-            <a:r>
-              <a:rPr lang="en-US" dirty="0" err="1"/>
-              <a:t>删除本地tag</a:t>
-            </a:r>
-            <a:r>
-              <a:rPr lang="en-US" dirty="0"/>
-              <a:t> $ </a:t>
-            </a:r>
-            <a:r>
-              <a:rPr lang="en-US" dirty="0" err="1"/>
-              <a:t>git</a:t>
-            </a:r>
-            <a:r>
-              <a:rPr lang="en-US" dirty="0"/>
-              <a:t> tag -d [tag] # </a:t>
-            </a:r>
-            <a:r>
-              <a:rPr lang="en-US" dirty="0" err="1"/>
-              <a:t>删除远程tag</a:t>
-            </a:r>
-            <a:r>
-              <a:rPr lang="en-US" dirty="0"/>
-              <a:t> $ </a:t>
-            </a:r>
-            <a:r>
-              <a:rPr lang="en-US" dirty="0" err="1"/>
-              <a:t>git</a:t>
-            </a:r>
-            <a:r>
-              <a:rPr lang="en-US" dirty="0"/>
-              <a:t> push origin :refs/tags/[</a:t>
-            </a:r>
-            <a:r>
-              <a:rPr lang="en-US" dirty="0" err="1"/>
-              <a:t>tagName</a:t>
-            </a:r>
-            <a:r>
-              <a:rPr lang="en-US" dirty="0"/>
-              <a:t>] # </a:t>
-            </a:r>
-            <a:r>
-              <a:rPr lang="en-US" dirty="0" err="1"/>
-              <a:t>查看tag信息</a:t>
-            </a:r>
-            <a:r>
-              <a:rPr lang="en-US" dirty="0"/>
-              <a:t> $ </a:t>
-            </a:r>
-            <a:r>
-              <a:rPr lang="en-US" dirty="0" err="1"/>
-              <a:t>git</a:t>
-            </a:r>
-            <a:r>
-              <a:rPr lang="en-US" dirty="0"/>
-              <a:t> show [tag] # </a:t>
-            </a:r>
-            <a:r>
-              <a:rPr lang="en-US" dirty="0" err="1"/>
-              <a:t>提交指定tag</a:t>
-            </a:r>
-            <a:r>
-              <a:rPr lang="en-US" dirty="0"/>
-              <a:t> $ </a:t>
-            </a:r>
-            <a:r>
-              <a:rPr lang="en-US" dirty="0" err="1"/>
-              <a:t>git</a:t>
-            </a:r>
-            <a:r>
-              <a:rPr lang="en-US" dirty="0"/>
-              <a:t> push [remote] [tag] # </a:t>
-            </a:r>
-            <a:r>
-              <a:rPr lang="en-US" dirty="0" err="1"/>
-              <a:t>提交所有tag</a:t>
-            </a:r>
-            <a:r>
-              <a:rPr lang="en-US" dirty="0"/>
-              <a:t> $ </a:t>
-            </a:r>
-            <a:r>
-              <a:rPr lang="en-US" dirty="0" err="1"/>
-              <a:t>git</a:t>
-            </a:r>
-            <a:r>
-              <a:rPr lang="en-US" dirty="0"/>
-              <a:t> push [remote] --tags # </a:t>
-            </a:r>
-            <a:r>
-              <a:rPr lang="en-US" dirty="0" err="1"/>
-              <a:t>新建一个分支，指向某个tag</a:t>
-            </a:r>
-            <a:r>
-              <a:rPr lang="en-US" dirty="0"/>
-              <a:t> $ </a:t>
-            </a:r>
-            <a:r>
-              <a:rPr lang="en-US" dirty="0" err="1"/>
-              <a:t>git</a:t>
-            </a:r>
-            <a:r>
-              <a:rPr lang="en-US" dirty="0"/>
-              <a:t> checkout -b [branch] [tag]</a:t>
+              <a:t> cherry-pick [commit] # 删除分支 $ </a:t>
+            </a:r>
+            <a:r>
+              <a:rPr lang="en-US" dirty="0" err="1"/>
+              <a:t>git</a:t>
+            </a:r>
+            <a:r>
+              <a:rPr lang="en-US" dirty="0"/>
+              <a:t> branch -d [branch-name] # 删除远程分支 $ </a:t>
+            </a:r>
+            <a:r>
+              <a:rPr lang="en-US" dirty="0" err="1"/>
+              <a:t>git</a:t>
+            </a:r>
+            <a:r>
+              <a:rPr lang="en-US" dirty="0"/>
+              <a:t> push origin --delete [branch-name] $ </a:t>
+            </a:r>
+            <a:r>
+              <a:rPr lang="en-US" dirty="0" err="1"/>
+              <a:t>git</a:t>
+            </a:r>
+            <a:r>
+              <a:rPr lang="en-US" dirty="0"/>
+              <a:t> branch -</a:t>
+            </a:r>
+            <a:r>
+              <a:rPr lang="en-US" dirty="0" err="1"/>
+              <a:t>dr</a:t>
+            </a:r>
+            <a:r>
+              <a:rPr lang="en-US" dirty="0"/>
+              <a:t> [remote/branch]</a:t>
             </a:r>
           </a:p>
         </p:txBody>
@@ -5965,7 +5835,7 @@
     </p:spTree>
     <p:extLst>
       <p:ext uri="{BB962C8B-B14F-4D97-AF65-F5344CB8AC3E}">
-        <p14:creationId xmlns:p14="http://schemas.microsoft.com/office/powerpoint/2010/main" val="1900630121"/>
+        <p14:creationId xmlns:p14="http://schemas.microsoft.com/office/powerpoint/2010/main" val="137075088"/>
       </p:ext>
     </p:extLst>
   </p:cSld>
@@ -6061,7 +5931,7 @@
           <a:p>
             <a:r>
               <a:rPr lang="zh-CN" altLang="en-US" b="0" dirty="0"/>
-              <a:t>查看信息</a:t>
+              <a:t>标签</a:t>
             </a:r>
           </a:p>
         </p:txBody>
@@ -6075,7 +5945,7 @@
         <p:spPr>
           <a:xfrm>
             <a:off x="250825" y="1143000"/>
-            <a:ext cx="8207375" cy="4524315"/>
+            <a:ext cx="8207375" cy="1477328"/>
           </a:xfrm>
           <a:prstGeom prst="rect">
             <a:avLst/>
@@ -6090,27 +5960,11 @@
           <a:p>
             <a:r>
               <a:rPr lang="en-US" dirty="0"/>
-              <a:t># 显示有变更的文件 $ </a:t>
-            </a:r>
-            <a:r>
-              <a:rPr lang="en-US" dirty="0" err="1"/>
-              <a:t>git</a:t>
-            </a:r>
-            <a:r>
-              <a:rPr lang="en-US" dirty="0"/>
-              <a:t> status # 显示当前分支的版本历史 $ </a:t>
-            </a:r>
-            <a:r>
-              <a:rPr lang="en-US" dirty="0" err="1"/>
-              <a:t>git</a:t>
-            </a:r>
-            <a:r>
-              <a:rPr lang="en-US" dirty="0"/>
-              <a:t> log # </a:t>
-            </a:r>
-            <a:r>
-              <a:rPr lang="en-US" dirty="0" err="1"/>
-              <a:t>显示commit历史，以及每次commit发生变更的文件</a:t>
+              <a:t># </a:t>
+            </a:r>
+            <a:r>
+              <a:rPr lang="en-US" dirty="0" err="1"/>
+              <a:t>列出所有tag</a:t>
             </a:r>
             <a:r>
               <a:rPr lang="en-US" dirty="0"/>
@@ -6122,19 +5976,11 @@
             </a:r>
             <a:r>
               <a:rPr lang="en-US" dirty="0"/>
-              <a:t> log --stat # 搜索提交历史，根据关键词 $ </a:t>
-            </a:r>
-            <a:r>
-              <a:rPr lang="en-US" dirty="0" err="1"/>
-              <a:t>git</a:t>
-            </a:r>
-            <a:r>
-              <a:rPr lang="en-US" dirty="0"/>
-              <a:t> log -S [keyword] # </a:t>
-            </a:r>
-            <a:r>
-              <a:rPr lang="en-US" dirty="0" err="1"/>
-              <a:t>显示某个commit之后的所有变动，每个commit占据一行</a:t>
+              <a:t> tag # </a:t>
+            </a:r>
+            <a:r>
+              <a:rPr lang="en-US" dirty="0" err="1"/>
+              <a:t>新建一个tag在当前commit</a:t>
             </a:r>
             <a:r>
               <a:rPr lang="en-US" dirty="0"/>
@@ -6146,11 +5992,11 @@
             </a:r>
             <a:r>
               <a:rPr lang="en-US" dirty="0"/>
-              <a:t> log [tag] HEAD --pretty=format:%s # </a:t>
-            </a:r>
-            <a:r>
-              <a:rPr lang="en-US" dirty="0" err="1"/>
-              <a:t>显示某个commit之后的所有变动，其"提交说明"必须符合搜索条件</a:t>
+              <a:t> tag [tag] # </a:t>
+            </a:r>
+            <a:r>
+              <a:rPr lang="en-US" dirty="0" err="1"/>
+              <a:t>新建一个tag在指定commit</a:t>
             </a:r>
             <a:r>
               <a:rPr lang="en-US" dirty="0"/>
@@ -6162,43 +6008,11 @@
             </a:r>
             <a:r>
               <a:rPr lang="en-US" dirty="0"/>
-              <a:t> log [tag] HEAD --</a:t>
-            </a:r>
-            <a:r>
-              <a:rPr lang="en-US" dirty="0" err="1"/>
-              <a:t>grep</a:t>
-            </a:r>
-            <a:r>
-              <a:rPr lang="en-US" dirty="0"/>
-              <a:t> feature # 显示某个文件的版本历史，包括文件改名 $ </a:t>
-            </a:r>
-            <a:r>
-              <a:rPr lang="en-US" dirty="0" err="1"/>
-              <a:t>git</a:t>
-            </a:r>
-            <a:r>
-              <a:rPr lang="en-US" dirty="0"/>
-              <a:t> log --follow [file] $ </a:t>
-            </a:r>
-            <a:r>
-              <a:rPr lang="en-US" dirty="0" err="1"/>
-              <a:t>git</a:t>
-            </a:r>
-            <a:r>
-              <a:rPr lang="en-US" dirty="0"/>
-              <a:t> </a:t>
-            </a:r>
-            <a:r>
-              <a:rPr lang="en-US" dirty="0" err="1"/>
-              <a:t>whatchanged</a:t>
-            </a:r>
-            <a:r>
-              <a:rPr lang="en-US" dirty="0"/>
-              <a:t> [file] # </a:t>
-            </a:r>
-            <a:r>
-              <a:rPr lang="en-US" dirty="0" err="1"/>
-              <a:t>显示指定文件相关的每一次diff</a:t>
+              <a:t> tag [tag] [commit] # </a:t>
+            </a:r>
+            <a:r>
+              <a:rPr lang="en-US" dirty="0" err="1"/>
+              <a:t>删除本地tag</a:t>
             </a:r>
             <a:r>
               <a:rPr lang="en-US" dirty="0"/>
@@ -6210,67 +6024,11 @@
             </a:r>
             <a:r>
               <a:rPr lang="en-US" dirty="0"/>
-              <a:t> log -p [file] # 显示过去5次提交 $ </a:t>
-            </a:r>
-            <a:r>
-              <a:rPr lang="en-US" dirty="0" err="1"/>
-              <a:t>git</a:t>
-            </a:r>
-            <a:r>
-              <a:rPr lang="en-US" dirty="0"/>
-              <a:t> log -5 --pretty --</a:t>
-            </a:r>
-            <a:r>
-              <a:rPr lang="en-US" dirty="0" err="1"/>
-              <a:t>oneline</a:t>
-            </a:r>
-            <a:r>
-              <a:rPr lang="en-US" dirty="0"/>
-              <a:t> # 显示所有提交过的用户，按提交次数排序 $ </a:t>
-            </a:r>
-            <a:r>
-              <a:rPr lang="en-US" dirty="0" err="1"/>
-              <a:t>git</a:t>
-            </a:r>
-            <a:r>
-              <a:rPr lang="en-US" dirty="0"/>
-              <a:t> </a:t>
-            </a:r>
-            <a:r>
-              <a:rPr lang="en-US" dirty="0" err="1"/>
-              <a:t>shortlog</a:t>
-            </a:r>
-            <a:r>
-              <a:rPr lang="en-US" dirty="0"/>
-              <a:t> -</a:t>
-            </a:r>
-            <a:r>
-              <a:rPr lang="en-US" dirty="0" err="1"/>
-              <a:t>sn</a:t>
-            </a:r>
-            <a:r>
-              <a:rPr lang="en-US" dirty="0"/>
-              <a:t> # 显示指定文件是什么人在什么时间修改过 $ </a:t>
-            </a:r>
-            <a:r>
-              <a:rPr lang="en-US" dirty="0" err="1"/>
-              <a:t>git</a:t>
-            </a:r>
-            <a:r>
-              <a:rPr lang="en-US" dirty="0"/>
-              <a:t> blame [file] # 显示暂存区和工作区的差异 $ </a:t>
-            </a:r>
-            <a:r>
-              <a:rPr lang="en-US" dirty="0" err="1"/>
-              <a:t>git</a:t>
-            </a:r>
-            <a:r>
-              <a:rPr lang="en-US" dirty="0"/>
-              <a:t> diff # </a:t>
-            </a:r>
-            <a:r>
-              <a:rPr lang="en-US" dirty="0" err="1"/>
-              <a:t>显示暂存区和上一个commit的差异</a:t>
+              <a:t> tag -d [tag] # </a:t>
+            </a:r>
+            <a:r>
+              <a:rPr lang="en-US" dirty="0" err="1"/>
+              <a:t>删除远程tag</a:t>
             </a:r>
             <a:r>
               <a:rPr lang="en-US" dirty="0"/>
@@ -6282,11 +6040,19 @@
             </a:r>
             <a:r>
               <a:rPr lang="en-US" dirty="0"/>
-              <a:t> diff --cached [file] # </a:t>
-            </a:r>
-            <a:r>
-              <a:rPr lang="en-US" dirty="0" err="1"/>
-              <a:t>显示工作区与当前分支最新commit之间的差异</a:t>
+              <a:t> push origin :refs/tags/[</a:t>
+            </a:r>
+            <a:r>
+              <a:rPr lang="en-US" dirty="0" err="1"/>
+              <a:t>tagName</a:t>
+            </a:r>
+            <a:r>
+              <a:rPr lang="en-US" dirty="0"/>
+              <a:t>] # </a:t>
+            </a:r>
+            <a:r>
+              <a:rPr lang="en-US" dirty="0" err="1"/>
+              <a:t>查看tag信息</a:t>
             </a:r>
             <a:r>
               <a:rPr lang="en-US" dirty="0"/>
@@ -6298,76 +6064,63 @@
             </a:r>
             <a:r>
               <a:rPr lang="en-US" dirty="0"/>
-              <a:t> diff HEAD # 显示两次提交之间的差异 $ </a:t>
-            </a:r>
-            <a:r>
-              <a:rPr lang="en-US" dirty="0" err="1"/>
-              <a:t>git</a:t>
-            </a:r>
-            <a:r>
-              <a:rPr lang="en-US" dirty="0"/>
-              <a:t> diff [first-branch]...[second-branch] # 显示今天你写了多少行代码 $ </a:t>
-            </a:r>
-            <a:r>
-              <a:rPr lang="en-US" dirty="0" err="1"/>
-              <a:t>git</a:t>
-            </a:r>
-            <a:r>
-              <a:rPr lang="en-US" dirty="0"/>
-              <a:t> diff --</a:t>
-            </a:r>
-            <a:r>
-              <a:rPr lang="en-US" dirty="0" err="1"/>
-              <a:t>shortstat</a:t>
-            </a:r>
-            <a:r>
-              <a:rPr lang="en-US" dirty="0"/>
-              <a:t> "@{0 day ago}" # 显示某次提交的元数据和内容变化 $ </a:t>
-            </a:r>
-            <a:r>
-              <a:rPr lang="en-US" dirty="0" err="1"/>
-              <a:t>git</a:t>
-            </a:r>
-            <a:r>
-              <a:rPr lang="en-US" dirty="0"/>
-              <a:t> show [commit] # 显示某次提交发生变化的文件 $ </a:t>
-            </a:r>
-            <a:r>
-              <a:rPr lang="en-US" dirty="0" err="1"/>
-              <a:t>git</a:t>
-            </a:r>
-            <a:r>
-              <a:rPr lang="en-US" dirty="0"/>
-              <a:t> show --name-only [commit] # 显示某次提交时，某个文件的内容 $ </a:t>
-            </a:r>
-            <a:r>
-              <a:rPr lang="en-US" dirty="0" err="1"/>
-              <a:t>git</a:t>
-            </a:r>
-            <a:r>
-              <a:rPr lang="en-US" dirty="0"/>
-              <a:t> show [commit]:[filename] # 显示当前分支的最近几次提交 $ </a:t>
-            </a:r>
-            <a:r>
-              <a:rPr lang="en-US" dirty="0" err="1"/>
-              <a:t>git</a:t>
-            </a:r>
-            <a:r>
-              <a:rPr lang="en-US" dirty="0"/>
-              <a:t> </a:t>
-            </a:r>
-            <a:r>
-              <a:rPr lang="en-US" dirty="0" err="1"/>
-              <a:t>reflog</a:t>
-            </a:r>
-            <a:endParaRPr lang="en-US" dirty="0"/>
+              <a:t> show [tag] # </a:t>
+            </a:r>
+            <a:r>
+              <a:rPr lang="en-US" dirty="0" err="1"/>
+              <a:t>提交指定tag</a:t>
+            </a:r>
+            <a:r>
+              <a:rPr lang="en-US" dirty="0"/>
+              <a:t> $ </a:t>
+            </a:r>
+            <a:r>
+              <a:rPr lang="en-US" dirty="0" err="1"/>
+              <a:t>git</a:t>
+            </a:r>
+            <a:r>
+              <a:rPr lang="en-US" dirty="0"/>
+              <a:t> push [remote] [tag] # </a:t>
+            </a:r>
+            <a:r>
+              <a:rPr lang="en-US" dirty="0" err="1"/>
+              <a:t>提交所有tag</a:t>
+            </a:r>
+            <a:r>
+              <a:rPr lang="en-US" dirty="0"/>
+              <a:t> $ </a:t>
+            </a:r>
+            <a:r>
+              <a:rPr lang="en-US" dirty="0" err="1"/>
+              <a:t>git</a:t>
+            </a:r>
+            <a:r>
+              <a:rPr lang="en-US" dirty="0"/>
+              <a:t> push [remote] --tags # </a:t>
+            </a:r>
+            <a:r>
+              <a:rPr lang="en-US" dirty="0" err="1"/>
+              <a:t>新建一个分支，指向某个tag</a:t>
+            </a:r>
+            <a:r>
+              <a:rPr lang="en-US" dirty="0"/>
+              <a:t> $ </a:t>
+            </a:r>
+            <a:r>
+              <a:rPr lang="en-US" dirty="0" err="1"/>
+              <a:t>git</a:t>
+            </a:r>
+            <a:r>
+              <a:rPr lang="en-US" dirty="0"/>
+              <a:t> checkout -b [branch] [tag]</a:t>
+            </a:r>
           </a:p>
         </p:txBody>
       </p:sp>
     </p:spTree>
     <p:extLst>
       <p:ext uri="{BB962C8B-B14F-4D97-AF65-F5344CB8AC3E}">
-        <p14:creationId xmlns:p14="http://schemas.microsoft.com/office/powerpoint/2010/main" val="1305964966"/>
+        <p14:creationId xmlns:p14="http://schemas.microsoft.com/office/powerpoint/2010/main" val="1900630121"/>
       </p:ext>
     </p:extLst>
   </p:cSld>
@@ -6463,13 +6216,8 @@
           <a:p>
             <a:r>
               <a:rPr lang="zh-CN" altLang="en-US" b="0" dirty="0"/>
-              <a:t>远程</a:t>
-            </a:r>
-            <a:r>
-              <a:rPr lang="zh-CN" altLang="en-US" b="0" dirty="0" smtClean="0"/>
-              <a:t>同步</a:t>
-            </a:r>
-            <a:endParaRPr lang="zh-CN" altLang="en-US" b="0" dirty="0"/>
+              <a:t>查看信息</a:t>
+            </a:r>
           </a:p>
         </p:txBody>
       </p:sp>
@@ -6482,7 +6230,7 @@
         <p:spPr>
           <a:xfrm>
             <a:off x="250825" y="1143000"/>
-            <a:ext cx="8207375" cy="1754326"/>
+            <a:ext cx="8207375" cy="4524315"/>
           </a:xfrm>
           <a:prstGeom prst="rect">
             <a:avLst/>
@@ -6497,95 +6245,284 @@
           <a:p>
             <a:r>
               <a:rPr lang="en-US" dirty="0"/>
-              <a:t># 下载远程仓库的所有变动 $ </a:t>
-            </a:r>
-            <a:r>
-              <a:rPr lang="en-US" dirty="0" err="1"/>
-              <a:t>git</a:t>
-            </a:r>
-            <a:r>
-              <a:rPr lang="en-US" dirty="0"/>
-              <a:t> fetch [remote] # 显示所有远程仓库 $ </a:t>
-            </a:r>
-            <a:r>
-              <a:rPr lang="en-US" dirty="0" err="1"/>
-              <a:t>git</a:t>
-            </a:r>
-            <a:r>
-              <a:rPr lang="en-US" dirty="0"/>
-              <a:t> remote -v # 显示某个远程仓库的信息 $ </a:t>
-            </a:r>
-            <a:r>
-              <a:rPr lang="en-US" dirty="0" err="1"/>
-              <a:t>git</a:t>
-            </a:r>
-            <a:r>
-              <a:rPr lang="en-US" dirty="0"/>
-              <a:t> remote show [remote] # 增加一个新的远程仓库，并命名 $ </a:t>
-            </a:r>
-            <a:r>
-              <a:rPr lang="en-US" dirty="0" err="1"/>
-              <a:t>git</a:t>
-            </a:r>
-            <a:r>
-              <a:rPr lang="en-US" dirty="0"/>
-              <a:t> remote add [</a:t>
-            </a:r>
-            <a:r>
-              <a:rPr lang="en-US" dirty="0" err="1"/>
-              <a:t>shortname</a:t>
-            </a:r>
-            <a:r>
-              <a:rPr lang="en-US" dirty="0"/>
-              <a:t>] [</a:t>
-            </a:r>
-            <a:r>
-              <a:rPr lang="en-US" dirty="0" err="1"/>
-              <a:t>url</a:t>
-            </a:r>
-            <a:r>
-              <a:rPr lang="en-US" dirty="0"/>
-              <a:t>] # 取回远程仓库的变化，并与本地分支合并 $ </a:t>
-            </a:r>
-            <a:r>
-              <a:rPr lang="en-US" dirty="0" err="1"/>
-              <a:t>git</a:t>
-            </a:r>
-            <a:r>
-              <a:rPr lang="en-US" dirty="0"/>
-              <a:t> pull [remote] [branch] # 上传本地指定分支到远程仓库 $ </a:t>
-            </a:r>
-            <a:r>
-              <a:rPr lang="en-US" dirty="0" err="1"/>
-              <a:t>git</a:t>
-            </a:r>
-            <a:r>
-              <a:rPr lang="en-US" dirty="0"/>
-              <a:t> push [remote] [branch] # 强行推送当前分支到远程仓库，即使有冲突 $ </a:t>
-            </a:r>
-            <a:r>
-              <a:rPr lang="en-US" dirty="0" err="1"/>
-              <a:t>git</a:t>
-            </a:r>
-            <a:r>
-              <a:rPr lang="en-US" dirty="0"/>
-              <a:t> push [remote] --force # 推送所有分支到远程仓库 $ </a:t>
-            </a:r>
-            <a:r>
-              <a:rPr lang="en-US" dirty="0" err="1"/>
-              <a:t>git</a:t>
-            </a:r>
-            <a:r>
-              <a:rPr lang="en-US" dirty="0"/>
-              <a:t> push [remote] --all</a:t>
-            </a:r>
+              <a:t># 显示有变更的文件 $ </a:t>
+            </a:r>
+            <a:r>
+              <a:rPr lang="en-US" dirty="0" err="1"/>
+              <a:t>git</a:t>
+            </a:r>
+            <a:r>
+              <a:rPr lang="en-US" dirty="0"/>
+              <a:t> status # 显示当前分支的版本历史 $ </a:t>
+            </a:r>
+            <a:r>
+              <a:rPr lang="en-US" dirty="0" err="1"/>
+              <a:t>git</a:t>
+            </a:r>
+            <a:r>
+              <a:rPr lang="en-US" dirty="0"/>
+              <a:t> log # </a:t>
+            </a:r>
+            <a:r>
+              <a:rPr lang="en-US" dirty="0" err="1"/>
+              <a:t>显示commit历史，以及每次commit发生变更的文件</a:t>
+            </a:r>
+            <a:r>
+              <a:rPr lang="en-US" dirty="0"/>
+              <a:t> $ </a:t>
+            </a:r>
+            <a:r>
+              <a:rPr lang="en-US" dirty="0" err="1"/>
+              <a:t>git</a:t>
+            </a:r>
+            <a:r>
+              <a:rPr lang="en-US" dirty="0"/>
+              <a:t> log --stat # 搜索提交历史，根据关键词 $ </a:t>
+            </a:r>
+            <a:r>
+              <a:rPr lang="en-US" dirty="0" err="1"/>
+              <a:t>git</a:t>
+            </a:r>
+            <a:r>
+              <a:rPr lang="en-US" dirty="0"/>
+              <a:t> log -S [keyword] # </a:t>
+            </a:r>
+            <a:r>
+              <a:rPr lang="en-US" dirty="0" err="1"/>
+              <a:t>显示某个commit之后的所有变动，每个commit占据一行</a:t>
+            </a:r>
+            <a:r>
+              <a:rPr lang="en-US" dirty="0"/>
+              <a:t> $ </a:t>
+            </a:r>
+            <a:r>
+              <a:rPr lang="en-US" dirty="0" err="1"/>
+              <a:t>git</a:t>
+            </a:r>
+            <a:r>
+              <a:rPr lang="en-US" dirty="0"/>
+              <a:t> log [tag] HEAD --pretty=format:%s # </a:t>
+            </a:r>
+            <a:r>
+              <a:rPr lang="en-US" dirty="0" err="1"/>
+              <a:t>显示某个commit之后的所有变动，其"提交说明"必须符合搜索条件</a:t>
+            </a:r>
+            <a:r>
+              <a:rPr lang="en-US" dirty="0"/>
+              <a:t> $ </a:t>
+            </a:r>
+            <a:r>
+              <a:rPr lang="en-US" dirty="0" err="1"/>
+              <a:t>git</a:t>
+            </a:r>
+            <a:r>
+              <a:rPr lang="en-US" dirty="0"/>
+              <a:t> log [tag] HEAD --</a:t>
+            </a:r>
+            <a:r>
+              <a:rPr lang="en-US" dirty="0" err="1"/>
+              <a:t>grep</a:t>
+            </a:r>
+            <a:r>
+              <a:rPr lang="en-US" dirty="0"/>
+              <a:t> feature # 显示某个文件的版本历史，包括文件改名 $ </a:t>
+            </a:r>
+            <a:r>
+              <a:rPr lang="en-US" dirty="0" err="1"/>
+              <a:t>git</a:t>
+            </a:r>
+            <a:r>
+              <a:rPr lang="en-US" dirty="0"/>
+              <a:t> log --follow [file] $ </a:t>
+            </a:r>
+            <a:r>
+              <a:rPr lang="en-US" dirty="0" err="1"/>
+              <a:t>git</a:t>
+            </a:r>
+            <a:r>
+              <a:rPr lang="en-US" dirty="0"/>
+              <a:t> </a:t>
+            </a:r>
+            <a:r>
+              <a:rPr lang="en-US" dirty="0" err="1"/>
+              <a:t>whatchanged</a:t>
+            </a:r>
+            <a:r>
+              <a:rPr lang="en-US" dirty="0"/>
+              <a:t> [file] # </a:t>
+            </a:r>
+            <a:r>
+              <a:rPr lang="en-US" dirty="0" err="1"/>
+              <a:t>显示指定文件相关的每一次diff</a:t>
+            </a:r>
+            <a:r>
+              <a:rPr lang="en-US" dirty="0"/>
+              <a:t> $ </a:t>
+            </a:r>
+            <a:r>
+              <a:rPr lang="en-US" dirty="0" err="1"/>
+              <a:t>git</a:t>
+            </a:r>
+            <a:r>
+              <a:rPr lang="en-US" dirty="0"/>
+              <a:t> log -p [file] # 显示过去5次提交 $ </a:t>
+            </a:r>
+            <a:r>
+              <a:rPr lang="en-US" dirty="0" err="1"/>
+              <a:t>git</a:t>
+            </a:r>
+            <a:r>
+              <a:rPr lang="en-US" dirty="0"/>
+              <a:t> log -5 --pretty --</a:t>
+            </a:r>
+            <a:r>
+              <a:rPr lang="en-US" dirty="0" err="1"/>
+              <a:t>oneline</a:t>
+            </a:r>
+            <a:r>
+              <a:rPr lang="en-US" dirty="0"/>
+              <a:t> # 显示所有提交过的用户，按提交次数排序 $ </a:t>
+            </a:r>
+            <a:r>
+              <a:rPr lang="en-US" dirty="0" err="1"/>
+              <a:t>git</a:t>
+            </a:r>
+            <a:r>
+              <a:rPr lang="en-US" dirty="0"/>
+              <a:t> </a:t>
+            </a:r>
+            <a:r>
+              <a:rPr lang="en-US" dirty="0" err="1"/>
+              <a:t>shortlog</a:t>
+            </a:r>
+            <a:r>
+              <a:rPr lang="en-US" dirty="0"/>
+              <a:t> -</a:t>
+            </a:r>
+            <a:r>
+              <a:rPr lang="en-US" dirty="0" err="1"/>
+              <a:t>sn</a:t>
+            </a:r>
+            <a:r>
+              <a:rPr lang="en-US" dirty="0"/>
+              <a:t> # 显示指定文件是什么人在什么时间修改过 $ </a:t>
+            </a:r>
+            <a:r>
+              <a:rPr lang="en-US" dirty="0" err="1"/>
+              <a:t>git</a:t>
+            </a:r>
+            <a:r>
+              <a:rPr lang="en-US" dirty="0"/>
+              <a:t> blame [file] # 显示暂存区和工作区的差异 $ </a:t>
+            </a:r>
+            <a:r>
+              <a:rPr lang="en-US" dirty="0" err="1"/>
+              <a:t>git</a:t>
+            </a:r>
+            <a:r>
+              <a:rPr lang="en-US" dirty="0"/>
+              <a:t> diff # </a:t>
+            </a:r>
+            <a:r>
+              <a:rPr lang="en-US" dirty="0" err="1"/>
+              <a:t>显示暂存区和上一个commit的差异</a:t>
+            </a:r>
+            <a:r>
+              <a:rPr lang="en-US" dirty="0"/>
+              <a:t> $ </a:t>
+            </a:r>
+            <a:r>
+              <a:rPr lang="en-US" dirty="0" err="1"/>
+              <a:t>git</a:t>
+            </a:r>
+            <a:r>
+              <a:rPr lang="en-US" dirty="0"/>
+              <a:t> diff --cached [file] # </a:t>
+            </a:r>
+            <a:r>
+              <a:rPr lang="en-US" dirty="0" err="1"/>
+              <a:t>显示工作区与当前分支最新commit之间的差异</a:t>
+            </a:r>
+            <a:r>
+              <a:rPr lang="en-US" dirty="0"/>
+              <a:t> $ </a:t>
+            </a:r>
+            <a:r>
+              <a:rPr lang="en-US" dirty="0" err="1"/>
+              <a:t>git</a:t>
+            </a:r>
+            <a:r>
+              <a:rPr lang="en-US" dirty="0"/>
+              <a:t> diff HEAD # 显示两次提交之间的差异 $ </a:t>
+            </a:r>
+            <a:r>
+              <a:rPr lang="en-US" dirty="0" err="1"/>
+              <a:t>git</a:t>
+            </a:r>
+            <a:r>
+              <a:rPr lang="en-US" dirty="0"/>
+              <a:t> diff [first-branch]...[second-branch] # 显示今天你写了多少行代码 $ </a:t>
+            </a:r>
+            <a:r>
+              <a:rPr lang="en-US" dirty="0" err="1"/>
+              <a:t>git</a:t>
+            </a:r>
+            <a:r>
+              <a:rPr lang="en-US" dirty="0"/>
+              <a:t> diff --</a:t>
+            </a:r>
+            <a:r>
+              <a:rPr lang="en-US" dirty="0" err="1"/>
+              <a:t>shortstat</a:t>
+            </a:r>
+            <a:r>
+              <a:rPr lang="en-US" dirty="0"/>
+              <a:t> "@{0 day ago}" # 显示某次提交的元数据和内容变化 $ </a:t>
+            </a:r>
+            <a:r>
+              <a:rPr lang="en-US" dirty="0" err="1"/>
+              <a:t>git</a:t>
+            </a:r>
+            <a:r>
+              <a:rPr lang="en-US" dirty="0"/>
+              <a:t> show [commit] # 显示某次提交发生变化的文件 $ </a:t>
+            </a:r>
+            <a:r>
+              <a:rPr lang="en-US" dirty="0" err="1"/>
+              <a:t>git</a:t>
+            </a:r>
+            <a:r>
+              <a:rPr lang="en-US" dirty="0"/>
+              <a:t> show --name-only [commit] # 显示某次提交时，某个文件的内容 $ </a:t>
+            </a:r>
+            <a:r>
+              <a:rPr lang="en-US" dirty="0" err="1"/>
+              <a:t>git</a:t>
+            </a:r>
+            <a:r>
+              <a:rPr lang="en-US" dirty="0"/>
+              <a:t> show [commit]:[filename] # 显示当前分支的最近几次提交 $ </a:t>
+            </a:r>
+            <a:r>
+              <a:rPr lang="en-US" dirty="0" err="1"/>
+              <a:t>git</a:t>
+            </a:r>
+            <a:r>
+              <a:rPr lang="en-US" dirty="0"/>
+              <a:t> </a:t>
+            </a:r>
+            <a:r>
+              <a:rPr lang="en-US" dirty="0" err="1"/>
+              <a:t>reflog</a:t>
+            </a:r>
+            <a:endParaRPr lang="en-US" dirty="0"/>
           </a:p>
         </p:txBody>
       </p:sp>
     </p:spTree>
     <p:extLst>
       <p:ext uri="{BB962C8B-B14F-4D97-AF65-F5344CB8AC3E}">
-        <p14:creationId xmlns:p14="http://schemas.microsoft.com/office/powerpoint/2010/main" val="43175813"/>
+        <p14:creationId xmlns:p14="http://schemas.microsoft.com/office/powerpoint/2010/main" val="1305964966"/>
       </p:ext>
     </p:extLst>
   </p:cSld>
@@ -6681,8 +6618,13 @@
           <a:p>
             <a:r>
               <a:rPr lang="zh-CN" altLang="en-US" b="0" dirty="0"/>
-              <a:t>撤销</a:t>
-            </a:r>
+              <a:t>远程</a:t>
+            </a:r>
+            <a:r>
+              <a:rPr lang="zh-CN" altLang="en-US" b="0" dirty="0" smtClean="0"/>
+              <a:t>同步</a:t>
+            </a:r>
+            <a:endParaRPr lang="zh-CN" altLang="en-US" b="0" dirty="0"/>
           </a:p>
         </p:txBody>
       </p:sp>
@@ -6695,7 +6637,7 @@
         <p:spPr>
           <a:xfrm>
             <a:off x="250825" y="1143000"/>
-            <a:ext cx="8207375" cy="3139321"/>
+            <a:ext cx="8207375" cy="1754326"/>
           </a:xfrm>
           <a:prstGeom prst="rect">
             <a:avLst/>
@@ -6710,151 +6652,87 @@
           <a:p>
             <a:r>
               <a:rPr lang="en-US" dirty="0"/>
-              <a:t># 恢复暂存区的指定文件到工作区 $ </a:t>
-            </a:r>
-            <a:r>
-              <a:rPr lang="en-US" dirty="0" err="1"/>
-              <a:t>git</a:t>
-            </a:r>
-            <a:r>
-              <a:rPr lang="en-US" dirty="0"/>
-              <a:t> checkout [file] # </a:t>
-            </a:r>
-            <a:r>
-              <a:rPr lang="en-US" dirty="0" err="1"/>
-              <a:t>恢复某个commit的指定文件到暂存区和工作区</a:t>
-            </a:r>
-            <a:r>
-              <a:rPr lang="en-US" dirty="0"/>
-              <a:t> $ </a:t>
-            </a:r>
-            <a:r>
-              <a:rPr lang="en-US" dirty="0" err="1"/>
-              <a:t>git</a:t>
-            </a:r>
-            <a:r>
-              <a:rPr lang="en-US" dirty="0"/>
-              <a:t> checkout [commit] [file] # 恢复暂存区的所有文件到工作区 $ </a:t>
-            </a:r>
-            <a:r>
-              <a:rPr lang="en-US" dirty="0" err="1"/>
-              <a:t>git</a:t>
-            </a:r>
-            <a:r>
-              <a:rPr lang="en-US" dirty="0"/>
-              <a:t> checkout . # </a:t>
-            </a:r>
-            <a:r>
-              <a:rPr lang="en-US" dirty="0" err="1"/>
-              <a:t>重置暂存区的指定文件，与上一次commit保持一致，但工作区不变</a:t>
-            </a:r>
-            <a:r>
-              <a:rPr lang="en-US" dirty="0"/>
-              <a:t> $ </a:t>
-            </a:r>
-            <a:r>
-              <a:rPr lang="en-US" dirty="0" err="1"/>
-              <a:t>git</a:t>
-            </a:r>
-            <a:r>
-              <a:rPr lang="en-US" dirty="0"/>
-              <a:t> reset [file] # </a:t>
-            </a:r>
-            <a:r>
-              <a:rPr lang="en-US" dirty="0" err="1"/>
-              <a:t>重置暂存区与工作区，与上一次commit保持一致</a:t>
-            </a:r>
-            <a:r>
-              <a:rPr lang="en-US" dirty="0"/>
-              <a:t> $ </a:t>
-            </a:r>
-            <a:r>
-              <a:rPr lang="en-US" dirty="0" err="1"/>
-              <a:t>git</a:t>
-            </a:r>
-            <a:r>
-              <a:rPr lang="en-US" dirty="0"/>
-              <a:t> reset --hard # </a:t>
-            </a:r>
-            <a:r>
-              <a:rPr lang="en-US" dirty="0" err="1"/>
-              <a:t>重置当前分支的指针为指定commit，同时重置暂存区，但工作区不变</a:t>
-            </a:r>
-            <a:r>
-              <a:rPr lang="en-US" dirty="0"/>
-              <a:t> $ </a:t>
-            </a:r>
-            <a:r>
-              <a:rPr lang="en-US" dirty="0" err="1"/>
-              <a:t>git</a:t>
-            </a:r>
-            <a:r>
-              <a:rPr lang="en-US" dirty="0"/>
-              <a:t> reset [commit] # </a:t>
-            </a:r>
-            <a:r>
-              <a:rPr lang="en-US" dirty="0" err="1"/>
-              <a:t>重置当前分支的HEAD为指定commit，同时重置暂存区和工作区，与指定commit一致</a:t>
-            </a:r>
-            <a:r>
-              <a:rPr lang="en-US" dirty="0"/>
-              <a:t> $ </a:t>
-            </a:r>
-            <a:r>
-              <a:rPr lang="en-US" dirty="0" err="1"/>
-              <a:t>git</a:t>
-            </a:r>
-            <a:r>
-              <a:rPr lang="en-US" dirty="0"/>
-              <a:t> reset --hard [commit] # </a:t>
-            </a:r>
-            <a:r>
-              <a:rPr lang="en-US" dirty="0" err="1"/>
-              <a:t>重置当前HEAD为指定commit，但保持暂存区和工作区不变</a:t>
-            </a:r>
-            <a:r>
-              <a:rPr lang="en-US" dirty="0"/>
-              <a:t> $ </a:t>
-            </a:r>
-            <a:r>
-              <a:rPr lang="en-US" dirty="0" err="1"/>
-              <a:t>git</a:t>
-            </a:r>
-            <a:r>
-              <a:rPr lang="en-US" dirty="0"/>
-              <a:t> reset --keep [commit] # </a:t>
-            </a:r>
-            <a:r>
-              <a:rPr lang="en-US" dirty="0" err="1"/>
-              <a:t>新建一个commit，用来撤销指定commit</a:t>
-            </a:r>
-            <a:r>
-              <a:rPr lang="en-US" dirty="0"/>
-              <a:t> # 后者的所有变化都将被前者抵消，并且应用到当前分支 $ </a:t>
-            </a:r>
-            <a:r>
-              <a:rPr lang="en-US" dirty="0" err="1"/>
-              <a:t>git</a:t>
-            </a:r>
-            <a:r>
-              <a:rPr lang="en-US" dirty="0"/>
-              <a:t> revert [commit] # 暂时将未提交的变化移除，稍后再移入 $ </a:t>
-            </a:r>
-            <a:r>
-              <a:rPr lang="en-US" dirty="0" err="1"/>
-              <a:t>git</a:t>
-            </a:r>
-            <a:r>
-              <a:rPr lang="en-US" dirty="0"/>
-              <a:t> stash $ </a:t>
-            </a:r>
-            <a:r>
-              <a:rPr lang="en-US" dirty="0" err="1"/>
-              <a:t>git</a:t>
-            </a:r>
-            <a:r>
-              <a:rPr lang="en-US" dirty="0"/>
-              <a:t> stash pop</a:t>
+              <a:t># 下载远程仓库的所有变动 $ </a:t>
+            </a:r>
+            <a:r>
+              <a:rPr lang="en-US" dirty="0" err="1"/>
+              <a:t>git</a:t>
+            </a:r>
+            <a:r>
+              <a:rPr lang="en-US" dirty="0"/>
+              <a:t> fetch [remote] # 显示所有远程仓库 $ </a:t>
+            </a:r>
+            <a:r>
+              <a:rPr lang="en-US" dirty="0" err="1"/>
+              <a:t>git</a:t>
+            </a:r>
+            <a:r>
+              <a:rPr lang="en-US" dirty="0"/>
+              <a:t> remote -v # 显示某个远程仓库的信息 $ </a:t>
+            </a:r>
+            <a:r>
+              <a:rPr lang="en-US" dirty="0" err="1"/>
+              <a:t>git</a:t>
+            </a:r>
+            <a:r>
+              <a:rPr lang="en-US" dirty="0"/>
+              <a:t> remote show [remote] # 增加一个新的远程仓库，并命名 $ </a:t>
+            </a:r>
+            <a:r>
+              <a:rPr lang="en-US" dirty="0" err="1"/>
+              <a:t>git</a:t>
+            </a:r>
+            <a:r>
+              <a:rPr lang="en-US" dirty="0"/>
+              <a:t> remote add [</a:t>
+            </a:r>
+            <a:r>
+              <a:rPr lang="en-US" dirty="0" err="1"/>
+              <a:t>shortname</a:t>
+            </a:r>
+            <a:r>
+              <a:rPr lang="en-US" dirty="0"/>
+              <a:t>] [</a:t>
+            </a:r>
+            <a:r>
+              <a:rPr lang="en-US" dirty="0" err="1"/>
+              <a:t>url</a:t>
+            </a:r>
+            <a:r>
+              <a:rPr lang="en-US" dirty="0"/>
+              <a:t>] # 取回远程仓库的变化，并与本地分支合并 $ </a:t>
+            </a:r>
+            <a:r>
+              <a:rPr lang="en-US" dirty="0" err="1"/>
+              <a:t>git</a:t>
+            </a:r>
+            <a:r>
+              <a:rPr lang="en-US" dirty="0"/>
+              <a:t> pull [remote] [branch] # 上传本地指定分支到远程仓库 $ </a:t>
+            </a:r>
+            <a:r>
+              <a:rPr lang="en-US" dirty="0" err="1"/>
+              <a:t>git</a:t>
+            </a:r>
+            <a:r>
+              <a:rPr lang="en-US" dirty="0"/>
+              <a:t> push [remote] [branch] # 强行推送当前分支到远程仓库，即使有冲突 $ </a:t>
+            </a:r>
+            <a:r>
+              <a:rPr lang="en-US" dirty="0" err="1"/>
+              <a:t>git</a:t>
+            </a:r>
+            <a:r>
+              <a:rPr lang="en-US" dirty="0"/>
+              <a:t> push [remote] --force # 推送所有分支到远程仓库 $ </a:t>
+            </a:r>
+            <a:r>
+              <a:rPr lang="en-US" dirty="0" err="1"/>
+              <a:t>git</a:t>
+            </a:r>
+            <a:r>
+              <a:rPr lang="en-US" dirty="0"/>
+              <a:t> push [remote] --all</a:t>
             </a:r>
           </a:p>
         </p:txBody>
@@ -6862,7 +6740,7 @@
     </p:spTree>
     <p:extLst>
       <p:ext uri="{BB962C8B-B14F-4D97-AF65-F5344CB8AC3E}">
-        <p14:creationId xmlns:p14="http://schemas.microsoft.com/office/powerpoint/2010/main" val="1476544542"/>
+        <p14:creationId xmlns:p14="http://schemas.microsoft.com/office/powerpoint/2010/main" val="43175813"/>
       </p:ext>
     </p:extLst>
   </p:cSld>
@@ -6912,9 +6790,18 @@
           <a:lstStyle/>
           <a:p>
             <a:r>
-              <a:rPr lang="en-US" altLang="ko-KR"/>
-              <a:t>www.themegallery.com</a:t>
-            </a:r>
+              <a:rPr lang="en-US" altLang="ko-KR" dirty="0" err="1" smtClean="0"/>
+              <a:t>www.</a:t>
+            </a:r>
+            <a:r>
+              <a:rPr lang="en-US" altLang="zh-CN" dirty="0" err="1" smtClean="0"/>
+              <a:t>pwc</a:t>
+            </a:r>
+            <a:r>
+              <a:rPr lang="en-US" altLang="ko-KR" dirty="0" err="1" smtClean="0"/>
+              <a:t>.com</a:t>
+            </a:r>
+            <a:endParaRPr lang="en-US" altLang="ko-KR" dirty="0"/>
           </a:p>
         </p:txBody>
       </p:sp>
@@ -6961,10 +6848,17 @@
           <a:lstStyle/>
           <a:p>
             <a:r>
-              <a:rPr lang="zh-TW" altLang="en-US" b="0" dirty="0"/>
-              <a:t>流程</a:t>
-            </a:r>
-            <a:endParaRPr lang="ko-KR" altLang="en-US" dirty="0">
+              <a:rPr lang="en-US" altLang="zh-CN" sz="2000" b="0" dirty="0" smtClean="0"/>
+              <a:t>GitHub</a:t>
+            </a:r>
+            <a:br>
+              <a:rPr lang="en-US" altLang="zh-CN" sz="2000" b="0" dirty="0" smtClean="0"/>
+            </a:br>
+            <a:r>
+              <a:rPr lang="en-US" altLang="zh-CN" sz="2000" b="0" dirty="0" smtClean="0"/>
+              <a:t>Workflow</a:t>
+            </a:r>
+            <a:endParaRPr lang="ko-KR" altLang="en-US" sz="2000" dirty="0">
               <a:ea typeface="굴림" charset="0"/>
             </a:endParaRPr>
           </a:p>
@@ -7093,6 +6987,283 @@
           <a:lstStyle/>
           <a:p>
             <a:r>
+              <a:rPr lang="zh-CN" altLang="en-US" b="0" dirty="0"/>
+              <a:t>撤销</a:t>
+            </a:r>
+          </a:p>
+        </p:txBody>
+      </p:sp>
+      <p:sp>
+        <p:nvSpPr>
+          <p:cNvPr id="3" name="TextBox 2"/>
+          <p:cNvSpPr txBox="1"/>
+          <p:nvPr/>
+        </p:nvSpPr>
+        <p:spPr>
+          <a:xfrm>
+            <a:off x="250825" y="1143000"/>
+            <a:ext cx="8207375" cy="3139321"/>
+          </a:xfrm>
+          <a:prstGeom prst="rect">
+            <a:avLst/>
+          </a:prstGeom>
+          <a:noFill/>
+        </p:spPr>
+        <p:txBody>
+          <a:bodyPr wrap="square" rtlCol="0">
+            <a:spAutoFit/>
+          </a:bodyPr>
+          <a:lstStyle/>
+          <a:p>
+            <a:r>
+              <a:rPr lang="en-US" dirty="0"/>
+              <a:t># 恢复暂存区的指定文件到工作区 $ </a:t>
+            </a:r>
+            <a:r>
+              <a:rPr lang="en-US" dirty="0" err="1"/>
+              <a:t>git</a:t>
+            </a:r>
+            <a:r>
+              <a:rPr lang="en-US" dirty="0"/>
+              <a:t> checkout [file] # </a:t>
+            </a:r>
+            <a:r>
+              <a:rPr lang="en-US" dirty="0" err="1"/>
+              <a:t>恢复某个commit的指定文件到暂存区和工作区</a:t>
+            </a:r>
+            <a:r>
+              <a:rPr lang="en-US" dirty="0"/>
+              <a:t> $ </a:t>
+            </a:r>
+            <a:r>
+              <a:rPr lang="en-US" dirty="0" err="1"/>
+              <a:t>git</a:t>
+            </a:r>
+            <a:r>
+              <a:rPr lang="en-US" dirty="0"/>
+              <a:t> checkout [commit] [file] # 恢复暂存区的所有文件到工作区 $ </a:t>
+            </a:r>
+            <a:r>
+              <a:rPr lang="en-US" dirty="0" err="1"/>
+              <a:t>git</a:t>
+            </a:r>
+            <a:r>
+              <a:rPr lang="en-US" dirty="0"/>
+              <a:t> checkout . # </a:t>
+            </a:r>
+            <a:r>
+              <a:rPr lang="en-US" dirty="0" err="1"/>
+              <a:t>重置暂存区的指定文件，与上一次commit保持一致，但工作区不变</a:t>
+            </a:r>
+            <a:r>
+              <a:rPr lang="en-US" dirty="0"/>
+              <a:t> $ </a:t>
+            </a:r>
+            <a:r>
+              <a:rPr lang="en-US" dirty="0" err="1"/>
+              <a:t>git</a:t>
+            </a:r>
+            <a:r>
+              <a:rPr lang="en-US" dirty="0"/>
+              <a:t> reset [file] # </a:t>
+            </a:r>
+            <a:r>
+              <a:rPr lang="en-US" dirty="0" err="1"/>
+              <a:t>重置暂存区与工作区，与上一次commit保持一致</a:t>
+            </a:r>
+            <a:r>
+              <a:rPr lang="en-US" dirty="0"/>
+              <a:t> $ </a:t>
+            </a:r>
+            <a:r>
+              <a:rPr lang="en-US" dirty="0" err="1"/>
+              <a:t>git</a:t>
+            </a:r>
+            <a:r>
+              <a:rPr lang="en-US" dirty="0"/>
+              <a:t> reset --hard # </a:t>
+            </a:r>
+            <a:r>
+              <a:rPr lang="en-US" dirty="0" err="1"/>
+              <a:t>重置当前分支的指针为指定commit，同时重置暂存区，但工作区不变</a:t>
+            </a:r>
+            <a:r>
+              <a:rPr lang="en-US" dirty="0"/>
+              <a:t> $ </a:t>
+            </a:r>
+            <a:r>
+              <a:rPr lang="en-US" dirty="0" err="1"/>
+              <a:t>git</a:t>
+            </a:r>
+            <a:r>
+              <a:rPr lang="en-US" dirty="0"/>
+              <a:t> reset [commit] # </a:t>
+            </a:r>
+            <a:r>
+              <a:rPr lang="en-US" dirty="0" err="1"/>
+              <a:t>重置当前分支的HEAD为指定commit，同时重置暂存区和工作区，与指定commit一致</a:t>
+            </a:r>
+            <a:r>
+              <a:rPr lang="en-US" dirty="0"/>
+              <a:t> $ </a:t>
+            </a:r>
+            <a:r>
+              <a:rPr lang="en-US" dirty="0" err="1"/>
+              <a:t>git</a:t>
+            </a:r>
+            <a:r>
+              <a:rPr lang="en-US" dirty="0"/>
+              <a:t> reset --hard [commit] # </a:t>
+            </a:r>
+            <a:r>
+              <a:rPr lang="en-US" dirty="0" err="1"/>
+              <a:t>重置当前HEAD为指定commit，但保持暂存区和工作区不变</a:t>
+            </a:r>
+            <a:r>
+              <a:rPr lang="en-US" dirty="0"/>
+              <a:t> $ </a:t>
+            </a:r>
+            <a:r>
+              <a:rPr lang="en-US" dirty="0" err="1"/>
+              <a:t>git</a:t>
+            </a:r>
+            <a:r>
+              <a:rPr lang="en-US" dirty="0"/>
+              <a:t> reset --keep [commit] # </a:t>
+            </a:r>
+            <a:r>
+              <a:rPr lang="en-US" dirty="0" err="1"/>
+              <a:t>新建一个commit，用来撤销指定commit</a:t>
+            </a:r>
+            <a:r>
+              <a:rPr lang="en-US" dirty="0"/>
+              <a:t> # 后者的所有变化都将被前者抵消，并且应用到当前分支 $ </a:t>
+            </a:r>
+            <a:r>
+              <a:rPr lang="en-US" dirty="0" err="1"/>
+              <a:t>git</a:t>
+            </a:r>
+            <a:r>
+              <a:rPr lang="en-US" dirty="0"/>
+              <a:t> revert [commit] # 暂时将未提交的变化移除，稍后再移入 $ </a:t>
+            </a:r>
+            <a:r>
+              <a:rPr lang="en-US" dirty="0" err="1"/>
+              <a:t>git</a:t>
+            </a:r>
+            <a:r>
+              <a:rPr lang="en-US" dirty="0"/>
+              <a:t> stash $ </a:t>
+            </a:r>
+            <a:r>
+              <a:rPr lang="en-US" dirty="0" err="1"/>
+              <a:t>git</a:t>
+            </a:r>
+            <a:r>
+              <a:rPr lang="en-US" dirty="0"/>
+              <a:t> stash pop</a:t>
+            </a:r>
+          </a:p>
+        </p:txBody>
+      </p:sp>
+    </p:spTree>
+    <p:extLst>
+      <p:ext uri="{BB962C8B-B14F-4D97-AF65-F5344CB8AC3E}">
+        <p14:creationId xmlns:p14="http://schemas.microsoft.com/office/powerpoint/2010/main" val="1476544542"/>
+      </p:ext>
+    </p:extLst>
+  </p:cSld>
+  <p:clrMapOvr>
+    <a:masterClrMapping/>
+  </p:clrMapOvr>
+  <p:timing>
+    <p:tnLst>
+      <p:par>
+        <p:cTn id="1" dur="indefinite" restart="never" nodeType="tmRoot"/>
+      </p:par>
+    </p:tnLst>
+  </p:timing>
+</p:sld>
+</file>
+
+<file path=ppt/slides/slide21.xml><?xml version="1.0" encoding="utf-8"?>
+<p:sld xmlns:a="http://schemas.openxmlformats.org/drawingml/2006/main" xmlns:r="http://schemas.openxmlformats.org/officeDocument/2006/relationships" xmlns:p="http://schemas.openxmlformats.org/presentationml/2006/main">
+  <p:cSld>
+    <p:spTree>
+      <p:nvGrpSpPr>
+        <p:cNvPr id="1" name=""/>
+        <p:cNvGrpSpPr/>
+        <p:nvPr/>
+      </p:nvGrpSpPr>
+      <p:grpSpPr>
+        <a:xfrm>
+          <a:off x="0" y="0"/>
+          <a:ext cx="0" cy="0"/>
+          <a:chOff x="0" y="0"/>
+          <a:chExt cx="0" cy="0"/>
+        </a:xfrm>
+      </p:grpSpPr>
+      <p:sp>
+        <p:nvSpPr>
+          <p:cNvPr id="4" name="Date Placeholder 3"/>
+          <p:cNvSpPr>
+            <a:spLocks noGrp="1"/>
+          </p:cNvSpPr>
+          <p:nvPr>
+            <p:ph type="dt" sz="half" idx="10"/>
+          </p:nvPr>
+        </p:nvSpPr>
+        <p:spPr/>
+        <p:txBody>
+          <a:bodyPr/>
+          <a:lstStyle/>
+          <a:p>
+            <a:r>
+              <a:rPr lang="en-US" altLang="ko-KR" dirty="0" err="1" smtClean="0"/>
+              <a:t>www.ooooo.com</a:t>
+            </a:r>
+            <a:endParaRPr lang="en-US" altLang="ko-KR" dirty="0"/>
+          </a:p>
+        </p:txBody>
+      </p:sp>
+      <p:sp>
+        <p:nvSpPr>
+          <p:cNvPr id="5" name="Footer Placeholder 4"/>
+          <p:cNvSpPr>
+            <a:spLocks noGrp="1"/>
+          </p:cNvSpPr>
+          <p:nvPr>
+            <p:ph type="ftr" sz="quarter" idx="11"/>
+          </p:nvPr>
+        </p:nvSpPr>
+        <p:spPr/>
+        <p:txBody>
+          <a:bodyPr/>
+          <a:lstStyle/>
+          <a:p>
+            <a:r>
+              <a:rPr lang="en-US" altLang="ko-KR"/>
+              <a:t>Company Logo</a:t>
+            </a:r>
+          </a:p>
+        </p:txBody>
+      </p:sp>
+      <p:sp>
+        <p:nvSpPr>
+          <p:cNvPr id="37890" name="Rectangle 2"/>
+          <p:cNvSpPr>
+            <a:spLocks noGrp="1" noChangeArrowheads="1"/>
+          </p:cNvSpPr>
+          <p:nvPr>
+            <p:ph type="title"/>
+          </p:nvPr>
+        </p:nvSpPr>
+        <p:spPr/>
+        <p:txBody>
+          <a:bodyPr/>
+          <a:lstStyle/>
+          <a:p>
+            <a:r>
               <a:rPr lang="zh-CN" altLang="en-US" b="0" dirty="0" smtClean="0"/>
               <a:t>常见问题</a:t>
             </a:r>
@@ -7307,9 +7478,10 @@
           <a:lstStyle/>
           <a:p>
             <a:r>
-              <a:rPr lang="zh-CN" altLang="en-US" b="0" dirty="0"/>
-              <a:t>新建分支</a:t>
-            </a:r>
+              <a:rPr lang="zh-CN" altLang="en-US" b="0" dirty="0" smtClean="0"/>
+              <a:t>克隆</a:t>
+            </a:r>
+            <a:endParaRPr lang="zh-CN" altLang="en-US" b="0" dirty="0"/>
           </a:p>
         </p:txBody>
       </p:sp>
@@ -7322,7 +7494,7 @@
         <p:spPr>
           <a:xfrm>
             <a:off x="250825" y="1143000"/>
-            <a:ext cx="8207375" cy="1754326"/>
+            <a:ext cx="8207375" cy="1200329"/>
           </a:xfrm>
           <a:prstGeom prst="rect">
             <a:avLst/>
@@ -7344,7 +7516,15 @@
             </a:br>
             <a:r>
               <a:rPr lang="en-US" dirty="0"/>
-              <a:t># 获取主干最新代码 </a:t>
+              <a:t># </a:t>
+            </a:r>
+            <a:r>
+              <a:rPr lang="zh-CN" altLang="en-US" dirty="0" smtClean="0"/>
+              <a:t>拷贝远程文件</a:t>
+            </a:r>
+            <a:r>
+              <a:rPr lang="en-US" dirty="0" smtClean="0"/>
+              <a:t> </a:t>
             </a:r>
             <a:endParaRPr lang="en-US" dirty="0" smtClean="0"/>
           </a:p>
@@ -7359,8 +7539,17 @@
             </a:r>
             <a:r>
               <a:rPr lang="en-US" dirty="0" smtClean="0"/>
-              <a:t> checkout master </a:t>
-            </a:r>
+              <a:t> </a:t>
+            </a:r>
+            <a:r>
+              <a:rPr lang="en-US" altLang="zh-CN" dirty="0" err="1" smtClean="0"/>
+              <a:t>config</a:t>
+            </a:r>
+            <a:r>
+              <a:rPr lang="en-US" dirty="0" smtClean="0"/>
+              <a:t> </a:t>
+            </a:r>
+            <a:endParaRPr lang="en-US" dirty="0" smtClean="0"/>
           </a:p>
           <a:p>
             <a:r>
@@ -7373,48 +7562,11 @@
             </a:r>
             <a:r>
               <a:rPr lang="en-US" dirty="0" smtClean="0"/>
-              <a:t> pull </a:t>
-            </a:r>
-          </a:p>
-          <a:p>
-            <a:r>
-              <a:rPr lang="en-US" dirty="0" smtClean="0"/>
-              <a:t># </a:t>
-            </a:r>
-            <a:r>
-              <a:rPr lang="en-US" dirty="0" err="1"/>
-              <a:t>新建一个开发分支myfeature</a:t>
-            </a:r>
-            <a:r>
-              <a:rPr lang="en-US" dirty="0"/>
               <a:t> </a:t>
             </a:r>
-            <a:endParaRPr lang="en-US" dirty="0" smtClean="0"/>
-          </a:p>
-          <a:p>
-            <a:r>
-              <a:rPr lang="en-US" dirty="0" smtClean="0"/>
-              <a:t>$ </a:t>
-            </a:r>
-            <a:r>
-              <a:rPr lang="en-US" dirty="0" err="1" smtClean="0"/>
-              <a:t>git</a:t>
-            </a:r>
-            <a:r>
-              <a:rPr lang="en-US" dirty="0" smtClean="0"/>
-              <a:t> checkout </a:t>
-            </a:r>
-            <a:r>
-              <a:rPr lang="en-US" dirty="0"/>
-              <a:t>-</a:t>
-            </a:r>
-            <a:r>
-              <a:rPr lang="en-US" dirty="0" smtClean="0"/>
-              <a:t>b </a:t>
-            </a:r>
-            <a:r>
-              <a:rPr lang="en-US" dirty="0" err="1" smtClean="0"/>
-              <a:t>myfeature</a:t>
+            <a:r>
+              <a:rPr lang="en-US" altLang="zh-CN" dirty="0" smtClean="0"/>
+              <a:t>clone</a:t>
             </a:r>
             <a:endParaRPr lang="en-US" dirty="0"/>
           </a:p>
@@ -7518,10 +7670,9 @@
           <a:lstStyle/>
           <a:p>
             <a:r>
-              <a:rPr lang="en-US" b="0" dirty="0" smtClean="0"/>
-              <a:t>提交分支</a:t>
-            </a:r>
-            <a:endParaRPr lang="en-US" b="0" dirty="0"/>
+              <a:rPr lang="zh-CN" altLang="en-US" b="0" dirty="0"/>
+              <a:t>新建分支</a:t>
+            </a:r>
           </a:p>
         </p:txBody>
       </p:sp>
@@ -7534,7 +7685,7 @@
         <p:spPr>
           <a:xfrm>
             <a:off x="250825" y="1143000"/>
-            <a:ext cx="8207375" cy="923330"/>
+            <a:ext cx="8207375" cy="1754326"/>
           </a:xfrm>
           <a:prstGeom prst="rect">
             <a:avLst/>
@@ -7548,6 +7699,20 @@
           <a:lstStyle/>
           <a:p>
             <a:r>
+              <a:rPr lang="en-US" dirty="0"/>
+              <a:t/>
+            </a:r>
+            <a:br>
+              <a:rPr lang="en-US" dirty="0"/>
+            </a:br>
+            <a:r>
+              <a:rPr lang="en-US" dirty="0"/>
+              <a:t># 获取主干最新代码 </a:t>
+            </a:r>
+            <a:endParaRPr lang="en-US" dirty="0" smtClean="0"/>
+          </a:p>
+          <a:p>
+            <a:r>
               <a:rPr lang="en-US" dirty="0" smtClean="0"/>
               <a:t>$ </a:t>
             </a:r>
@@ -7557,23 +7722,7 @@
             </a:r>
             <a:r>
               <a:rPr lang="en-US" dirty="0" smtClean="0"/>
-              <a:t> add </a:t>
-            </a:r>
-            <a:r>
-              <a:rPr lang="en-US" dirty="0"/>
-              <a:t>--</a:t>
-            </a:r>
-            <a:r>
-              <a:rPr lang="en-US" dirty="0" smtClean="0"/>
-              <a:t>all / $ </a:t>
-            </a:r>
-            <a:r>
-              <a:rPr lang="en-US" dirty="0" err="1" smtClean="0"/>
-              <a:t>git</a:t>
-            </a:r>
-            <a:r>
-              <a:rPr lang="en-US" dirty="0" smtClean="0"/>
-              <a:t> add .</a:t>
+              <a:t> checkout master </a:t>
             </a:r>
           </a:p>
           <a:p>
@@ -7587,8 +7736,23 @@
             </a:r>
             <a:r>
               <a:rPr lang="en-US" dirty="0" smtClean="0"/>
-              <a:t> status </a:t>
-            </a:r>
+              <a:t> pull </a:t>
+            </a:r>
+          </a:p>
+          <a:p>
+            <a:r>
+              <a:rPr lang="en-US" dirty="0" smtClean="0"/>
+              <a:t># </a:t>
+            </a:r>
+            <a:r>
+              <a:rPr lang="en-US" dirty="0" err="1"/>
+              <a:t>新建一个开发分支myfeature</a:t>
+            </a:r>
+            <a:r>
+              <a:rPr lang="en-US" dirty="0"/>
+              <a:t> </a:t>
+            </a:r>
+            <a:endParaRPr lang="en-US" dirty="0" smtClean="0"/>
           </a:p>
           <a:p>
             <a:r>
@@ -7601,15 +7765,19 @@
             </a:r>
             <a:r>
               <a:rPr lang="en-US" dirty="0" smtClean="0"/>
-              <a:t> commit </a:t>
-            </a:r>
-            <a:r>
-              <a:rPr lang="en-US" dirty="0"/>
-              <a:t>--</a:t>
+              <a:t> checkout </a:t>
+            </a:r>
+            <a:r>
+              <a:rPr lang="en-US" dirty="0"/>
+              <a:t>-</a:t>
             </a:r>
             <a:r>
               <a:rPr lang="en-US" dirty="0" smtClean="0"/>
-              <a:t>verbose</a:t>
+              <a:t>b </a:t>
+            </a:r>
+            <a:r>
+              <a:rPr lang="en-US" dirty="0" err="1" smtClean="0"/>
+              <a:t>myfeature</a:t>
             </a:r>
             <a:endParaRPr lang="en-US" dirty="0"/>
           </a:p>
@@ -7618,7 +7786,7 @@
     </p:spTree>
     <p:extLst>
       <p:ext uri="{BB962C8B-B14F-4D97-AF65-F5344CB8AC3E}">
-        <p14:creationId xmlns:p14="http://schemas.microsoft.com/office/powerpoint/2010/main" val="1354228660"/>
+        <p14:creationId xmlns:p14="http://schemas.microsoft.com/office/powerpoint/2010/main" val="481268504"/>
       </p:ext>
     </p:extLst>
   </p:cSld>
@@ -7713,9 +7881,10 @@
           <a:lstStyle/>
           <a:p>
             <a:r>
-              <a:rPr lang="zh-CN" altLang="en-US" b="0" dirty="0"/>
-              <a:t>撰写提交信息</a:t>
-            </a:r>
+              <a:rPr lang="en-US" b="0" dirty="0" smtClean="0"/>
+              <a:t>提交分支</a:t>
+            </a:r>
+            <a:endParaRPr lang="en-US" b="0" dirty="0"/>
           </a:p>
         </p:txBody>
       </p:sp>
@@ -7728,7 +7897,7 @@
         <p:spPr>
           <a:xfrm>
             <a:off x="250825" y="1143000"/>
-            <a:ext cx="8207375" cy="3416320"/>
+            <a:ext cx="8207375" cy="923330"/>
           </a:xfrm>
           <a:prstGeom prst="rect">
             <a:avLst/>
@@ -7742,271 +7911,68 @@
           <a:lstStyle/>
           <a:p>
             <a:r>
-              <a:rPr lang="zh-CN" altLang="en-US" dirty="0" smtClean="0"/>
-              <a:t>用不超过</a:t>
-            </a:r>
-            <a:r>
-              <a:rPr lang="en-US" altLang="zh-CN" dirty="0" smtClean="0"/>
-              <a:t>50</a:t>
-            </a:r>
-            <a:r>
-              <a:rPr lang="zh-CN" altLang="en-US" dirty="0" smtClean="0"/>
-              <a:t>个字简述一下有哪些改变 如果必要的话，写更多的细节。每行不要超过</a:t>
-            </a:r>
-            <a:r>
-              <a:rPr lang="en-US" altLang="zh-CN" dirty="0" smtClean="0"/>
-              <a:t>72</a:t>
-            </a:r>
-            <a:r>
-              <a:rPr lang="zh-CN" altLang="en-US" dirty="0" smtClean="0"/>
-              <a:t>个字。第一行被视为 </a:t>
-            </a:r>
-            <a:r>
-              <a:rPr lang="en-US" altLang="zh-CN" dirty="0" smtClean="0"/>
-              <a:t>commit </a:t>
-            </a:r>
-            <a:r>
-              <a:rPr lang="zh-CN" altLang="en-US" dirty="0" smtClean="0"/>
-              <a:t>信息以及余下正文的主题。空行分开标题和正文是非常必要的</a:t>
-            </a:r>
-            <a:r>
-              <a:rPr lang="en-US" altLang="zh-CN" dirty="0" smtClean="0"/>
-              <a:t>(</a:t>
-            </a:r>
-            <a:r>
-              <a:rPr lang="zh-CN" altLang="en-US" dirty="0" smtClean="0"/>
-              <a:t>除非你不写正文</a:t>
-            </a:r>
-            <a:r>
-              <a:rPr lang="en-US" altLang="zh-CN" dirty="0" smtClean="0"/>
-              <a:t>);</a:t>
-            </a:r>
-            <a:endParaRPr lang="zh-CN" altLang="en-US" dirty="0" smtClean="0"/>
-          </a:p>
-          <a:p>
-            <a:endParaRPr lang="zh-CN" altLang="en-US" dirty="0"/>
-          </a:p>
-          <a:p>
-            <a:r>
-              <a:rPr lang="zh-CN" altLang="en-US" dirty="0" smtClean="0"/>
-              <a:t>解释一下这个</a:t>
-            </a:r>
-            <a:r>
-              <a:rPr lang="en-US" altLang="zh-CN" dirty="0" smtClean="0"/>
-              <a:t>commit</a:t>
-            </a:r>
-            <a:r>
-              <a:rPr lang="zh-CN" altLang="en-US" dirty="0" smtClean="0"/>
-              <a:t>解决了什么问题。专注于为什么这么做而不是怎么做的（代码已经解释了）。这个改变是否有副作用或其他不直观的后果。这里就是解释这些事情的地方。 空行之后还有段落。 </a:t>
-            </a:r>
-            <a:r>
-              <a:rPr lang="en-US" altLang="zh-CN" dirty="0" smtClean="0"/>
-              <a:t>- </a:t>
-            </a:r>
-            <a:r>
-              <a:rPr lang="zh-CN" altLang="en-US" dirty="0" smtClean="0"/>
-              <a:t>要点符号也是可以的 </a:t>
-            </a:r>
-            <a:r>
-              <a:rPr lang="en-US" altLang="zh-CN" dirty="0" smtClean="0"/>
-              <a:t>- </a:t>
-            </a:r>
-            <a:r>
-              <a:rPr lang="zh-CN" altLang="en-US" dirty="0" smtClean="0"/>
-              <a:t>通常用连字符，星号来表示要点符号。用一个空格起头，用空行隔开，当然，惯例没有这么详细 </a:t>
-            </a:r>
-          </a:p>
-          <a:p>
-            <a:endParaRPr lang="zh-CN" altLang="en-US" dirty="0"/>
-          </a:p>
-          <a:p>
-            <a:r>
-              <a:rPr lang="zh-CN" altLang="en-US" dirty="0" smtClean="0"/>
-              <a:t>如果你用了 </a:t>
-            </a:r>
-            <a:r>
-              <a:rPr lang="en-US" altLang="zh-CN" dirty="0" smtClean="0"/>
-              <a:t>issue tracker</a:t>
-            </a:r>
-            <a:r>
-              <a:rPr lang="zh-CN" altLang="en-US" dirty="0" smtClean="0"/>
-              <a:t>， 把这些引用放在底部，就像这样： 解决了：</a:t>
-            </a:r>
-            <a:r>
-              <a:rPr lang="en-US" altLang="zh-CN" dirty="0" smtClean="0"/>
-              <a:t>#123 </a:t>
-            </a:r>
-            <a:r>
-              <a:rPr lang="zh-CN" altLang="en-US" dirty="0" smtClean="0"/>
-              <a:t>参考： </a:t>
-            </a:r>
-            <a:r>
-              <a:rPr lang="en-US" altLang="zh-CN" dirty="0" smtClean="0"/>
-              <a:t>#456, #789</a:t>
-            </a:r>
-          </a:p>
-          <a:p>
-            <a:endParaRPr lang="zh-CN" altLang="en-US" dirty="0"/>
-          </a:p>
-        </p:txBody>
-      </p:sp>
-      <p:sp>
-        <p:nvSpPr>
-          <p:cNvPr id="2" name="TextBox 1"/>
-          <p:cNvSpPr txBox="1"/>
-          <p:nvPr/>
-        </p:nvSpPr>
-        <p:spPr>
-          <a:xfrm>
-            <a:off x="250825" y="4349629"/>
-            <a:ext cx="5692775" cy="646331"/>
-          </a:xfrm>
-          <a:prstGeom prst="rect">
-            <a:avLst/>
-          </a:prstGeom>
-          <a:noFill/>
-        </p:spPr>
-        <p:txBody>
-          <a:bodyPr wrap="square" rtlCol="0">
-            <a:spAutoFit/>
-          </a:bodyPr>
-          <a:lstStyle/>
-          <a:p>
+              <a:rPr lang="en-US" dirty="0" smtClean="0"/>
+              <a:t>$ </a:t>
+            </a:r>
             <a:r>
               <a:rPr lang="en-US" dirty="0" err="1" smtClean="0"/>
               <a:t>git</a:t>
             </a:r>
             <a:r>
               <a:rPr lang="en-US" dirty="0" smtClean="0"/>
-              <a:t> log --</a:t>
+              <a:t> add </a:t>
+            </a:r>
+            <a:r>
+              <a:rPr lang="en-US" dirty="0"/>
+              <a:t>--</a:t>
+            </a:r>
+            <a:r>
+              <a:rPr lang="en-US" dirty="0" smtClean="0"/>
+              <a:t>all / $ </a:t>
             </a:r>
             <a:r>
               <a:rPr lang="en-US" dirty="0" err="1" smtClean="0"/>
-              <a:t>oneline</a:t>
-            </a:r>
-            <a:r>
-              <a:rPr lang="en-US" dirty="0"/>
-              <a:t>， </a:t>
+              <a:t>git</a:t>
             </a:r>
             <a:r>
               <a:rPr lang="en-US" dirty="0" smtClean="0"/>
-              <a:t>只输出主题行</a:t>
-            </a:r>
-            <a:endParaRPr lang="zh-CN" altLang="en-US" dirty="0" smtClean="0"/>
-          </a:p>
-          <a:p>
-            <a:r>
-              <a:rPr lang="en-US" altLang="zh-CN" dirty="0" err="1" smtClean="0"/>
-              <a:t>git</a:t>
-            </a:r>
-            <a:r>
-              <a:rPr lang="en-US" altLang="zh-CN" dirty="0" smtClean="0"/>
-              <a:t> </a:t>
-            </a:r>
-            <a:r>
-              <a:rPr lang="en-US" altLang="zh-CN" dirty="0" err="1" smtClean="0"/>
-              <a:t>shortlog</a:t>
-            </a:r>
-            <a:r>
-              <a:rPr lang="en-US" altLang="zh-CN" dirty="0"/>
-              <a:t>, </a:t>
-            </a:r>
-            <a:r>
-              <a:rPr lang="zh-CN" altLang="en-US" dirty="0"/>
-              <a:t>按照贡献者分组，按行输出主题</a:t>
-            </a:r>
-            <a:endParaRPr lang="en-US" dirty="0"/>
-          </a:p>
-        </p:txBody>
-      </p:sp>
-      <p:sp>
-        <p:nvSpPr>
-          <p:cNvPr id="6" name="TextBox 5"/>
-          <p:cNvSpPr txBox="1"/>
-          <p:nvPr/>
-        </p:nvSpPr>
-        <p:spPr>
-          <a:xfrm>
-            <a:off x="327025" y="5117030"/>
-            <a:ext cx="5387975" cy="1200329"/>
-          </a:xfrm>
-          <a:prstGeom prst="rect">
-            <a:avLst/>
-          </a:prstGeom>
-          <a:noFill/>
-        </p:spPr>
-        <p:txBody>
-          <a:bodyPr wrap="square" rtlCol="0">
-            <a:spAutoFit/>
-          </a:bodyPr>
-          <a:lstStyle/>
-          <a:p>
-            <a:r>
-              <a:rPr lang="zh-TW" altLang="en-US" dirty="0"/>
-              <a:t>小技巧： </a:t>
-            </a:r>
-            <a:endParaRPr lang="zh-CN" altLang="en-US" dirty="0" smtClean="0"/>
-          </a:p>
-          <a:p>
-            <a:r>
-              <a:rPr lang="zh-CN" altLang="en-US" dirty="0"/>
-              <a:t>如果</a:t>
-            </a:r>
-            <a:r>
-              <a:rPr lang="zh-CN" altLang="en-US" dirty="0" smtClean="0"/>
-              <a:t>你发现写</a:t>
-            </a:r>
-            <a:r>
-              <a:rPr lang="en-US" altLang="zh-CN" dirty="0" smtClean="0"/>
-              <a:t>commit</a:t>
-            </a:r>
-            <a:r>
-              <a:rPr lang="zh-CN" altLang="en-US" dirty="0" smtClean="0"/>
-              <a:t>很困难</a:t>
-            </a:r>
-            <a:r>
-              <a:rPr lang="en-US" altLang="zh-CN" dirty="0" smtClean="0"/>
-              <a:t>,</a:t>
-            </a:r>
-            <a:r>
-              <a:rPr lang="zh-CN" altLang="en-US" dirty="0" smtClean="0"/>
-              <a:t>可能</a:t>
-            </a:r>
-            <a:r>
-              <a:rPr lang="zh-CN" altLang="en-US" dirty="0"/>
-              <a:t>是因为你一次 </a:t>
-            </a:r>
-            <a:r>
-              <a:rPr lang="en-US" altLang="zh-CN" dirty="0"/>
-              <a:t>commit </a:t>
-            </a:r>
-            <a:r>
-              <a:rPr lang="zh-CN" altLang="en-US" dirty="0"/>
-              <a:t>太多改动了。尽可能</a:t>
-            </a:r>
-            <a:r>
-              <a:rPr lang="zh-CN" altLang="en-US" dirty="0" smtClean="0"/>
-              <a:t>做到</a:t>
-            </a:r>
-            <a:r>
-              <a:rPr lang="en-US" altLang="zh-CN" dirty="0" smtClean="0"/>
-              <a:t> (</a:t>
-            </a:r>
-            <a:r>
-              <a:rPr lang="zh-CN" altLang="en-US" dirty="0"/>
-              <a:t>每次</a:t>
-            </a:r>
-            <a:r>
-              <a:rPr lang="en-US" altLang="zh-CN" dirty="0"/>
-              <a:t>post</a:t>
-            </a:r>
-            <a:r>
-              <a:rPr lang="zh-CN" altLang="en-US" dirty="0"/>
-              <a:t>一个主题</a:t>
-            </a:r>
-            <a:r>
-              <a:rPr lang="en-US" altLang="zh-CN" dirty="0"/>
-              <a:t>)</a:t>
+              <a:t> add .</a:t>
+            </a:r>
+          </a:p>
+          <a:p>
+            <a:r>
+              <a:rPr lang="en-US" dirty="0" smtClean="0"/>
+              <a:t>$ </a:t>
+            </a:r>
+            <a:r>
+              <a:rPr lang="en-US" dirty="0" err="1" smtClean="0"/>
+              <a:t>git</a:t>
+            </a:r>
+            <a:r>
+              <a:rPr lang="en-US" dirty="0" smtClean="0"/>
+              <a:t> status </a:t>
+            </a:r>
+          </a:p>
+          <a:p>
+            <a:r>
+              <a:rPr lang="en-US" dirty="0" smtClean="0"/>
+              <a:t>$ </a:t>
+            </a:r>
+            <a:r>
+              <a:rPr lang="en-US" dirty="0" err="1" smtClean="0"/>
+              <a:t>git</a:t>
+            </a:r>
+            <a:r>
+              <a:rPr lang="en-US" dirty="0" smtClean="0"/>
+              <a:t> commit </a:t>
+            </a:r>
+            <a:r>
+              <a:rPr lang="en-US" dirty="0"/>
+              <a:t>--</a:t>
+            </a:r>
+            <a:r>
+              <a:rPr lang="en-US" dirty="0" smtClean="0"/>
+              <a:t>verbose</a:t>
             </a:r>
             <a:endParaRPr lang="en-US" dirty="0"/>
           </a:p>
@@ -8015,7 +7981,7 @@
     </p:spTree>
     <p:extLst>
       <p:ext uri="{BB962C8B-B14F-4D97-AF65-F5344CB8AC3E}">
-        <p14:creationId xmlns:p14="http://schemas.microsoft.com/office/powerpoint/2010/main" val="1080068454"/>
+        <p14:creationId xmlns:p14="http://schemas.microsoft.com/office/powerpoint/2010/main" val="1354228660"/>
       </p:ext>
     </p:extLst>
   </p:cSld>
@@ -8110,20 +8076,8 @@
           <a:lstStyle/>
           <a:p>
             <a:r>
-              <a:rPr lang="zh-CN" altLang="en-US" b="0" dirty="0" smtClean="0">
-                <a:latin typeface="Arial Narrow" charset="0"/>
-                <a:ea typeface="Arial Narrow" charset="0"/>
-                <a:cs typeface="Arial Narrow" charset="0"/>
-              </a:rPr>
-              <a:t>与</a:t>
-            </a:r>
-            <a:r>
-              <a:rPr lang="zh-CN" altLang="en-US" b="0" dirty="0">
-                <a:latin typeface="Arial Narrow" charset="0"/>
-                <a:ea typeface="Arial Narrow" charset="0"/>
-                <a:cs typeface="Arial Narrow" charset="0"/>
-              </a:rPr>
-              <a:t>主干同步</a:t>
+              <a:rPr lang="zh-CN" altLang="en-US" b="0" dirty="0"/>
+              <a:t>撰写提交信息</a:t>
             </a:r>
           </a:p>
         </p:txBody>
@@ -8137,7 +8091,7 @@
         <p:spPr>
           <a:xfrm>
             <a:off x="250825" y="1143000"/>
-            <a:ext cx="8207375" cy="646331"/>
+            <a:ext cx="8207375" cy="3416320"/>
           </a:xfrm>
           <a:prstGeom prst="rect">
             <a:avLst/>
@@ -8151,39 +8105,271 @@
           <a:lstStyle/>
           <a:p>
             <a:r>
+              <a:rPr lang="zh-CN" altLang="en-US" dirty="0" smtClean="0"/>
+              <a:t>用不超过</a:t>
+            </a:r>
+            <a:r>
+              <a:rPr lang="en-US" altLang="zh-CN" dirty="0" smtClean="0"/>
+              <a:t>50</a:t>
+            </a:r>
+            <a:r>
+              <a:rPr lang="zh-CN" altLang="en-US" dirty="0" smtClean="0"/>
+              <a:t>个字简述一下有哪些改变 如果必要的话，写更多的细节。每行不要超过</a:t>
+            </a:r>
+            <a:r>
+              <a:rPr lang="en-US" altLang="zh-CN" dirty="0" smtClean="0"/>
+              <a:t>72</a:t>
+            </a:r>
+            <a:r>
+              <a:rPr lang="zh-CN" altLang="en-US" dirty="0" smtClean="0"/>
+              <a:t>个字。第一行被视为 </a:t>
+            </a:r>
+            <a:r>
+              <a:rPr lang="en-US" altLang="zh-CN" dirty="0" smtClean="0"/>
+              <a:t>commit </a:t>
+            </a:r>
+            <a:r>
+              <a:rPr lang="zh-CN" altLang="en-US" dirty="0" smtClean="0"/>
+              <a:t>信息以及余下正文的主题。空行分开标题和正文是非常必要的</a:t>
+            </a:r>
+            <a:r>
+              <a:rPr lang="en-US" altLang="zh-CN" dirty="0" smtClean="0"/>
+              <a:t>(</a:t>
+            </a:r>
+            <a:r>
+              <a:rPr lang="zh-CN" altLang="en-US" dirty="0" smtClean="0"/>
+              <a:t>除非你不写正文</a:t>
+            </a:r>
+            <a:r>
+              <a:rPr lang="en-US" altLang="zh-CN" dirty="0" smtClean="0"/>
+              <a:t>);</a:t>
+            </a:r>
+            <a:endParaRPr lang="zh-CN" altLang="en-US" dirty="0" smtClean="0"/>
+          </a:p>
+          <a:p>
+            <a:endParaRPr lang="zh-CN" altLang="en-US" dirty="0"/>
+          </a:p>
+          <a:p>
+            <a:r>
+              <a:rPr lang="zh-CN" altLang="en-US" dirty="0" smtClean="0"/>
+              <a:t>解释一下这个</a:t>
+            </a:r>
+            <a:r>
+              <a:rPr lang="en-US" altLang="zh-CN" dirty="0" smtClean="0"/>
+              <a:t>commit</a:t>
+            </a:r>
+            <a:r>
+              <a:rPr lang="zh-CN" altLang="en-US" dirty="0" smtClean="0"/>
+              <a:t>解决了什么问题。专注于为什么这么做而不是怎么做的（代码已经解释了）。这个改变是否有副作用或其他不直观的后果。这里就是解释这些事情的地方。 空行之后还有段落。 </a:t>
+            </a:r>
+            <a:r>
+              <a:rPr lang="en-US" altLang="zh-CN" dirty="0" smtClean="0"/>
+              <a:t>- </a:t>
+            </a:r>
+            <a:r>
+              <a:rPr lang="zh-CN" altLang="en-US" dirty="0" smtClean="0"/>
+              <a:t>要点符号也是可以的 </a:t>
+            </a:r>
+            <a:r>
+              <a:rPr lang="en-US" altLang="zh-CN" dirty="0" smtClean="0"/>
+              <a:t>- </a:t>
+            </a:r>
+            <a:r>
+              <a:rPr lang="zh-CN" altLang="en-US" dirty="0" smtClean="0"/>
+              <a:t>通常用连字符，星号来表示要点符号。用一个空格起头，用空行隔开，当然，惯例没有这么详细 </a:t>
+            </a:r>
+          </a:p>
+          <a:p>
+            <a:endParaRPr lang="zh-CN" altLang="en-US" dirty="0"/>
+          </a:p>
+          <a:p>
+            <a:r>
+              <a:rPr lang="zh-CN" altLang="en-US" dirty="0" smtClean="0"/>
+              <a:t>如果你用了 </a:t>
+            </a:r>
+            <a:r>
+              <a:rPr lang="en-US" altLang="zh-CN" dirty="0" smtClean="0"/>
+              <a:t>issue tracker</a:t>
+            </a:r>
+            <a:r>
+              <a:rPr lang="zh-CN" altLang="en-US" dirty="0" smtClean="0"/>
+              <a:t>， 把这些引用放在底部，就像这样： 解决了：</a:t>
+            </a:r>
+            <a:r>
+              <a:rPr lang="en-US" altLang="zh-CN" dirty="0" smtClean="0"/>
+              <a:t>#123 </a:t>
+            </a:r>
+            <a:r>
+              <a:rPr lang="zh-CN" altLang="en-US" dirty="0" smtClean="0"/>
+              <a:t>参考： </a:t>
+            </a:r>
+            <a:r>
+              <a:rPr lang="en-US" altLang="zh-CN" dirty="0" smtClean="0"/>
+              <a:t>#456, #789</a:t>
+            </a:r>
+          </a:p>
+          <a:p>
+            <a:endParaRPr lang="zh-CN" altLang="en-US" dirty="0"/>
+          </a:p>
+        </p:txBody>
+      </p:sp>
+      <p:sp>
+        <p:nvSpPr>
+          <p:cNvPr id="2" name="TextBox 1"/>
+          <p:cNvSpPr txBox="1"/>
+          <p:nvPr/>
+        </p:nvSpPr>
+        <p:spPr>
+          <a:xfrm>
+            <a:off x="250825" y="4349629"/>
+            <a:ext cx="5692775" cy="646331"/>
+          </a:xfrm>
+          <a:prstGeom prst="rect">
+            <a:avLst/>
+          </a:prstGeom>
+          <a:noFill/>
+        </p:spPr>
+        <p:txBody>
+          <a:bodyPr wrap="square" rtlCol="0">
+            <a:spAutoFit/>
+          </a:bodyPr>
+          <a:lstStyle/>
+          <a:p>
+            <a:r>
+              <a:rPr lang="en-US" dirty="0" err="1" smtClean="0"/>
+              <a:t>git</a:t>
+            </a:r>
+            <a:r>
               <a:rPr lang="en-US" dirty="0" smtClean="0"/>
-              <a:t>$ </a:t>
+              <a:t> log --</a:t>
             </a:r>
             <a:r>
               <a:rPr lang="en-US" dirty="0" err="1" smtClean="0"/>
-              <a:t>git</a:t>
+              <a:t>oneline</a:t>
+            </a:r>
+            <a:r>
+              <a:rPr lang="en-US" dirty="0"/>
+              <a:t>， </a:t>
             </a:r>
             <a:r>
               <a:rPr lang="en-US" dirty="0" smtClean="0"/>
-              <a:t> fetch origin </a:t>
-            </a:r>
-            <a:endParaRPr lang="zh-CN" altLang="en-US" dirty="0"/>
-          </a:p>
-          <a:p>
-            <a:r>
-              <a:rPr lang="en-US" dirty="0" smtClean="0"/>
-              <a:t>$ </a:t>
-            </a:r>
-            <a:r>
-              <a:rPr lang="en-US" dirty="0" err="1" smtClean="0"/>
-              <a:t>git</a:t>
-            </a:r>
-            <a:r>
-              <a:rPr lang="en-US" dirty="0" smtClean="0"/>
-              <a:t> rebase origin</a:t>
-            </a:r>
-            <a:r>
-              <a:rPr lang="en-US" dirty="0"/>
-              <a:t>/</a:t>
-            </a:r>
-            <a:r>
-              <a:rPr lang="en-US" dirty="0" smtClean="0"/>
-              <a:t>master</a:t>
+              <a:t>只输出主题行</a:t>
+            </a:r>
+            <a:endParaRPr lang="zh-CN" altLang="en-US" dirty="0" smtClean="0"/>
+          </a:p>
+          <a:p>
+            <a:r>
+              <a:rPr lang="en-US" altLang="zh-CN" dirty="0" err="1" smtClean="0"/>
+              <a:t>git</a:t>
+            </a:r>
+            <a:r>
+              <a:rPr lang="en-US" altLang="zh-CN" dirty="0" smtClean="0"/>
+              <a:t> </a:t>
+            </a:r>
+            <a:r>
+              <a:rPr lang="en-US" altLang="zh-CN" dirty="0" err="1" smtClean="0"/>
+              <a:t>shortlog</a:t>
+            </a:r>
+            <a:r>
+              <a:rPr lang="en-US" altLang="zh-CN" dirty="0"/>
+              <a:t>, </a:t>
+            </a:r>
+            <a:r>
+              <a:rPr lang="zh-CN" altLang="en-US" dirty="0"/>
+              <a:t>按照贡献者分组，按行输出主题</a:t>
+            </a:r>
+            <a:endParaRPr lang="en-US" dirty="0"/>
+          </a:p>
+        </p:txBody>
+      </p:sp>
+      <p:sp>
+        <p:nvSpPr>
+          <p:cNvPr id="6" name="TextBox 5"/>
+          <p:cNvSpPr txBox="1"/>
+          <p:nvPr/>
+        </p:nvSpPr>
+        <p:spPr>
+          <a:xfrm>
+            <a:off x="327025" y="5117030"/>
+            <a:ext cx="5387975" cy="1200329"/>
+          </a:xfrm>
+          <a:prstGeom prst="rect">
+            <a:avLst/>
+          </a:prstGeom>
+          <a:noFill/>
+        </p:spPr>
+        <p:txBody>
+          <a:bodyPr wrap="square" rtlCol="0">
+            <a:spAutoFit/>
+          </a:bodyPr>
+          <a:lstStyle/>
+          <a:p>
+            <a:r>
+              <a:rPr lang="zh-TW" altLang="en-US" dirty="0"/>
+              <a:t>小技巧： </a:t>
+            </a:r>
+            <a:endParaRPr lang="zh-CN" altLang="en-US" dirty="0" smtClean="0"/>
+          </a:p>
+          <a:p>
+            <a:r>
+              <a:rPr lang="zh-CN" altLang="en-US" dirty="0"/>
+              <a:t>如果</a:t>
+            </a:r>
+            <a:r>
+              <a:rPr lang="zh-CN" altLang="en-US" dirty="0" smtClean="0"/>
+              <a:t>你发现写</a:t>
+            </a:r>
+            <a:r>
+              <a:rPr lang="en-US" altLang="zh-CN" dirty="0" smtClean="0"/>
+              <a:t>commit</a:t>
+            </a:r>
+            <a:r>
+              <a:rPr lang="zh-CN" altLang="en-US" dirty="0" smtClean="0"/>
+              <a:t>很困难</a:t>
+            </a:r>
+            <a:r>
+              <a:rPr lang="en-US" altLang="zh-CN" dirty="0" smtClean="0"/>
+              <a:t>,</a:t>
+            </a:r>
+            <a:r>
+              <a:rPr lang="zh-CN" altLang="en-US" dirty="0" smtClean="0"/>
+              <a:t>可能</a:t>
+            </a:r>
+            <a:r>
+              <a:rPr lang="zh-CN" altLang="en-US" dirty="0"/>
+              <a:t>是因为你一次 </a:t>
+            </a:r>
+            <a:r>
+              <a:rPr lang="en-US" altLang="zh-CN" dirty="0"/>
+              <a:t>commit </a:t>
+            </a:r>
+            <a:r>
+              <a:rPr lang="zh-CN" altLang="en-US" dirty="0"/>
+              <a:t>太多改动了。尽可能</a:t>
+            </a:r>
+            <a:r>
+              <a:rPr lang="zh-CN" altLang="en-US" dirty="0" smtClean="0"/>
+              <a:t>做到</a:t>
+            </a:r>
+            <a:r>
+              <a:rPr lang="en-US" altLang="zh-CN" dirty="0" smtClean="0"/>
+              <a:t> (</a:t>
+            </a:r>
+            <a:r>
+              <a:rPr lang="zh-CN" altLang="en-US" dirty="0"/>
+              <a:t>每次</a:t>
+            </a:r>
+            <a:r>
+              <a:rPr lang="en-US" altLang="zh-CN" dirty="0"/>
+              <a:t>post</a:t>
+            </a:r>
+            <a:r>
+              <a:rPr lang="zh-CN" altLang="en-US" dirty="0"/>
+              <a:t>一个主题</a:t>
+            </a:r>
+            <a:r>
+              <a:rPr lang="en-US" altLang="zh-CN" dirty="0"/>
+              <a:t>)</a:t>
             </a:r>
             <a:endParaRPr lang="en-US" dirty="0"/>
           </a:p>
@@ -8192,7 +8378,7 @@
     </p:spTree>
     <p:extLst>
       <p:ext uri="{BB962C8B-B14F-4D97-AF65-F5344CB8AC3E}">
-        <p14:creationId xmlns:p14="http://schemas.microsoft.com/office/powerpoint/2010/main" val="199740011"/>
+        <p14:creationId xmlns:p14="http://schemas.microsoft.com/office/powerpoint/2010/main" val="1080068454"/>
       </p:ext>
     </p:extLst>
   </p:cSld>
@@ -8287,10 +8473,21 @@
           <a:lstStyle/>
           <a:p>
             <a:r>
-              <a:rPr lang="en-US" b="0" dirty="0" err="1"/>
-              <a:t>合并commit</a:t>
-            </a:r>
-            <a:endParaRPr lang="en-US" b="0" dirty="0"/>
+              <a:rPr lang="zh-CN" altLang="en-US" b="0" dirty="0" smtClean="0">
+                <a:latin typeface="Arial Narrow" charset="0"/>
+                <a:ea typeface="Arial Narrow" charset="0"/>
+                <a:cs typeface="Arial Narrow" charset="0"/>
+              </a:rPr>
+              <a:t>与</a:t>
+            </a:r>
+            <a:r>
+              <a:rPr lang="zh-CN" altLang="en-US" b="0" dirty="0">
+                <a:latin typeface="Arial Narrow" charset="0"/>
+                <a:ea typeface="Arial Narrow" charset="0"/>
+                <a:cs typeface="Arial Narrow" charset="0"/>
+              </a:rPr>
+              <a:t>主干同步</a:t>
+            </a:r>
           </a:p>
         </p:txBody>
       </p:sp>
@@ -8303,7 +8500,7 @@
         <p:spPr>
           <a:xfrm>
             <a:off x="250825" y="1143000"/>
-            <a:ext cx="8207375" cy="369332"/>
+            <a:ext cx="8207375" cy="646331"/>
           </a:xfrm>
           <a:prstGeom prst="rect">
             <a:avLst/>
@@ -8326,19 +8523,22 @@
             </a:r>
             <a:r>
               <a:rPr lang="en-US" dirty="0" smtClean="0"/>
-              <a:t> rebase </a:t>
-            </a:r>
-            <a:r>
-              <a:rPr lang="en-US" dirty="0"/>
-              <a:t>-</a:t>
+              <a:t> fetch origin </a:t>
+            </a:r>
+            <a:endParaRPr lang="zh-CN" altLang="en-US" dirty="0"/>
+          </a:p>
+          <a:p>
+            <a:r>
+              <a:rPr lang="en-US" dirty="0" smtClean="0"/>
+              <a:t>$ </a:t>
             </a:r>
             <a:r>
               <a:rPr lang="en-US" dirty="0" err="1" smtClean="0"/>
-              <a:t>i</a:t>
+              <a:t>git</a:t>
             </a:r>
             <a:r>
               <a:rPr lang="en-US" dirty="0" smtClean="0"/>
-              <a:t> origin</a:t>
+              <a:t> rebase origin</a:t>
             </a:r>
             <a:r>
               <a:rPr lang="en-US" dirty="0"/>
@@ -8347,52 +8547,6 @@
             <a:r>
               <a:rPr lang="en-US" dirty="0" smtClean="0"/>
               <a:t>master</a:t>
-            </a:r>
-            <a:endParaRPr lang="en-US" dirty="0"/>
-          </a:p>
-        </p:txBody>
-      </p:sp>
-      <p:sp>
-        <p:nvSpPr>
-          <p:cNvPr id="2" name="TextBox 1"/>
-          <p:cNvSpPr txBox="1"/>
-          <p:nvPr/>
-        </p:nvSpPr>
-        <p:spPr>
-          <a:xfrm>
-            <a:off x="250825" y="2540079"/>
-            <a:ext cx="6553200" cy="923330"/>
-          </a:xfrm>
-          <a:prstGeom prst="rect">
-            <a:avLst/>
-          </a:prstGeom>
-          <a:noFill/>
-        </p:spPr>
-        <p:txBody>
-          <a:bodyPr wrap="square" rtlCol="0">
-            <a:spAutoFit/>
-          </a:bodyPr>
-          <a:lstStyle/>
-          <a:p>
-            <a:r>
-              <a:rPr lang="zh-CN" altLang="en-US" dirty="0"/>
-              <a:t>分支开发完成后，很可能有一堆</a:t>
-            </a:r>
-            <a:r>
-              <a:rPr lang="en-US" altLang="zh-CN" dirty="0"/>
-              <a:t>commit</a:t>
-            </a:r>
-            <a:r>
-              <a:rPr lang="zh-CN" altLang="en-US" dirty="0"/>
-              <a:t>，但是合并到主干的时候，往往希望只有一个（或最多两三个）</a:t>
-            </a:r>
-            <a:r>
-              <a:rPr lang="en-US" altLang="zh-CN" dirty="0"/>
-              <a:t>commit</a:t>
-            </a:r>
-            <a:r>
-              <a:rPr lang="zh-CN" altLang="en-US" dirty="0"/>
-              <a:t>，这样不仅清晰，也容易管理。</a:t>
             </a:r>
             <a:endParaRPr lang="en-US" dirty="0"/>
           </a:p>
@@ -8401,7 +8555,7 @@
     </p:spTree>
     <p:extLst>
       <p:ext uri="{BB962C8B-B14F-4D97-AF65-F5344CB8AC3E}">
-        <p14:creationId xmlns:p14="http://schemas.microsoft.com/office/powerpoint/2010/main" val="552380089"/>
+        <p14:creationId xmlns:p14="http://schemas.microsoft.com/office/powerpoint/2010/main" val="199740011"/>
       </p:ext>
     </p:extLst>
   </p:cSld>
@@ -8496,9 +8650,10 @@
           <a:lstStyle/>
           <a:p>
             <a:r>
-              <a:rPr lang="zh-CN" altLang="en-US" b="0" dirty="0"/>
-              <a:t>推送到远程仓库</a:t>
-            </a:r>
+              <a:rPr lang="en-US" b="0" dirty="0" err="1"/>
+              <a:t>合并commit</a:t>
+            </a:r>
+            <a:endParaRPr lang="en-US" b="0" dirty="0"/>
           </a:p>
         </p:txBody>
       </p:sp>
@@ -8534,19 +8689,73 @@
             </a:r>
             <a:r>
               <a:rPr lang="en-US" dirty="0" smtClean="0"/>
-              <a:t> push </a:t>
-            </a:r>
-            <a:r>
-              <a:rPr lang="en-US" dirty="0"/>
-              <a:t>--</a:t>
+              <a:t> rebase </a:t>
+            </a:r>
+            <a:r>
+              <a:rPr lang="en-US" dirty="0"/>
+              <a:t>-</a:t>
+            </a:r>
+            <a:r>
+              <a:rPr lang="en-US" dirty="0" err="1" smtClean="0"/>
+              <a:t>i</a:t>
             </a:r>
             <a:r>
               <a:rPr lang="en-US" dirty="0" smtClean="0"/>
-              <a:t>force origin </a:t>
-            </a:r>
-            <a:r>
-              <a:rPr lang="en-US" dirty="0" err="1" smtClean="0"/>
-              <a:t>myfeature</a:t>
+              <a:t> origin</a:t>
+            </a:r>
+            <a:r>
+              <a:rPr lang="en-US" dirty="0"/>
+              <a:t>/</a:t>
+            </a:r>
+            <a:r>
+              <a:rPr lang="en-US" dirty="0" smtClean="0"/>
+              <a:t>master</a:t>
+            </a:r>
+            <a:endParaRPr lang="en-US" dirty="0"/>
+          </a:p>
+        </p:txBody>
+      </p:sp>
+      <p:sp>
+        <p:nvSpPr>
+          <p:cNvPr id="2" name="TextBox 1"/>
+          <p:cNvSpPr txBox="1"/>
+          <p:nvPr/>
+        </p:nvSpPr>
+        <p:spPr>
+          <a:xfrm>
+            <a:off x="250825" y="2540079"/>
+            <a:ext cx="6553200" cy="923330"/>
+          </a:xfrm>
+          <a:prstGeom prst="rect">
+            <a:avLst/>
+          </a:prstGeom>
+          <a:noFill/>
+        </p:spPr>
+        <p:txBody>
+          <a:bodyPr wrap="square" rtlCol="0">
+            <a:spAutoFit/>
+          </a:bodyPr>
+          <a:lstStyle/>
+          <a:p>
+            <a:r>
+              <a:rPr lang="zh-CN" altLang="en-US" dirty="0"/>
+              <a:t>分支开发完成后，很可能有一堆</a:t>
+            </a:r>
+            <a:r>
+              <a:rPr lang="en-US" altLang="zh-CN" dirty="0"/>
+              <a:t>commit</a:t>
+            </a:r>
+            <a:r>
+              <a:rPr lang="zh-CN" altLang="en-US" dirty="0"/>
+              <a:t>，但是合并到主干的时候，往往希望只有一个（或最多两三个）</a:t>
+            </a:r>
+            <a:r>
+              <a:rPr lang="en-US" altLang="zh-CN" dirty="0"/>
+              <a:t>commit</a:t>
+            </a:r>
+            <a:r>
+              <a:rPr lang="zh-CN" altLang="en-US" dirty="0"/>
+              <a:t>，这样不仅清晰，也容易管理。</a:t>
             </a:r>
             <a:endParaRPr lang="en-US" dirty="0"/>
           </a:p>
@@ -8555,7 +8764,7 @@
     </p:spTree>
     <p:extLst>
       <p:ext uri="{BB962C8B-B14F-4D97-AF65-F5344CB8AC3E}">
-        <p14:creationId xmlns:p14="http://schemas.microsoft.com/office/powerpoint/2010/main" val="243541724"/>
+        <p14:creationId xmlns:p14="http://schemas.microsoft.com/office/powerpoint/2010/main" val="552380089"/>
       </p:ext>
     </p:extLst>
   </p:cSld>
@@ -8650,12 +8859,8 @@
           <a:lstStyle/>
           <a:p>
             <a:r>
-              <a:rPr lang="en-US" b="0" dirty="0" err="1"/>
-              <a:t>发出Pull</a:t>
-            </a:r>
-            <a:r>
-              <a:rPr lang="en-US" b="0" dirty="0"/>
-              <a:t> Request</a:t>
+              <a:rPr lang="zh-CN" altLang="en-US" b="0" dirty="0"/>
+              <a:t>推送到远程仓库</a:t>
             </a:r>
           </a:p>
         </p:txBody>
@@ -8683,24 +8888,28 @@
           <a:lstStyle/>
           <a:p>
             <a:r>
-              <a:rPr lang="zh-CN" altLang="en-US" dirty="0"/>
-              <a:t>请求别人进行代码</a:t>
-            </a:r>
-            <a:r>
-              <a:rPr lang="en-US" altLang="zh-CN" dirty="0"/>
-              <a:t>review</a:t>
-            </a:r>
-            <a:r>
-              <a:rPr lang="zh-CN" altLang="en-US" dirty="0"/>
-              <a:t>，确认可以合并到</a:t>
-            </a:r>
-            <a:r>
-              <a:rPr lang="en-US" altLang="zh-CN" dirty="0"/>
-              <a:t>master</a:t>
-            </a:r>
-            <a:r>
-              <a:rPr lang="zh-CN" altLang="en-US" dirty="0"/>
-              <a:t>。</a:t>
+              <a:rPr lang="en-US" dirty="0" smtClean="0"/>
+              <a:t>$ </a:t>
+            </a:r>
+            <a:r>
+              <a:rPr lang="en-US" dirty="0" err="1" smtClean="0"/>
+              <a:t>git</a:t>
+            </a:r>
+            <a:r>
+              <a:rPr lang="en-US" dirty="0" smtClean="0"/>
+              <a:t> push </a:t>
+            </a:r>
+            <a:r>
+              <a:rPr lang="en-US" dirty="0"/>
+              <a:t>--</a:t>
+            </a:r>
+            <a:r>
+              <a:rPr lang="en-US" dirty="0" smtClean="0"/>
+              <a:t>force origin </a:t>
+            </a:r>
+            <a:r>
+              <a:rPr lang="en-US" dirty="0" err="1" smtClean="0"/>
+              <a:t>myfeature</a:t>
             </a:r>
             <a:endParaRPr lang="en-US" dirty="0"/>
           </a:p>
@@ -8709,7 +8918,7 @@
     </p:spTree>
     <p:extLst>
       <p:ext uri="{BB962C8B-B14F-4D97-AF65-F5344CB8AC3E}">
-        <p14:creationId xmlns:p14="http://schemas.microsoft.com/office/powerpoint/2010/main" val="1052432323"/>
+        <p14:creationId xmlns:p14="http://schemas.microsoft.com/office/powerpoint/2010/main" val="243541724"/>
       </p:ext>
     </p:extLst>
   </p:cSld>

</xml_diff>

<commit_message>
docs(ppt) : update pptx — change commit message
</commit_message>
<xml_diff>
--- a/Git Workflow.pptx
+++ b/Git Workflow.pptx
@@ -12,23 +12,24 @@
     <p:sldId id="285" r:id="rId6"/>
     <p:sldId id="268" r:id="rId7"/>
     <p:sldId id="269" r:id="rId8"/>
-    <p:sldId id="270" r:id="rId9"/>
-    <p:sldId id="271" r:id="rId10"/>
-    <p:sldId id="272" r:id="rId11"/>
-    <p:sldId id="273" r:id="rId12"/>
-    <p:sldId id="288" r:id="rId13"/>
-    <p:sldId id="274" r:id="rId14"/>
-    <p:sldId id="275" r:id="rId15"/>
-    <p:sldId id="287" r:id="rId16"/>
-    <p:sldId id="276" r:id="rId17"/>
-    <p:sldId id="277" r:id="rId18"/>
-    <p:sldId id="278" r:id="rId19"/>
-    <p:sldId id="279" r:id="rId20"/>
-    <p:sldId id="280" r:id="rId21"/>
-    <p:sldId id="281" r:id="rId22"/>
-    <p:sldId id="282" r:id="rId23"/>
-    <p:sldId id="283" r:id="rId24"/>
-    <p:sldId id="284" r:id="rId25"/>
+    <p:sldId id="289" r:id="rId9"/>
+    <p:sldId id="270" r:id="rId10"/>
+    <p:sldId id="271" r:id="rId11"/>
+    <p:sldId id="272" r:id="rId12"/>
+    <p:sldId id="273" r:id="rId13"/>
+    <p:sldId id="288" r:id="rId14"/>
+    <p:sldId id="274" r:id="rId15"/>
+    <p:sldId id="275" r:id="rId16"/>
+    <p:sldId id="287" r:id="rId17"/>
+    <p:sldId id="276" r:id="rId18"/>
+    <p:sldId id="277" r:id="rId19"/>
+    <p:sldId id="278" r:id="rId20"/>
+    <p:sldId id="279" r:id="rId21"/>
+    <p:sldId id="280" r:id="rId22"/>
+    <p:sldId id="281" r:id="rId23"/>
+    <p:sldId id="282" r:id="rId24"/>
+    <p:sldId id="283" r:id="rId25"/>
+    <p:sldId id="284" r:id="rId26"/>
   </p:sldIdLst>
   <p:sldSz cx="9144000" cy="6858000" type="screen4x3"/>
   <p:notesSz cx="6858000" cy="9144000"/>
@@ -4069,9 +4070,10 @@
           <a:lstStyle/>
           <a:p>
             <a:r>
-              <a:rPr lang="zh-CN" altLang="en-US" b="0" dirty="0"/>
-              <a:t>推送到远程仓库</a:t>
-            </a:r>
+              <a:rPr lang="en-US" b="0" dirty="0" err="1"/>
+              <a:t>合并commit</a:t>
+            </a:r>
+            <a:endParaRPr lang="en-US" b="0" dirty="0"/>
           </a:p>
         </p:txBody>
       </p:sp>
@@ -4107,19 +4109,73 @@
             </a:r>
             <a:r>
               <a:rPr lang="en-US" dirty="0" smtClean="0"/>
-              <a:t> push </a:t>
-            </a:r>
-            <a:r>
-              <a:rPr lang="en-US" dirty="0"/>
-              <a:t>--</a:t>
+              <a:t> rebase </a:t>
+            </a:r>
+            <a:r>
+              <a:rPr lang="en-US" dirty="0"/>
+              <a:t>-</a:t>
+            </a:r>
+            <a:r>
+              <a:rPr lang="en-US" dirty="0" err="1" smtClean="0"/>
+              <a:t>i</a:t>
             </a:r>
             <a:r>
               <a:rPr lang="en-US" dirty="0" smtClean="0"/>
-              <a:t>force origin </a:t>
-            </a:r>
-            <a:r>
-              <a:rPr lang="en-US" dirty="0" err="1" smtClean="0"/>
-              <a:t>myfeature</a:t>
+              <a:t> origin</a:t>
+            </a:r>
+            <a:r>
+              <a:rPr lang="en-US" dirty="0"/>
+              <a:t>/</a:t>
+            </a:r>
+            <a:r>
+              <a:rPr lang="en-US" dirty="0" smtClean="0"/>
+              <a:t>master</a:t>
+            </a:r>
+            <a:endParaRPr lang="en-US" dirty="0"/>
+          </a:p>
+        </p:txBody>
+      </p:sp>
+      <p:sp>
+        <p:nvSpPr>
+          <p:cNvPr id="2" name="TextBox 1"/>
+          <p:cNvSpPr txBox="1"/>
+          <p:nvPr/>
+        </p:nvSpPr>
+        <p:spPr>
+          <a:xfrm>
+            <a:off x="250825" y="2540079"/>
+            <a:ext cx="6553200" cy="923330"/>
+          </a:xfrm>
+          <a:prstGeom prst="rect">
+            <a:avLst/>
+          </a:prstGeom>
+          <a:noFill/>
+        </p:spPr>
+        <p:txBody>
+          <a:bodyPr wrap="square" rtlCol="0">
+            <a:spAutoFit/>
+          </a:bodyPr>
+          <a:lstStyle/>
+          <a:p>
+            <a:r>
+              <a:rPr lang="zh-CN" altLang="en-US" dirty="0"/>
+              <a:t>分支开发完成后，很可能有一堆</a:t>
+            </a:r>
+            <a:r>
+              <a:rPr lang="en-US" altLang="zh-CN" dirty="0"/>
+              <a:t>commit</a:t>
+            </a:r>
+            <a:r>
+              <a:rPr lang="zh-CN" altLang="en-US" dirty="0"/>
+              <a:t>，但是合并到主干的时候，往往希望只有一个（或最多两三个）</a:t>
+            </a:r>
+            <a:r>
+              <a:rPr lang="en-US" altLang="zh-CN" dirty="0"/>
+              <a:t>commit</a:t>
+            </a:r>
+            <a:r>
+              <a:rPr lang="zh-CN" altLang="en-US" dirty="0"/>
+              <a:t>，这样不仅清晰，也容易管理。</a:t>
             </a:r>
             <a:endParaRPr lang="en-US" dirty="0"/>
           </a:p>
@@ -4128,7 +4184,7 @@
     </p:spTree>
     <p:extLst>
       <p:ext uri="{BB962C8B-B14F-4D97-AF65-F5344CB8AC3E}">
-        <p14:creationId xmlns:p14="http://schemas.microsoft.com/office/powerpoint/2010/main" val="243541724"/>
+        <p14:creationId xmlns:p14="http://schemas.microsoft.com/office/powerpoint/2010/main" val="552380089"/>
       </p:ext>
     </p:extLst>
   </p:cSld>
@@ -4223,12 +4279,8 @@
           <a:lstStyle/>
           <a:p>
             <a:r>
-              <a:rPr lang="en-US" b="0" dirty="0" err="1"/>
-              <a:t>发出Pull</a:t>
-            </a:r>
-            <a:r>
-              <a:rPr lang="en-US" b="0" dirty="0"/>
-              <a:t> Request</a:t>
+              <a:rPr lang="zh-CN" altLang="en-US" b="0" dirty="0"/>
+              <a:t>推送到远程仓库</a:t>
             </a:r>
           </a:p>
         </p:txBody>
@@ -4256,24 +4308,28 @@
           <a:lstStyle/>
           <a:p>
             <a:r>
-              <a:rPr lang="zh-CN" altLang="en-US" dirty="0"/>
-              <a:t>请求别人进行代码</a:t>
-            </a:r>
-            <a:r>
-              <a:rPr lang="en-US" altLang="zh-CN" dirty="0"/>
-              <a:t>review</a:t>
-            </a:r>
-            <a:r>
-              <a:rPr lang="zh-CN" altLang="en-US" dirty="0"/>
-              <a:t>，确认可以合并到</a:t>
-            </a:r>
-            <a:r>
-              <a:rPr lang="en-US" altLang="zh-CN" dirty="0"/>
-              <a:t>master</a:t>
-            </a:r>
-            <a:r>
-              <a:rPr lang="zh-CN" altLang="en-US" dirty="0"/>
-              <a:t>。</a:t>
+              <a:rPr lang="en-US" dirty="0" smtClean="0"/>
+              <a:t>$ </a:t>
+            </a:r>
+            <a:r>
+              <a:rPr lang="en-US" dirty="0" err="1" smtClean="0"/>
+              <a:t>git</a:t>
+            </a:r>
+            <a:r>
+              <a:rPr lang="en-US" dirty="0" smtClean="0"/>
+              <a:t> push </a:t>
+            </a:r>
+            <a:r>
+              <a:rPr lang="en-US" dirty="0"/>
+              <a:t>--</a:t>
+            </a:r>
+            <a:r>
+              <a:rPr lang="en-US" dirty="0" smtClean="0"/>
+              <a:t>force origin </a:t>
+            </a:r>
+            <a:r>
+              <a:rPr lang="en-US" dirty="0" err="1" smtClean="0"/>
+              <a:t>myfeature</a:t>
             </a:r>
             <a:endParaRPr lang="en-US" dirty="0"/>
           </a:p>
@@ -4282,7 +4338,7 @@
     </p:spTree>
     <p:extLst>
       <p:ext uri="{BB962C8B-B14F-4D97-AF65-F5344CB8AC3E}">
-        <p14:creationId xmlns:p14="http://schemas.microsoft.com/office/powerpoint/2010/main" val="1052432323"/>
+        <p14:creationId xmlns:p14="http://schemas.microsoft.com/office/powerpoint/2010/main" val="243541724"/>
       </p:ext>
     </p:extLst>
   </p:cSld>
@@ -4377,6 +4433,160 @@
           <a:lstStyle/>
           <a:p>
             <a:r>
+              <a:rPr lang="en-US" b="0" dirty="0" err="1"/>
+              <a:t>发出Pull</a:t>
+            </a:r>
+            <a:r>
+              <a:rPr lang="en-US" b="0" dirty="0"/>
+              <a:t> Request</a:t>
+            </a:r>
+          </a:p>
+        </p:txBody>
+      </p:sp>
+      <p:sp>
+        <p:nvSpPr>
+          <p:cNvPr id="3" name="TextBox 2"/>
+          <p:cNvSpPr txBox="1"/>
+          <p:nvPr/>
+        </p:nvSpPr>
+        <p:spPr>
+          <a:xfrm>
+            <a:off x="250825" y="1143000"/>
+            <a:ext cx="8207375" cy="369332"/>
+          </a:xfrm>
+          <a:prstGeom prst="rect">
+            <a:avLst/>
+          </a:prstGeom>
+          <a:noFill/>
+        </p:spPr>
+        <p:txBody>
+          <a:bodyPr wrap="square" rtlCol="0">
+            <a:spAutoFit/>
+          </a:bodyPr>
+          <a:lstStyle/>
+          <a:p>
+            <a:r>
+              <a:rPr lang="zh-CN" altLang="en-US" dirty="0"/>
+              <a:t>请求别人进行代码</a:t>
+            </a:r>
+            <a:r>
+              <a:rPr lang="en-US" altLang="zh-CN" dirty="0"/>
+              <a:t>review</a:t>
+            </a:r>
+            <a:r>
+              <a:rPr lang="zh-CN" altLang="en-US" dirty="0"/>
+              <a:t>，确认可以合并到</a:t>
+            </a:r>
+            <a:r>
+              <a:rPr lang="en-US" altLang="zh-CN" dirty="0"/>
+              <a:t>master</a:t>
+            </a:r>
+            <a:r>
+              <a:rPr lang="zh-CN" altLang="en-US" dirty="0"/>
+              <a:t>。</a:t>
+            </a:r>
+            <a:endParaRPr lang="en-US" dirty="0"/>
+          </a:p>
+        </p:txBody>
+      </p:sp>
+    </p:spTree>
+    <p:extLst>
+      <p:ext uri="{BB962C8B-B14F-4D97-AF65-F5344CB8AC3E}">
+        <p14:creationId xmlns:p14="http://schemas.microsoft.com/office/powerpoint/2010/main" val="1052432323"/>
+      </p:ext>
+    </p:extLst>
+  </p:cSld>
+  <p:clrMapOvr>
+    <a:masterClrMapping/>
+  </p:clrMapOvr>
+  <p:timing>
+    <p:tnLst>
+      <p:par>
+        <p:cTn id="1" dur="indefinite" restart="never" nodeType="tmRoot"/>
+      </p:par>
+    </p:tnLst>
+  </p:timing>
+</p:sld>
+</file>
+
+<file path=ppt/slides/slide13.xml><?xml version="1.0" encoding="utf-8"?>
+<p:sld xmlns:a="http://schemas.openxmlformats.org/drawingml/2006/main" xmlns:r="http://schemas.openxmlformats.org/officeDocument/2006/relationships" xmlns:p="http://schemas.openxmlformats.org/presentationml/2006/main">
+  <p:cSld>
+    <p:spTree>
+      <p:nvGrpSpPr>
+        <p:cNvPr id="1" name=""/>
+        <p:cNvGrpSpPr/>
+        <p:nvPr/>
+      </p:nvGrpSpPr>
+      <p:grpSpPr>
+        <a:xfrm>
+          <a:off x="0" y="0"/>
+          <a:ext cx="0" cy="0"/>
+          <a:chOff x="0" y="0"/>
+          <a:chExt cx="0" cy="0"/>
+        </a:xfrm>
+      </p:grpSpPr>
+      <p:sp>
+        <p:nvSpPr>
+          <p:cNvPr id="4" name="Date Placeholder 3"/>
+          <p:cNvSpPr>
+            <a:spLocks noGrp="1"/>
+          </p:cNvSpPr>
+          <p:nvPr>
+            <p:ph type="dt" sz="half" idx="10"/>
+          </p:nvPr>
+        </p:nvSpPr>
+        <p:spPr/>
+        <p:txBody>
+          <a:bodyPr/>
+          <a:lstStyle/>
+          <a:p>
+            <a:r>
+              <a:rPr lang="en-US" altLang="ko-KR" dirty="0" err="1" smtClean="0"/>
+              <a:t>www.ooooo.com</a:t>
+            </a:r>
+            <a:endParaRPr lang="en-US" altLang="ko-KR" dirty="0"/>
+          </a:p>
+        </p:txBody>
+      </p:sp>
+      <p:sp>
+        <p:nvSpPr>
+          <p:cNvPr id="5" name="Footer Placeholder 4"/>
+          <p:cNvSpPr>
+            <a:spLocks noGrp="1"/>
+          </p:cNvSpPr>
+          <p:nvPr>
+            <p:ph type="ftr" sz="quarter" idx="11"/>
+          </p:nvPr>
+        </p:nvSpPr>
+        <p:spPr/>
+        <p:txBody>
+          <a:bodyPr/>
+          <a:lstStyle/>
+          <a:p>
+            <a:r>
+              <a:rPr lang="en-US" altLang="ko-KR"/>
+              <a:t>Company Logo</a:t>
+            </a:r>
+          </a:p>
+        </p:txBody>
+      </p:sp>
+      <p:sp>
+        <p:nvSpPr>
+          <p:cNvPr id="37890" name="Rectangle 2"/>
+          <p:cNvSpPr>
+            <a:spLocks noGrp="1" noChangeArrowheads="1"/>
+          </p:cNvSpPr>
+          <p:nvPr>
+            <p:ph type="title"/>
+          </p:nvPr>
+        </p:nvSpPr>
+        <p:spPr/>
+        <p:txBody>
+          <a:bodyPr/>
+          <a:lstStyle/>
+          <a:p>
+            <a:r>
               <a:rPr lang="zh-CN" altLang="en-US" dirty="0"/>
               <a:t>多人协作</a:t>
             </a:r>
@@ -4539,7 +4749,7 @@
 </p:sld>
 </file>
 
-<file path=ppt/slides/slide13.xml><?xml version="1.0" encoding="utf-8"?>
+<file path=ppt/slides/slide14.xml><?xml version="1.0" encoding="utf-8"?>
 <p:sld xmlns:a="http://schemas.openxmlformats.org/drawingml/2006/main" xmlns:r="http://schemas.openxmlformats.org/officeDocument/2006/relationships" xmlns:p="http://schemas.openxmlformats.org/presentationml/2006/main">
   <p:cSld>
     <p:spTree>
@@ -4736,7 +4946,7 @@
 </p:sld>
 </file>
 
-<file path=ppt/slides/slide14.xml><?xml version="1.0" encoding="utf-8"?>
+<file path=ppt/slides/slide15.xml><?xml version="1.0" encoding="utf-8"?>
 <p:sld xmlns:a="http://schemas.openxmlformats.org/drawingml/2006/main" xmlns:r="http://schemas.openxmlformats.org/officeDocument/2006/relationships" xmlns:p="http://schemas.openxmlformats.org/presentationml/2006/main">
   <p:cSld>
     <p:spTree>
@@ -4879,261 +5089,6 @@
 </p:sld>
 </file>
 
-<file path=ppt/slides/slide15.xml><?xml version="1.0" encoding="utf-8"?>
-<p:sld xmlns:a="http://schemas.openxmlformats.org/drawingml/2006/main" xmlns:r="http://schemas.openxmlformats.org/officeDocument/2006/relationships" xmlns:p="http://schemas.openxmlformats.org/presentationml/2006/main">
-  <p:cSld>
-    <p:spTree>
-      <p:nvGrpSpPr>
-        <p:cNvPr id="1" name=""/>
-        <p:cNvGrpSpPr/>
-        <p:nvPr/>
-      </p:nvGrpSpPr>
-      <p:grpSpPr>
-        <a:xfrm>
-          <a:off x="0" y="0"/>
-          <a:ext cx="0" cy="0"/>
-          <a:chOff x="0" y="0"/>
-          <a:chExt cx="0" cy="0"/>
-        </a:xfrm>
-      </p:grpSpPr>
-      <p:sp>
-        <p:nvSpPr>
-          <p:cNvPr id="4" name="Date Placeholder 3"/>
-          <p:cNvSpPr>
-            <a:spLocks noGrp="1"/>
-          </p:cNvSpPr>
-          <p:nvPr>
-            <p:ph type="dt" sz="half" idx="10"/>
-          </p:nvPr>
-        </p:nvSpPr>
-        <p:spPr/>
-        <p:txBody>
-          <a:bodyPr/>
-          <a:lstStyle/>
-          <a:p>
-            <a:r>
-              <a:rPr lang="en-US" altLang="ko-KR" dirty="0" err="1" smtClean="0"/>
-              <a:t>www.ooooo.com</a:t>
-            </a:r>
-            <a:endParaRPr lang="en-US" altLang="ko-KR" dirty="0"/>
-          </a:p>
-        </p:txBody>
-      </p:sp>
-      <p:sp>
-        <p:nvSpPr>
-          <p:cNvPr id="5" name="Footer Placeholder 4"/>
-          <p:cNvSpPr>
-            <a:spLocks noGrp="1"/>
-          </p:cNvSpPr>
-          <p:nvPr>
-            <p:ph type="ftr" sz="quarter" idx="11"/>
-          </p:nvPr>
-        </p:nvSpPr>
-        <p:spPr/>
-        <p:txBody>
-          <a:bodyPr/>
-          <a:lstStyle/>
-          <a:p>
-            <a:r>
-              <a:rPr lang="en-US" altLang="ko-KR"/>
-              <a:t>Company Logo</a:t>
-            </a:r>
-          </a:p>
-        </p:txBody>
-      </p:sp>
-      <p:sp>
-        <p:nvSpPr>
-          <p:cNvPr id="37890" name="Rectangle 2"/>
-          <p:cNvSpPr>
-            <a:spLocks noGrp="1" noChangeArrowheads="1"/>
-          </p:cNvSpPr>
-          <p:nvPr>
-            <p:ph type="title"/>
-          </p:nvPr>
-        </p:nvSpPr>
-        <p:spPr/>
-        <p:txBody>
-          <a:bodyPr/>
-          <a:lstStyle/>
-          <a:p>
-            <a:r>
-              <a:rPr lang="zh-CN" altLang="en-US" b="0" dirty="0"/>
-              <a:t>新建代码库</a:t>
-            </a:r>
-          </a:p>
-        </p:txBody>
-      </p:sp>
-      <p:sp>
-        <p:nvSpPr>
-          <p:cNvPr id="3" name="TextBox 2"/>
-          <p:cNvSpPr txBox="1"/>
-          <p:nvPr/>
-        </p:nvSpPr>
-        <p:spPr>
-          <a:xfrm>
-            <a:off x="250825" y="1143000"/>
-            <a:ext cx="8207375" cy="2308324"/>
-          </a:xfrm>
-          <a:prstGeom prst="rect">
-            <a:avLst/>
-          </a:prstGeom>
-          <a:noFill/>
-        </p:spPr>
-        <p:txBody>
-          <a:bodyPr wrap="square" rtlCol="0">
-            <a:spAutoFit/>
-          </a:bodyPr>
-          <a:lstStyle/>
-          <a:p>
-            <a:r>
-              <a:rPr lang="en-US" altLang="zh-CN" dirty="0"/>
-              <a:t># </a:t>
-            </a:r>
-            <a:r>
-              <a:rPr lang="zh-CN" altLang="en-US" dirty="0"/>
-              <a:t>在当前目录新建一个</a:t>
-            </a:r>
-            <a:r>
-              <a:rPr lang="en-US" altLang="zh-CN" dirty="0"/>
-              <a:t>Git</a:t>
-            </a:r>
-            <a:r>
-              <a:rPr lang="zh-CN" altLang="en-US" dirty="0"/>
-              <a:t>代码库 </a:t>
-            </a:r>
-            <a:endParaRPr lang="zh-CN" altLang="en-US" dirty="0" smtClean="0"/>
-          </a:p>
-          <a:p>
-            <a:r>
-              <a:rPr lang="en-US" altLang="zh-CN" dirty="0" smtClean="0"/>
-              <a:t>$ </a:t>
-            </a:r>
-            <a:r>
-              <a:rPr lang="en-US" altLang="zh-CN" dirty="0" err="1"/>
-              <a:t>git</a:t>
-            </a:r>
-            <a:r>
-              <a:rPr lang="en-US" altLang="zh-CN" dirty="0"/>
-              <a:t> </a:t>
-            </a:r>
-            <a:r>
-              <a:rPr lang="en-US" altLang="zh-CN" dirty="0" err="1"/>
-              <a:t>init</a:t>
-            </a:r>
-            <a:r>
-              <a:rPr lang="en-US" altLang="zh-CN" dirty="0"/>
-              <a:t> </a:t>
-            </a:r>
-            <a:endParaRPr lang="zh-CN" altLang="en-US" dirty="0" smtClean="0"/>
-          </a:p>
-          <a:p>
-            <a:endParaRPr lang="zh-CN" altLang="en-US" dirty="0" smtClean="0"/>
-          </a:p>
-          <a:p>
-            <a:r>
-              <a:rPr lang="en-US" altLang="zh-CN" dirty="0" smtClean="0"/>
-              <a:t># </a:t>
-            </a:r>
-            <a:r>
-              <a:rPr lang="zh-CN" altLang="en-US" dirty="0"/>
-              <a:t>新建一个目录，将其初始化为</a:t>
-            </a:r>
-            <a:r>
-              <a:rPr lang="en-US" altLang="zh-CN" dirty="0"/>
-              <a:t>Git</a:t>
-            </a:r>
-            <a:r>
-              <a:rPr lang="zh-CN" altLang="en-US" dirty="0"/>
-              <a:t>代码库 </a:t>
-            </a:r>
-            <a:endParaRPr lang="zh-CN" altLang="en-US" dirty="0" smtClean="0"/>
-          </a:p>
-          <a:p>
-            <a:r>
-              <a:rPr lang="en-US" altLang="zh-CN" dirty="0" smtClean="0"/>
-              <a:t>$ </a:t>
-            </a:r>
-            <a:r>
-              <a:rPr lang="en-US" altLang="zh-CN" dirty="0" err="1"/>
-              <a:t>git</a:t>
-            </a:r>
-            <a:r>
-              <a:rPr lang="en-US" altLang="zh-CN" dirty="0"/>
-              <a:t> </a:t>
-            </a:r>
-            <a:r>
-              <a:rPr lang="en-US" altLang="zh-CN" dirty="0" err="1"/>
-              <a:t>init</a:t>
-            </a:r>
-            <a:r>
-              <a:rPr lang="en-US" altLang="zh-CN" dirty="0"/>
-              <a:t> [project-name]</a:t>
-            </a:r>
-            <a:r>
-              <a:rPr lang="zh-CN" altLang="en-US" dirty="0"/>
-              <a:t> </a:t>
-            </a:r>
-            <a:endParaRPr lang="zh-CN" altLang="en-US" dirty="0" smtClean="0"/>
-          </a:p>
-          <a:p>
-            <a:endParaRPr lang="zh-CN" altLang="en-US" dirty="0" smtClean="0"/>
-          </a:p>
-          <a:p>
-            <a:r>
-              <a:rPr lang="en-US" altLang="zh-CN" dirty="0" smtClean="0"/>
-              <a:t># </a:t>
-            </a:r>
-            <a:r>
-              <a:rPr lang="zh-CN" altLang="en-US" dirty="0"/>
-              <a:t>下载一个项目和它的整个代码历史 </a:t>
-            </a:r>
-            <a:endParaRPr lang="zh-CN" altLang="en-US" dirty="0" smtClean="0"/>
-          </a:p>
-          <a:p>
-            <a:r>
-              <a:rPr lang="en-US" altLang="zh-CN" dirty="0" smtClean="0"/>
-              <a:t>$ </a:t>
-            </a:r>
-            <a:r>
-              <a:rPr lang="en-US" altLang="zh-CN" dirty="0" err="1"/>
-              <a:t>git</a:t>
-            </a:r>
-            <a:r>
-              <a:rPr lang="en-US" altLang="zh-CN" dirty="0"/>
-              <a:t> clone [</a:t>
-            </a:r>
-            <a:r>
-              <a:rPr lang="en-US" altLang="zh-CN" dirty="0" err="1"/>
-              <a:t>url</a:t>
-            </a:r>
-            <a:r>
-              <a:rPr lang="en-US" altLang="zh-CN" dirty="0"/>
-              <a:t>]</a:t>
-            </a:r>
-            <a:endParaRPr lang="en-US" dirty="0"/>
-          </a:p>
-        </p:txBody>
-      </p:sp>
-    </p:spTree>
-    <p:extLst>
-      <p:ext uri="{BB962C8B-B14F-4D97-AF65-F5344CB8AC3E}">
-        <p14:creationId xmlns:p14="http://schemas.microsoft.com/office/powerpoint/2010/main" val="458160115"/>
-      </p:ext>
-    </p:extLst>
-  </p:cSld>
-  <p:clrMapOvr>
-    <a:masterClrMapping/>
-  </p:clrMapOvr>
-  <p:timing>
-    <p:tnLst>
-      <p:par>
-        <p:cTn id="1" dur="indefinite" restart="never" nodeType="tmRoot"/>
-      </p:par>
-    </p:tnLst>
-  </p:timing>
-</p:sld>
-</file>
-
 <file path=ppt/slides/slide16.xml><?xml version="1.0" encoding="utf-8"?>
 <p:sld xmlns:a="http://schemas.openxmlformats.org/drawingml/2006/main" xmlns:r="http://schemas.openxmlformats.org/officeDocument/2006/relationships" xmlns:p="http://schemas.openxmlformats.org/presentationml/2006/main">
   <p:cSld>
@@ -5212,8 +5167,8 @@
           <a:lstStyle/>
           <a:p>
             <a:r>
-              <a:rPr lang="ja-JP" altLang="en-US" b="0" dirty="0"/>
-              <a:t>配置</a:t>
+              <a:rPr lang="zh-CN" altLang="en-US" b="0" dirty="0"/>
+              <a:t>新建代码库</a:t>
             </a:r>
           </a:p>
         </p:txBody>
@@ -5227,7 +5182,7 @@
         <p:spPr>
           <a:xfrm>
             <a:off x="250825" y="1143000"/>
-            <a:ext cx="8207375" cy="2585323"/>
+            <a:ext cx="8207375" cy="2308324"/>
           </a:xfrm>
           <a:prstGeom prst="rect">
             <a:avLst/>
@@ -5241,157 +5196,138 @@
           <a:lstStyle/>
           <a:p>
             <a:r>
-              <a:rPr lang="en-US" dirty="0"/>
+              <a:rPr lang="en-US" altLang="zh-CN" dirty="0"/>
               <a:t># </a:t>
             </a:r>
             <a:r>
-              <a:rPr lang="en-US" dirty="0" err="1"/>
-              <a:t>显示当前的Git配置</a:t>
-            </a:r>
-            <a:r>
-              <a:rPr lang="en-US" dirty="0"/>
+              <a:rPr lang="zh-CN" altLang="en-US" dirty="0"/>
+              <a:t>在当前目录新建一个</a:t>
+            </a:r>
+            <a:r>
+              <a:rPr lang="en-US" altLang="zh-CN" dirty="0"/>
+              <a:t>Git</a:t>
+            </a:r>
+            <a:r>
+              <a:rPr lang="zh-CN" altLang="en-US" dirty="0"/>
+              <a:t>代码库 </a:t>
+            </a:r>
+            <a:endParaRPr lang="zh-CN" altLang="en-US" dirty="0" smtClean="0"/>
+          </a:p>
+          <a:p>
+            <a:r>
+              <a:rPr lang="en-US" altLang="zh-CN" dirty="0" smtClean="0"/>
+              <a:t>$ </a:t>
+            </a:r>
+            <a:r>
+              <a:rPr lang="en-US" altLang="zh-CN" dirty="0" err="1"/>
+              <a:t>git</a:t>
+            </a:r>
+            <a:r>
+              <a:rPr lang="en-US" altLang="zh-CN" dirty="0"/>
               <a:t> </a:t>
             </a:r>
+            <a:r>
+              <a:rPr lang="en-US" altLang="zh-CN" dirty="0" err="1"/>
+              <a:t>init</a:t>
+            </a:r>
+            <a:r>
+              <a:rPr lang="en-US" altLang="zh-CN" dirty="0"/>
+              <a:t> </a:t>
+            </a:r>
             <a:endParaRPr lang="zh-CN" altLang="en-US" dirty="0" smtClean="0"/>
           </a:p>
           <a:p>
-            <a:r>
-              <a:rPr lang="en-US" dirty="0" smtClean="0"/>
+            <a:endParaRPr lang="zh-CN" altLang="en-US" dirty="0" smtClean="0"/>
+          </a:p>
+          <a:p>
+            <a:r>
+              <a:rPr lang="en-US" altLang="zh-CN" dirty="0" smtClean="0"/>
+              <a:t># </a:t>
+            </a:r>
+            <a:r>
+              <a:rPr lang="zh-CN" altLang="en-US" dirty="0"/>
+              <a:t>新建一个目录，将其初始化为</a:t>
+            </a:r>
+            <a:r>
+              <a:rPr lang="en-US" altLang="zh-CN" dirty="0"/>
+              <a:t>Git</a:t>
+            </a:r>
+            <a:r>
+              <a:rPr lang="zh-CN" altLang="en-US" dirty="0"/>
+              <a:t>代码库 </a:t>
+            </a:r>
+            <a:endParaRPr lang="zh-CN" altLang="en-US" dirty="0" smtClean="0"/>
+          </a:p>
+          <a:p>
+            <a:r>
+              <a:rPr lang="en-US" altLang="zh-CN" dirty="0" smtClean="0"/>
               <a:t>$ </a:t>
             </a:r>
             <a:r>
-              <a:rPr lang="en-US" dirty="0" err="1"/>
-              <a:t>git</a:t>
-            </a:r>
-            <a:r>
-              <a:rPr lang="en-US" dirty="0"/>
+              <a:rPr lang="en-US" altLang="zh-CN" dirty="0" err="1"/>
+              <a:t>git</a:t>
+            </a:r>
+            <a:r>
+              <a:rPr lang="en-US" altLang="zh-CN" dirty="0"/>
               <a:t> </a:t>
             </a:r>
             <a:r>
-              <a:rPr lang="en-US" dirty="0" err="1"/>
-              <a:t>config</a:t>
-            </a:r>
-            <a:r>
-              <a:rPr lang="en-US" dirty="0"/>
-              <a:t> --list </a:t>
+              <a:rPr lang="en-US" altLang="zh-CN" dirty="0" err="1"/>
+              <a:t>init</a:t>
+            </a:r>
+            <a:r>
+              <a:rPr lang="en-US" altLang="zh-CN" dirty="0"/>
+              <a:t> [project-name]</a:t>
+            </a:r>
+            <a:r>
+              <a:rPr lang="zh-CN" altLang="en-US" dirty="0"/>
+              <a:t> </a:t>
             </a:r>
             <a:endParaRPr lang="zh-CN" altLang="en-US" dirty="0" smtClean="0"/>
           </a:p>
           <a:p>
-            <a:endParaRPr lang="zh-CN" altLang="en-US" dirty="0"/>
-          </a:p>
-          <a:p>
-            <a:r>
-              <a:rPr lang="en-US" dirty="0" smtClean="0"/>
+            <a:endParaRPr lang="zh-CN" altLang="en-US" dirty="0" smtClean="0"/>
+          </a:p>
+          <a:p>
+            <a:r>
+              <a:rPr lang="en-US" altLang="zh-CN" dirty="0" smtClean="0"/>
               <a:t># </a:t>
             </a:r>
             <a:r>
-              <a:rPr lang="en-US" dirty="0" err="1"/>
-              <a:t>编辑Git配置文件</a:t>
-            </a:r>
-            <a:r>
-              <a:rPr lang="en-US" dirty="0"/>
-              <a:t> </a:t>
+              <a:rPr lang="zh-CN" altLang="en-US" dirty="0"/>
+              <a:t>下载一个项目和它的整个代码历史 </a:t>
             </a:r>
             <a:endParaRPr lang="zh-CN" altLang="en-US" dirty="0" smtClean="0"/>
           </a:p>
           <a:p>
             <a:r>
-              <a:rPr lang="en-US" dirty="0" smtClean="0"/>
+              <a:rPr lang="en-US" altLang="zh-CN" dirty="0" smtClean="0"/>
               <a:t>$ </a:t>
             </a:r>
             <a:r>
-              <a:rPr lang="en-US" dirty="0" err="1"/>
-              <a:t>git</a:t>
-            </a:r>
-            <a:r>
-              <a:rPr lang="en-US" dirty="0"/>
-              <a:t> </a:t>
-            </a:r>
-            <a:r>
-              <a:rPr lang="en-US" dirty="0" err="1"/>
-              <a:t>config</a:t>
-            </a:r>
-            <a:r>
-              <a:rPr lang="en-US" dirty="0"/>
-              <a:t> -e [--global] </a:t>
-            </a:r>
-            <a:endParaRPr lang="zh-CN" altLang="en-US" dirty="0" smtClean="0"/>
-          </a:p>
-          <a:p>
-            <a:endParaRPr lang="zh-CN" altLang="en-US" dirty="0" smtClean="0"/>
-          </a:p>
-          <a:p>
-            <a:r>
-              <a:rPr lang="en-US" dirty="0" smtClean="0"/>
-              <a:t># </a:t>
-            </a:r>
-            <a:r>
-              <a:rPr lang="en-US" dirty="0"/>
-              <a:t>设置提交代码时的用户信息 </a:t>
-            </a:r>
-            <a:endParaRPr lang="zh-CN" altLang="en-US" dirty="0" smtClean="0"/>
-          </a:p>
-          <a:p>
-            <a:r>
-              <a:rPr lang="en-US" dirty="0" smtClean="0"/>
-              <a:t>$ </a:t>
-            </a:r>
-            <a:r>
-              <a:rPr lang="en-US" dirty="0" err="1"/>
-              <a:t>git</a:t>
-            </a:r>
-            <a:r>
-              <a:rPr lang="en-US" dirty="0"/>
-              <a:t> </a:t>
-            </a:r>
-            <a:r>
-              <a:rPr lang="en-US" dirty="0" err="1"/>
-              <a:t>config</a:t>
-            </a:r>
-            <a:r>
-              <a:rPr lang="en-US" dirty="0"/>
-              <a:t> [--global] </a:t>
-            </a:r>
-            <a:r>
-              <a:rPr lang="en-US" dirty="0" err="1"/>
-              <a:t>user.name</a:t>
-            </a:r>
-            <a:r>
-              <a:rPr lang="en-US" dirty="0"/>
-              <a:t> "[name]" $ </a:t>
-            </a:r>
-            <a:r>
-              <a:rPr lang="en-US" dirty="0" err="1"/>
-              <a:t>git</a:t>
-            </a:r>
-            <a:r>
-              <a:rPr lang="en-US" dirty="0"/>
-              <a:t> </a:t>
-            </a:r>
-            <a:r>
-              <a:rPr lang="en-US" dirty="0" err="1"/>
-              <a:t>config</a:t>
-            </a:r>
-            <a:r>
-              <a:rPr lang="en-US" dirty="0"/>
-              <a:t> [--global] </a:t>
-            </a:r>
-            <a:r>
-              <a:rPr lang="en-US" dirty="0" err="1"/>
-              <a:t>user.email</a:t>
-            </a:r>
-            <a:r>
-              <a:rPr lang="en-US" dirty="0"/>
-              <a:t> "[email address]"</a:t>
-            </a:r>
+              <a:rPr lang="en-US" altLang="zh-CN" dirty="0" err="1"/>
+              <a:t>git</a:t>
+            </a:r>
+            <a:r>
+              <a:rPr lang="en-US" altLang="zh-CN" dirty="0"/>
+              <a:t> clone [</a:t>
+            </a:r>
+            <a:r>
+              <a:rPr lang="en-US" altLang="zh-CN" dirty="0" err="1"/>
+              <a:t>url</a:t>
+            </a:r>
+            <a:r>
+              <a:rPr lang="en-US" altLang="zh-CN" dirty="0"/>
+              <a:t>]</a:t>
+            </a:r>
+            <a:endParaRPr lang="en-US" dirty="0"/>
           </a:p>
         </p:txBody>
       </p:sp>
     </p:spTree>
     <p:extLst>
       <p:ext uri="{BB962C8B-B14F-4D97-AF65-F5344CB8AC3E}">
-        <p14:creationId xmlns:p14="http://schemas.microsoft.com/office/powerpoint/2010/main" val="1656373695"/>
+        <p14:creationId xmlns:p14="http://schemas.microsoft.com/office/powerpoint/2010/main" val="458160115"/>
       </p:ext>
     </p:extLst>
   </p:cSld>
@@ -5486,18 +5422,9 @@
           <a:lstStyle/>
           <a:p>
             <a:r>
-              <a:rPr lang="mr-IN" b="0" dirty="0" err="1"/>
-              <a:t>增加</a:t>
-            </a:r>
-            <a:r>
-              <a:rPr lang="mr-IN" b="0" dirty="0"/>
-              <a:t>/</a:t>
-            </a:r>
-            <a:r>
-              <a:rPr lang="mr-IN" b="0" dirty="0" err="1"/>
-              <a:t>删除文件</a:t>
-            </a:r>
-            <a:endParaRPr lang="mr-IN" b="0" dirty="0"/>
+              <a:rPr lang="ja-JP" altLang="en-US" b="0" dirty="0"/>
+              <a:t>配置</a:t>
+            </a:r>
           </a:p>
         </p:txBody>
       </p:sp>
@@ -5509,8 +5436,8 @@
         </p:nvSpPr>
         <p:spPr>
           <a:xfrm>
-            <a:off x="246814" y="985087"/>
-            <a:ext cx="8439986" cy="5632311"/>
+            <a:off x="250825" y="1143000"/>
+            <a:ext cx="8207375" cy="2585323"/>
           </a:xfrm>
           <a:prstGeom prst="rect">
             <a:avLst/>
@@ -5525,7 +5452,15 @@
           <a:p>
             <a:r>
               <a:rPr lang="en-US" dirty="0"/>
-              <a:t># 添加指定文件到暂存区 </a:t>
+              <a:t># </a:t>
+            </a:r>
+            <a:r>
+              <a:rPr lang="en-US" dirty="0" err="1"/>
+              <a:t>显示当前的Git配置</a:t>
+            </a:r>
+            <a:r>
+              <a:rPr lang="en-US" dirty="0"/>
+              <a:t> </a:t>
             </a:r>
             <a:endParaRPr lang="zh-CN" altLang="en-US" dirty="0" smtClean="0"/>
           </a:p>
@@ -5540,7 +5475,15 @@
             </a:r>
             <a:r>
               <a:rPr lang="en-US" dirty="0"/>
-              <a:t> add [file1] [file2] ... </a:t>
+              <a:t> </a:t>
+            </a:r>
+            <a:r>
+              <a:rPr lang="en-US" dirty="0" err="1"/>
+              <a:t>config</a:t>
+            </a:r>
+            <a:r>
+              <a:rPr lang="en-US" dirty="0"/>
+              <a:t> --list </a:t>
             </a:r>
             <a:endParaRPr lang="zh-CN" altLang="en-US" dirty="0" smtClean="0"/>
           </a:p>
@@ -5553,8 +5496,12 @@
               <a:t># </a:t>
             </a:r>
             <a:r>
-              <a:rPr lang="en-US" dirty="0"/>
-              <a:t>添加指定目录到暂存区，包括子目录 </a:t>
+              <a:rPr lang="en-US" dirty="0" err="1"/>
+              <a:t>编辑Git配置文件</a:t>
+            </a:r>
+            <a:r>
+              <a:rPr lang="en-US" dirty="0"/>
+              <a:t> </a:t>
             </a:r>
             <a:endParaRPr lang="zh-CN" altLang="en-US" dirty="0" smtClean="0"/>
           </a:p>
@@ -5569,20 +5516,20 @@
             </a:r>
             <a:r>
               <a:rPr lang="en-US" dirty="0"/>
-              <a:t> add [</a:t>
-            </a:r>
-            <a:r>
-              <a:rPr lang="en-US" dirty="0" err="1"/>
-              <a:t>dir</a:t>
-            </a:r>
-            <a:r>
-              <a:rPr lang="en-US" dirty="0"/>
-              <a:t>] </a:t>
+              <a:t> </a:t>
+            </a:r>
+            <a:r>
+              <a:rPr lang="en-US" dirty="0" err="1"/>
+              <a:t>config</a:t>
+            </a:r>
+            <a:r>
+              <a:rPr lang="en-US" dirty="0"/>
+              <a:t> -e [--global] </a:t>
             </a:r>
             <a:endParaRPr lang="zh-CN" altLang="en-US" dirty="0" smtClean="0"/>
           </a:p>
           <a:p>
-            <a:endParaRPr lang="zh-CN" altLang="en-US" dirty="0"/>
+            <a:endParaRPr lang="zh-CN" altLang="en-US" dirty="0" smtClean="0"/>
           </a:p>
           <a:p>
             <a:r>
@@ -5591,7 +5538,7 @@
             </a:r>
             <a:r>
               <a:rPr lang="en-US" dirty="0"/>
-              <a:t>添加当前目录的所有文件到暂存区 </a:t>
+              <a:t>设置提交代码时的用户信息 </a:t>
             </a:r>
             <a:endParaRPr lang="zh-CN" altLang="en-US" dirty="0" smtClean="0"/>
           </a:p>
@@ -5606,94 +5553,23 @@
             </a:r>
             <a:r>
               <a:rPr lang="en-US" dirty="0"/>
-              <a:t> add . </a:t>
-            </a:r>
-            <a:endParaRPr lang="zh-CN" altLang="en-US" dirty="0" smtClean="0"/>
-          </a:p>
-          <a:p>
-            <a:endParaRPr lang="zh-CN" altLang="en-US" dirty="0"/>
-          </a:p>
-          <a:p>
-            <a:r>
-              <a:rPr lang="en-US" dirty="0" smtClean="0"/>
-              <a:t># </a:t>
-            </a:r>
-            <a:r>
-              <a:rPr lang="en-US" dirty="0"/>
-              <a:t>对于同一个文件的多处变化，可以实现分次提交 </a:t>
-            </a:r>
-            <a:endParaRPr lang="zh-CN" altLang="en-US" dirty="0" smtClean="0"/>
-          </a:p>
-          <a:p>
-            <a:r>
-              <a:rPr lang="en-US" dirty="0" smtClean="0"/>
-              <a:t>$ </a:t>
-            </a:r>
-            <a:r>
-              <a:rPr lang="en-US" dirty="0" err="1"/>
-              <a:t>git</a:t>
-            </a:r>
-            <a:r>
-              <a:rPr lang="en-US" dirty="0"/>
-              <a:t> add -p </a:t>
-            </a:r>
-            <a:endParaRPr lang="zh-CN" altLang="en-US" dirty="0" smtClean="0"/>
-          </a:p>
-          <a:p>
-            <a:endParaRPr lang="zh-CN" altLang="en-US" dirty="0"/>
-          </a:p>
-          <a:p>
-            <a:r>
-              <a:rPr lang="en-US" dirty="0" smtClean="0"/>
-              <a:t># </a:t>
-            </a:r>
-            <a:r>
-              <a:rPr lang="en-US" dirty="0"/>
-              <a:t>删除工作区文件，并且将这次删除放入暂存区 </a:t>
-            </a:r>
-            <a:endParaRPr lang="zh-CN" altLang="en-US" dirty="0" smtClean="0"/>
-          </a:p>
-          <a:p>
-            <a:r>
-              <a:rPr lang="en-US" dirty="0" smtClean="0"/>
-              <a:t>$ </a:t>
-            </a:r>
-            <a:r>
-              <a:rPr lang="en-US" dirty="0" err="1"/>
-              <a:t>git</a:t>
-            </a:r>
-            <a:r>
-              <a:rPr lang="en-US" dirty="0"/>
               <a:t> </a:t>
             </a:r>
             <a:r>
               <a:rPr lang="en-US" dirty="0" err="1"/>
-              <a:t>rm</a:t>
-            </a:r>
-            <a:r>
-              <a:rPr lang="en-US" dirty="0"/>
-              <a:t> [file1] [file2] ... </a:t>
-            </a:r>
-            <a:endParaRPr lang="zh-CN" altLang="en-US" dirty="0" smtClean="0"/>
-          </a:p>
-          <a:p>
-            <a:endParaRPr lang="zh-CN" altLang="en-US" dirty="0"/>
-          </a:p>
-          <a:p>
-            <a:r>
-              <a:rPr lang="en-US" dirty="0" smtClean="0"/>
-              <a:t># </a:t>
-            </a:r>
-            <a:r>
-              <a:rPr lang="en-US" dirty="0"/>
-              <a:t>停止追踪指定文件，但该文件会保留在工作区 </a:t>
-            </a:r>
-            <a:endParaRPr lang="zh-CN" altLang="en-US" dirty="0" smtClean="0"/>
-          </a:p>
-          <a:p>
-            <a:r>
-              <a:rPr lang="en-US" dirty="0" smtClean="0"/>
-              <a:t>$ </a:t>
+              <a:t>config</a:t>
+            </a:r>
+            <a:r>
+              <a:rPr lang="en-US" dirty="0"/>
+              <a:t> [--global] </a:t>
+            </a:r>
+            <a:r>
+              <a:rPr lang="en-US" dirty="0" err="1"/>
+              <a:t>user.name</a:t>
+            </a:r>
+            <a:r>
+              <a:rPr lang="en-US" dirty="0"/>
+              <a:t> "[name]" $ </a:t>
             </a:r>
             <a:r>
               <a:rPr lang="en-US" dirty="0" err="1"/>
@@ -5705,40 +5581,19 @@
             </a:r>
             <a:r>
               <a:rPr lang="en-US" dirty="0" err="1"/>
-              <a:t>rm</a:t>
-            </a:r>
-            <a:r>
-              <a:rPr lang="en-US" dirty="0"/>
-              <a:t> --cached [file] </a:t>
-            </a:r>
-            <a:endParaRPr lang="zh-CN" altLang="en-US" dirty="0" smtClean="0"/>
-          </a:p>
-          <a:p>
-            <a:endParaRPr lang="zh-CN" altLang="en-US" dirty="0"/>
-          </a:p>
-          <a:p>
-            <a:r>
-              <a:rPr lang="en-US" dirty="0" smtClean="0"/>
-              <a:t># </a:t>
-            </a:r>
-            <a:r>
-              <a:rPr lang="en-US" dirty="0"/>
-              <a:t>改名文件，并且将这个改名放入暂存区 </a:t>
-            </a:r>
-            <a:endParaRPr lang="zh-CN" altLang="en-US" dirty="0" smtClean="0"/>
-          </a:p>
-          <a:p>
-            <a:r>
-              <a:rPr lang="en-US" dirty="0" smtClean="0"/>
-              <a:t>$ </a:t>
-            </a:r>
-            <a:r>
-              <a:rPr lang="en-US" dirty="0" err="1"/>
-              <a:t>git</a:t>
-            </a:r>
-            <a:r>
-              <a:rPr lang="en-US" dirty="0"/>
-              <a:t> mv [file-original] [file-renamed]</a:t>
+              <a:t>config</a:t>
+            </a:r>
+            <a:r>
+              <a:rPr lang="en-US" dirty="0"/>
+              <a:t> [--global] </a:t>
+            </a:r>
+            <a:r>
+              <a:rPr lang="en-US" dirty="0" err="1"/>
+              <a:t>user.email</a:t>
+            </a:r>
+            <a:r>
+              <a:rPr lang="en-US" dirty="0"/>
+              <a:t> "[email address]"</a:t>
             </a:r>
           </a:p>
         </p:txBody>
@@ -5746,7 +5601,7 @@
     </p:spTree>
     <p:extLst>
       <p:ext uri="{BB962C8B-B14F-4D97-AF65-F5344CB8AC3E}">
-        <p14:creationId xmlns:p14="http://schemas.microsoft.com/office/powerpoint/2010/main" val="39396587"/>
+        <p14:creationId xmlns:p14="http://schemas.microsoft.com/office/powerpoint/2010/main" val="1656373695"/>
       </p:ext>
     </p:extLst>
   </p:cSld>
@@ -5841,9 +5696,18 @@
           <a:lstStyle/>
           <a:p>
             <a:r>
-              <a:rPr lang="zh-CN" altLang="en-US" b="0" dirty="0"/>
-              <a:t>代码提交</a:t>
-            </a:r>
+              <a:rPr lang="mr-IN" b="0" dirty="0" err="1"/>
+              <a:t>增加</a:t>
+            </a:r>
+            <a:r>
+              <a:rPr lang="mr-IN" b="0" dirty="0"/>
+              <a:t>/</a:t>
+            </a:r>
+            <a:r>
+              <a:rPr lang="mr-IN" b="0" dirty="0" err="1"/>
+              <a:t>删除文件</a:t>
+            </a:r>
+            <a:endParaRPr lang="mr-IN" b="0" dirty="0"/>
           </a:p>
         </p:txBody>
       </p:sp>
@@ -5855,8 +5719,8 @@
         </p:nvSpPr>
         <p:spPr>
           <a:xfrm>
-            <a:off x="250825" y="1143000"/>
-            <a:ext cx="8207375" cy="5355312"/>
+            <a:off x="246814" y="985087"/>
+            <a:ext cx="8439986" cy="5632311"/>
           </a:xfrm>
           <a:prstGeom prst="rect">
             <a:avLst/>
@@ -5871,7 +5735,7 @@
           <a:p>
             <a:r>
               <a:rPr lang="en-US" dirty="0"/>
-              <a:t># 提交暂存区到仓库区 </a:t>
+              <a:t># 添加指定文件到暂存区 </a:t>
             </a:r>
             <a:endParaRPr lang="zh-CN" altLang="en-US" dirty="0" smtClean="0"/>
           </a:p>
@@ -5886,7 +5750,7 @@
             </a:r>
             <a:r>
               <a:rPr lang="en-US" dirty="0"/>
-              <a:t> commit -m [message] </a:t>
+              <a:t> add [file1] [file2] ... </a:t>
             </a:r>
             <a:endParaRPr lang="zh-CN" altLang="en-US" dirty="0" smtClean="0"/>
           </a:p>
@@ -5900,7 +5764,7 @@
             </a:r>
             <a:r>
               <a:rPr lang="en-US" dirty="0"/>
-              <a:t>提交暂存区的指定文件到仓库区 </a:t>
+              <a:t>添加指定目录到暂存区，包括子目录 </a:t>
             </a:r>
             <a:endParaRPr lang="zh-CN" altLang="en-US" dirty="0" smtClean="0"/>
           </a:p>
@@ -5915,7 +5779,15 @@
             </a:r>
             <a:r>
               <a:rPr lang="en-US" dirty="0"/>
-              <a:t> commit [file1] [file2] ... -m [message] </a:t>
+              <a:t> add [</a:t>
+            </a:r>
+            <a:r>
+              <a:rPr lang="en-US" dirty="0" err="1"/>
+              <a:t>dir</a:t>
+            </a:r>
+            <a:r>
+              <a:rPr lang="en-US" dirty="0"/>
+              <a:t>] </a:t>
             </a:r>
             <a:endParaRPr lang="zh-CN" altLang="en-US" dirty="0" smtClean="0"/>
           </a:p>
@@ -5928,12 +5800,8 @@
               <a:t># </a:t>
             </a:r>
             <a:r>
-              <a:rPr lang="en-US" dirty="0" err="1"/>
-              <a:t>提交工作区自上次commit之后的变化，直接到仓库区</a:t>
-            </a:r>
-            <a:r>
-              <a:rPr lang="en-US" dirty="0"/>
-              <a:t> </a:t>
+              <a:rPr lang="en-US" dirty="0"/>
+              <a:t>添加当前目录的所有文件到暂存区 </a:t>
             </a:r>
             <a:endParaRPr lang="zh-CN" altLang="en-US" dirty="0" smtClean="0"/>
           </a:p>
@@ -5948,7 +5816,7 @@
             </a:r>
             <a:r>
               <a:rPr lang="en-US" dirty="0"/>
-              <a:t> commit -a </a:t>
+              <a:t> add . </a:t>
             </a:r>
             <a:endParaRPr lang="zh-CN" altLang="en-US" dirty="0" smtClean="0"/>
           </a:p>
@@ -5961,12 +5829,8 @@
               <a:t># </a:t>
             </a:r>
             <a:r>
-              <a:rPr lang="en-US" dirty="0" err="1"/>
-              <a:t>提交时显示所有diff信息</a:t>
-            </a:r>
-            <a:r>
-              <a:rPr lang="en-US" dirty="0"/>
-              <a:t> </a:t>
+              <a:rPr lang="en-US" dirty="0"/>
+              <a:t>对于同一个文件的多处变化，可以实现分次提交 </a:t>
             </a:r>
             <a:endParaRPr lang="zh-CN" altLang="en-US" dirty="0" smtClean="0"/>
           </a:p>
@@ -5981,7 +5845,7 @@
             </a:r>
             <a:r>
               <a:rPr lang="en-US" dirty="0"/>
-              <a:t> commit -v </a:t>
+              <a:t> add -p </a:t>
             </a:r>
             <a:endParaRPr lang="zh-CN" altLang="en-US" dirty="0" smtClean="0"/>
           </a:p>
@@ -5994,12 +5858,31 @@
               <a:t># </a:t>
             </a:r>
             <a:r>
-              <a:rPr lang="en-US" dirty="0" err="1"/>
-              <a:t>使用一次新的commit，替代上一次提交</a:t>
+              <a:rPr lang="en-US" dirty="0"/>
+              <a:t>删除工作区文件，并且将这次删除放入暂存区 </a:t>
+            </a:r>
+            <a:endParaRPr lang="zh-CN" altLang="en-US" dirty="0" smtClean="0"/>
+          </a:p>
+          <a:p>
+            <a:r>
+              <a:rPr lang="en-US" dirty="0" smtClean="0"/>
+              <a:t>$ </a:t>
+            </a:r>
+            <a:r>
+              <a:rPr lang="en-US" dirty="0" err="1"/>
+              <a:t>git</a:t>
             </a:r>
             <a:r>
               <a:rPr lang="en-US" dirty="0"/>
               <a:t> </a:t>
+            </a:r>
+            <a:r>
+              <a:rPr lang="en-US" dirty="0" err="1"/>
+              <a:t>rm</a:t>
+            </a:r>
+            <a:r>
+              <a:rPr lang="en-US" dirty="0"/>
+              <a:t> [file1] [file2] ... </a:t>
             </a:r>
             <a:endParaRPr lang="zh-CN" altLang="en-US" dirty="0" smtClean="0"/>
           </a:p>
@@ -6012,12 +5895,8 @@
               <a:t># </a:t>
             </a:r>
             <a:r>
-              <a:rPr lang="en-US" dirty="0" err="1"/>
-              <a:t>如果代码没有任何新变化，则用来改写上一次commit的提交信息</a:t>
-            </a:r>
-            <a:r>
-              <a:rPr lang="en-US" dirty="0"/>
-              <a:t> </a:t>
+              <a:rPr lang="en-US" dirty="0"/>
+              <a:t>停止追踪指定文件，但该文件会保留在工作区 </a:t>
             </a:r>
             <a:endParaRPr lang="zh-CN" altLang="en-US" dirty="0" smtClean="0"/>
           </a:p>
@@ -6032,7 +5911,15 @@
             </a:r>
             <a:r>
               <a:rPr lang="en-US" dirty="0"/>
-              <a:t> commit --amend -m [message] </a:t>
+              <a:t> </a:t>
+            </a:r>
+            <a:r>
+              <a:rPr lang="en-US" dirty="0" err="1"/>
+              <a:t>rm</a:t>
+            </a:r>
+            <a:r>
+              <a:rPr lang="en-US" dirty="0"/>
+              <a:t> --cached [file] </a:t>
             </a:r>
             <a:endParaRPr lang="zh-CN" altLang="en-US" dirty="0" smtClean="0"/>
           </a:p>
@@ -6045,12 +5932,8 @@
               <a:t># </a:t>
             </a:r>
             <a:r>
-              <a:rPr lang="en-US" dirty="0" err="1"/>
-              <a:t>重做上一次commit，并包括指定文件的新变化</a:t>
-            </a:r>
-            <a:r>
-              <a:rPr lang="en-US" dirty="0"/>
-              <a:t> </a:t>
+              <a:rPr lang="en-US" dirty="0"/>
+              <a:t>改名文件，并且将这个改名放入暂存区 </a:t>
             </a:r>
             <a:endParaRPr lang="zh-CN" altLang="en-US" dirty="0" smtClean="0"/>
           </a:p>
@@ -6065,7 +5948,7 @@
             </a:r>
             <a:r>
               <a:rPr lang="en-US" dirty="0"/>
-              <a:t> commit --amend [file1] [file2] ...</a:t>
+              <a:t> mv [file-original] [file-renamed]</a:t>
             </a:r>
           </a:p>
         </p:txBody>
@@ -6073,7 +5956,7 @@
     </p:spTree>
     <p:extLst>
       <p:ext uri="{BB962C8B-B14F-4D97-AF65-F5344CB8AC3E}">
-        <p14:creationId xmlns:p14="http://schemas.microsoft.com/office/powerpoint/2010/main" val="609267122"/>
+        <p14:creationId xmlns:p14="http://schemas.microsoft.com/office/powerpoint/2010/main" val="39396587"/>
       </p:ext>
     </p:extLst>
   </p:cSld>
@@ -6168,8 +6051,8 @@
           <a:lstStyle/>
           <a:p>
             <a:r>
-              <a:rPr lang="en-US" b="0" dirty="0"/>
-              <a:t>分支</a:t>
+              <a:rPr lang="zh-CN" altLang="en-US" b="0" dirty="0"/>
+              <a:t>代码提交</a:t>
             </a:r>
           </a:p>
         </p:txBody>
@@ -6183,7 +6066,7 @@
         <p:spPr>
           <a:xfrm>
             <a:off x="250825" y="1143000"/>
-            <a:ext cx="8207375" cy="3693319"/>
+            <a:ext cx="8207375" cy="5355312"/>
           </a:xfrm>
           <a:prstGeom prst="rect">
             <a:avLst/>
@@ -6198,7 +6081,7 @@
           <a:p>
             <a:r>
               <a:rPr lang="en-US" dirty="0"/>
-              <a:t># 列出所有本地分支 </a:t>
+              <a:t># 提交暂存区到仓库区 </a:t>
             </a:r>
             <a:endParaRPr lang="zh-CN" altLang="en-US" dirty="0" smtClean="0"/>
           </a:p>
@@ -6213,9 +6096,12 @@
             </a:r>
             <a:r>
               <a:rPr lang="en-US" dirty="0"/>
-              <a:t> branch </a:t>
+              <a:t> commit -m [message] </a:t>
             </a:r>
             <a:endParaRPr lang="zh-CN" altLang="en-US" dirty="0" smtClean="0"/>
+          </a:p>
+          <a:p>
+            <a:endParaRPr lang="zh-CN" altLang="en-US" dirty="0"/>
           </a:p>
           <a:p>
             <a:r>
@@ -6224,7 +6110,7 @@
             </a:r>
             <a:r>
               <a:rPr lang="en-US" dirty="0"/>
-              <a:t>列出所有远程分支 </a:t>
+              <a:t>提交暂存区的指定文件到仓库区 </a:t>
             </a:r>
             <a:endParaRPr lang="zh-CN" altLang="en-US" dirty="0" smtClean="0"/>
           </a:p>
@@ -6239,135 +6125,157 @@
             </a:r>
             <a:r>
               <a:rPr lang="en-US" dirty="0"/>
-              <a:t> branch -r # 列出所有本地分支和远程分支 $ </a:t>
-            </a:r>
-            <a:r>
-              <a:rPr lang="en-US" dirty="0" err="1"/>
-              <a:t>git</a:t>
-            </a:r>
-            <a:r>
-              <a:rPr lang="en-US" dirty="0"/>
-              <a:t> branch -a # 新建一个分支，但依然停留在当前分支 $ </a:t>
-            </a:r>
-            <a:r>
-              <a:rPr lang="en-US" dirty="0" err="1"/>
-              <a:t>git</a:t>
-            </a:r>
-            <a:r>
-              <a:rPr lang="en-US" dirty="0"/>
-              <a:t> branch [branch-name] # 新建一个分支，并切换到该分支 $ </a:t>
-            </a:r>
-            <a:r>
-              <a:rPr lang="en-US" dirty="0" err="1"/>
-              <a:t>git</a:t>
-            </a:r>
-            <a:r>
-              <a:rPr lang="en-US" dirty="0"/>
-              <a:t> checkout -b [branch] # </a:t>
-            </a:r>
-            <a:r>
-              <a:rPr lang="en-US" dirty="0" err="1"/>
-              <a:t>新建一个分支，指向指定commit</a:t>
-            </a:r>
-            <a:r>
-              <a:rPr lang="en-US" dirty="0"/>
-              <a:t> $ </a:t>
-            </a:r>
-            <a:r>
-              <a:rPr lang="en-US" dirty="0" err="1"/>
-              <a:t>git</a:t>
-            </a:r>
-            <a:r>
-              <a:rPr lang="en-US" dirty="0"/>
-              <a:t> branch [branch] [commit] # 新建一个分支，与指定的远程分支建立追踪关系 $ </a:t>
-            </a:r>
-            <a:r>
-              <a:rPr lang="en-US" dirty="0" err="1"/>
-              <a:t>git</a:t>
-            </a:r>
-            <a:r>
-              <a:rPr lang="en-US" dirty="0"/>
-              <a:t> branch --track [branch] [remote-branch] # 切换到指定分支，并更新工作区 $ </a:t>
-            </a:r>
-            <a:r>
-              <a:rPr lang="en-US" dirty="0" err="1"/>
-              <a:t>git</a:t>
-            </a:r>
-            <a:r>
-              <a:rPr lang="en-US" dirty="0"/>
-              <a:t> checkout [branch-name] # 切换到上一个分支 $ </a:t>
-            </a:r>
-            <a:r>
-              <a:rPr lang="en-US" dirty="0" err="1"/>
-              <a:t>git</a:t>
-            </a:r>
-            <a:r>
-              <a:rPr lang="en-US" dirty="0"/>
-              <a:t> checkout - # 建立追踪关系，在现有分支与指定的远程分支之间 $ </a:t>
-            </a:r>
-            <a:r>
-              <a:rPr lang="en-US" dirty="0" err="1"/>
-              <a:t>git</a:t>
-            </a:r>
-            <a:r>
-              <a:rPr lang="en-US" dirty="0"/>
-              <a:t> branch --set-upstream [branch] [remote-branch] # 合并指定分支到当前分支 $ </a:t>
-            </a:r>
-            <a:r>
-              <a:rPr lang="en-US" dirty="0" err="1"/>
-              <a:t>git</a:t>
-            </a:r>
-            <a:r>
-              <a:rPr lang="en-US" dirty="0"/>
-              <a:t> merge [branch] # </a:t>
-            </a:r>
-            <a:r>
-              <a:rPr lang="en-US" dirty="0" err="1"/>
-              <a:t>选择一个commit，合并进当前分支</a:t>
-            </a:r>
-            <a:r>
-              <a:rPr lang="en-US" dirty="0"/>
-              <a:t> $ </a:t>
-            </a:r>
-            <a:r>
-              <a:rPr lang="en-US" dirty="0" err="1"/>
-              <a:t>git</a:t>
-            </a:r>
-            <a:r>
-              <a:rPr lang="en-US" dirty="0"/>
-              <a:t> cherry-pick [commit] # 删除分支 $ </a:t>
-            </a:r>
-            <a:r>
-              <a:rPr lang="en-US" dirty="0" err="1"/>
-              <a:t>git</a:t>
-            </a:r>
-            <a:r>
-              <a:rPr lang="en-US" dirty="0"/>
-              <a:t> branch -d [branch-name] # 删除远程分支 $ </a:t>
-            </a:r>
-            <a:r>
-              <a:rPr lang="en-US" dirty="0" err="1"/>
-              <a:t>git</a:t>
-            </a:r>
-            <a:r>
-              <a:rPr lang="en-US" dirty="0"/>
-              <a:t> push origin --delete [branch-name] $ </a:t>
-            </a:r>
-            <a:r>
-              <a:rPr lang="en-US" dirty="0" err="1"/>
-              <a:t>git</a:t>
-            </a:r>
-            <a:r>
-              <a:rPr lang="en-US" dirty="0"/>
-              <a:t> branch -</a:t>
-            </a:r>
-            <a:r>
-              <a:rPr lang="en-US" dirty="0" err="1"/>
-              <a:t>dr</a:t>
-            </a:r>
-            <a:r>
-              <a:rPr lang="en-US" dirty="0"/>
-              <a:t> [remote/branch]</a:t>
+              <a:t> commit [file1] [file2] ... -m [message] </a:t>
+            </a:r>
+            <a:endParaRPr lang="zh-CN" altLang="en-US" dirty="0" smtClean="0"/>
+          </a:p>
+          <a:p>
+            <a:endParaRPr lang="zh-CN" altLang="en-US" dirty="0"/>
+          </a:p>
+          <a:p>
+            <a:r>
+              <a:rPr lang="en-US" dirty="0" smtClean="0"/>
+              <a:t># </a:t>
+            </a:r>
+            <a:r>
+              <a:rPr lang="en-US" dirty="0" err="1"/>
+              <a:t>提交工作区自上次commit之后的变化，直接到仓库区</a:t>
+            </a:r>
+            <a:r>
+              <a:rPr lang="en-US" dirty="0"/>
+              <a:t> </a:t>
+            </a:r>
+            <a:endParaRPr lang="zh-CN" altLang="en-US" dirty="0" smtClean="0"/>
+          </a:p>
+          <a:p>
+            <a:r>
+              <a:rPr lang="en-US" dirty="0" smtClean="0"/>
+              <a:t>$ </a:t>
+            </a:r>
+            <a:r>
+              <a:rPr lang="en-US" dirty="0" err="1"/>
+              <a:t>git</a:t>
+            </a:r>
+            <a:r>
+              <a:rPr lang="en-US" dirty="0"/>
+              <a:t> commit -a </a:t>
+            </a:r>
+            <a:endParaRPr lang="zh-CN" altLang="en-US" dirty="0" smtClean="0"/>
+          </a:p>
+          <a:p>
+            <a:endParaRPr lang="zh-CN" altLang="en-US" dirty="0"/>
+          </a:p>
+          <a:p>
+            <a:r>
+              <a:rPr lang="en-US" dirty="0" smtClean="0"/>
+              <a:t># </a:t>
+            </a:r>
+            <a:r>
+              <a:rPr lang="en-US" dirty="0" err="1"/>
+              <a:t>提交时显示所有diff信息</a:t>
+            </a:r>
+            <a:r>
+              <a:rPr lang="en-US" dirty="0"/>
+              <a:t> </a:t>
+            </a:r>
+            <a:endParaRPr lang="zh-CN" altLang="en-US" dirty="0" smtClean="0"/>
+          </a:p>
+          <a:p>
+            <a:r>
+              <a:rPr lang="en-US" dirty="0" smtClean="0"/>
+              <a:t>$ </a:t>
+            </a:r>
+            <a:r>
+              <a:rPr lang="en-US" dirty="0" err="1"/>
+              <a:t>git</a:t>
+            </a:r>
+            <a:r>
+              <a:rPr lang="en-US" dirty="0"/>
+              <a:t> commit -v </a:t>
+            </a:r>
+            <a:endParaRPr lang="zh-CN" altLang="en-US" dirty="0" smtClean="0"/>
+          </a:p>
+          <a:p>
+            <a:endParaRPr lang="zh-CN" altLang="en-US" dirty="0"/>
+          </a:p>
+          <a:p>
+            <a:r>
+              <a:rPr lang="en-US" dirty="0" smtClean="0"/>
+              <a:t># </a:t>
+            </a:r>
+            <a:r>
+              <a:rPr lang="en-US" dirty="0" err="1"/>
+              <a:t>使用一次新的commit，替代上一次提交</a:t>
+            </a:r>
+            <a:r>
+              <a:rPr lang="en-US" dirty="0"/>
+              <a:t> </a:t>
+            </a:r>
+            <a:endParaRPr lang="zh-CN" altLang="en-US" dirty="0" smtClean="0"/>
+          </a:p>
+          <a:p>
+            <a:endParaRPr lang="zh-CN" altLang="en-US" dirty="0"/>
+          </a:p>
+          <a:p>
+            <a:r>
+              <a:rPr lang="en-US" dirty="0" smtClean="0"/>
+              <a:t># </a:t>
+            </a:r>
+            <a:r>
+              <a:rPr lang="en-US" dirty="0" err="1"/>
+              <a:t>如果代码没有任何新变化，则用来改写上一次commit的提交信息</a:t>
+            </a:r>
+            <a:r>
+              <a:rPr lang="en-US" dirty="0"/>
+              <a:t> </a:t>
+            </a:r>
+            <a:endParaRPr lang="zh-CN" altLang="en-US" dirty="0" smtClean="0"/>
+          </a:p>
+          <a:p>
+            <a:r>
+              <a:rPr lang="en-US" dirty="0" smtClean="0"/>
+              <a:t>$ </a:t>
+            </a:r>
+            <a:r>
+              <a:rPr lang="en-US" dirty="0" err="1"/>
+              <a:t>git</a:t>
+            </a:r>
+            <a:r>
+              <a:rPr lang="en-US" dirty="0"/>
+              <a:t> commit --amend -m [message] </a:t>
+            </a:r>
+            <a:endParaRPr lang="zh-CN" altLang="en-US" dirty="0" smtClean="0"/>
+          </a:p>
+          <a:p>
+            <a:endParaRPr lang="zh-CN" altLang="en-US" dirty="0"/>
+          </a:p>
+          <a:p>
+            <a:r>
+              <a:rPr lang="en-US" dirty="0" smtClean="0"/>
+              <a:t># </a:t>
+            </a:r>
+            <a:r>
+              <a:rPr lang="en-US" dirty="0" err="1"/>
+              <a:t>重做上一次commit，并包括指定文件的新变化</a:t>
+            </a:r>
+            <a:r>
+              <a:rPr lang="en-US" dirty="0"/>
+              <a:t> </a:t>
+            </a:r>
+            <a:endParaRPr lang="zh-CN" altLang="en-US" dirty="0" smtClean="0"/>
+          </a:p>
+          <a:p>
+            <a:r>
+              <a:rPr lang="en-US" dirty="0" smtClean="0"/>
+              <a:t>$ </a:t>
+            </a:r>
+            <a:r>
+              <a:rPr lang="en-US" dirty="0" err="1"/>
+              <a:t>git</a:t>
+            </a:r>
+            <a:r>
+              <a:rPr lang="en-US" dirty="0"/>
+              <a:t> commit --amend [file1] [file2] ...</a:t>
             </a:r>
           </a:p>
         </p:txBody>
@@ -6375,7 +6283,7 @@
     </p:spTree>
     <p:extLst>
       <p:ext uri="{BB962C8B-B14F-4D97-AF65-F5344CB8AC3E}">
-        <p14:creationId xmlns:p14="http://schemas.microsoft.com/office/powerpoint/2010/main" val="137075088"/>
+        <p14:creationId xmlns:p14="http://schemas.microsoft.com/office/powerpoint/2010/main" val="609267122"/>
       </p:ext>
     </p:extLst>
   </p:cSld>
@@ -6477,7 +6385,6 @@
               <a:rPr lang="zh-CN" altLang="en-US" b="0" dirty="0"/>
               <a:t>工作流</a:t>
             </a:r>
-            <a:endParaRPr lang="zh-CN" altLang="en-US" b="0" dirty="0"/>
           </a:p>
         </p:txBody>
       </p:sp>
@@ -6715,8 +6622,8 @@
           <a:lstStyle/>
           <a:p>
             <a:r>
-              <a:rPr lang="zh-CN" altLang="en-US" b="0" dirty="0"/>
-              <a:t>标签</a:t>
+              <a:rPr lang="en-US" b="0" dirty="0"/>
+              <a:t>分支</a:t>
             </a:r>
           </a:p>
         </p:txBody>
@@ -6730,7 +6637,7 @@
         <p:spPr>
           <a:xfrm>
             <a:off x="250825" y="1143000"/>
-            <a:ext cx="8207375" cy="1477328"/>
+            <a:ext cx="8207375" cy="3693319"/>
           </a:xfrm>
           <a:prstGeom prst="rect">
             <a:avLst/>
@@ -6745,11 +6652,76 @@
           <a:p>
             <a:r>
               <a:rPr lang="en-US" dirty="0"/>
+              <a:t># 列出所有本地分支 </a:t>
+            </a:r>
+            <a:endParaRPr lang="zh-CN" altLang="en-US" dirty="0" smtClean="0"/>
+          </a:p>
+          <a:p>
+            <a:r>
+              <a:rPr lang="en-US" dirty="0" smtClean="0"/>
+              <a:t>$ </a:t>
+            </a:r>
+            <a:r>
+              <a:rPr lang="en-US" dirty="0" err="1"/>
+              <a:t>git</a:t>
+            </a:r>
+            <a:r>
+              <a:rPr lang="en-US" dirty="0"/>
+              <a:t> branch </a:t>
+            </a:r>
+            <a:endParaRPr lang="zh-CN" altLang="en-US" dirty="0" smtClean="0"/>
+          </a:p>
+          <a:p>
+            <a:r>
+              <a:rPr lang="en-US" dirty="0" smtClean="0"/>
               <a:t># </a:t>
             </a:r>
             <a:r>
-              <a:rPr lang="en-US" dirty="0" err="1"/>
-              <a:t>列出所有tag</a:t>
+              <a:rPr lang="en-US" dirty="0"/>
+              <a:t>列出所有远程分支 </a:t>
+            </a:r>
+            <a:endParaRPr lang="zh-CN" altLang="en-US" dirty="0" smtClean="0"/>
+          </a:p>
+          <a:p>
+            <a:r>
+              <a:rPr lang="en-US" dirty="0" smtClean="0"/>
+              <a:t>$ </a:t>
+            </a:r>
+            <a:r>
+              <a:rPr lang="en-US" dirty="0" err="1"/>
+              <a:t>git</a:t>
+            </a:r>
+            <a:r>
+              <a:rPr lang="en-US" dirty="0"/>
+              <a:t> branch -r # 列出所有本地分支和远程分支 $ </a:t>
+            </a:r>
+            <a:r>
+              <a:rPr lang="en-US" dirty="0" err="1"/>
+              <a:t>git</a:t>
+            </a:r>
+            <a:r>
+              <a:rPr lang="en-US" dirty="0"/>
+              <a:t> branch -a # 新建一个分支，但依然停留在当前分支 $ </a:t>
+            </a:r>
+            <a:r>
+              <a:rPr lang="en-US" dirty="0" err="1"/>
+              <a:t>git</a:t>
+            </a:r>
+            <a:r>
+              <a:rPr lang="en-US" dirty="0"/>
+              <a:t> branch [branch-name] # 新建一个分支，并切换到该分支 $ </a:t>
+            </a:r>
+            <a:r>
+              <a:rPr lang="en-US" dirty="0" err="1"/>
+              <a:t>git</a:t>
+            </a:r>
+            <a:r>
+              <a:rPr lang="en-US" dirty="0"/>
+              <a:t> checkout -b [branch] # </a:t>
+            </a:r>
+            <a:r>
+              <a:rPr lang="en-US" dirty="0" err="1"/>
+              <a:t>新建一个分支，指向指定commit</a:t>
             </a:r>
             <a:r>
               <a:rPr lang="en-US" dirty="0"/>
@@ -6761,11 +6733,51 @@
             </a:r>
             <a:r>
               <a:rPr lang="en-US" dirty="0"/>
-              <a:t> tag # </a:t>
-            </a:r>
-            <a:r>
-              <a:rPr lang="en-US" dirty="0" err="1"/>
-              <a:t>新建一个tag在当前commit</a:t>
+              <a:t> branch [branch] [commit] # 新建一个分支，与指定的远程分支建立追踪关系 $ </a:t>
+            </a:r>
+            <a:r>
+              <a:rPr lang="en-US" dirty="0" err="1"/>
+              <a:t>git</a:t>
+            </a:r>
+            <a:r>
+              <a:rPr lang="en-US" dirty="0"/>
+              <a:t> branch --track [branch] [remote-branch] # 切换到指定分支，并更新工作区 $ </a:t>
+            </a:r>
+            <a:r>
+              <a:rPr lang="en-US" dirty="0" err="1"/>
+              <a:t>git</a:t>
+            </a:r>
+            <a:r>
+              <a:rPr lang="en-US" dirty="0"/>
+              <a:t> checkout [branch-name] # 切换到上一个分支 $ </a:t>
+            </a:r>
+            <a:r>
+              <a:rPr lang="en-US" dirty="0" err="1"/>
+              <a:t>git</a:t>
+            </a:r>
+            <a:r>
+              <a:rPr lang="en-US" dirty="0"/>
+              <a:t> checkout - # 建立追踪关系，在现有分支与指定的远程分支之间 $ </a:t>
+            </a:r>
+            <a:r>
+              <a:rPr lang="en-US" dirty="0" err="1"/>
+              <a:t>git</a:t>
+            </a:r>
+            <a:r>
+              <a:rPr lang="en-US" dirty="0"/>
+              <a:t> branch --set-upstream [branch] [remote-branch] # 合并指定分支到当前分支 $ </a:t>
+            </a:r>
+            <a:r>
+              <a:rPr lang="en-US" dirty="0" err="1"/>
+              <a:t>git</a:t>
+            </a:r>
+            <a:r>
+              <a:rPr lang="en-US" dirty="0"/>
+              <a:t> merge [branch] # </a:t>
+            </a:r>
+            <a:r>
+              <a:rPr lang="en-US" dirty="0" err="1"/>
+              <a:t>选择一个commit，合并进当前分支</a:t>
             </a:r>
             <a:r>
               <a:rPr lang="en-US" dirty="0"/>
@@ -6777,127 +6789,39 @@
             </a:r>
             <a:r>
               <a:rPr lang="en-US" dirty="0"/>
-              <a:t> tag [tag] # </a:t>
-            </a:r>
-            <a:r>
-              <a:rPr lang="en-US" dirty="0" err="1"/>
-              <a:t>新建一个tag在指定commit</a:t>
-            </a:r>
-            <a:r>
-              <a:rPr lang="en-US" dirty="0"/>
-              <a:t> $ </a:t>
-            </a:r>
-            <a:r>
-              <a:rPr lang="en-US" dirty="0" err="1"/>
-              <a:t>git</a:t>
-            </a:r>
-            <a:r>
-              <a:rPr lang="en-US" dirty="0"/>
-              <a:t> tag [tag] [commit] # </a:t>
-            </a:r>
-            <a:r>
-              <a:rPr lang="en-US" dirty="0" err="1"/>
-              <a:t>删除本地tag</a:t>
-            </a:r>
-            <a:r>
-              <a:rPr lang="en-US" dirty="0"/>
-              <a:t> $ </a:t>
-            </a:r>
-            <a:r>
-              <a:rPr lang="en-US" dirty="0" err="1"/>
-              <a:t>git</a:t>
-            </a:r>
-            <a:r>
-              <a:rPr lang="en-US" dirty="0"/>
-              <a:t> tag -d [tag] # </a:t>
-            </a:r>
-            <a:r>
-              <a:rPr lang="en-US" dirty="0" err="1"/>
-              <a:t>删除远程tag</a:t>
-            </a:r>
-            <a:r>
-              <a:rPr lang="en-US" dirty="0"/>
-              <a:t> $ </a:t>
-            </a:r>
-            <a:r>
-              <a:rPr lang="en-US" dirty="0" err="1"/>
-              <a:t>git</a:t>
-            </a:r>
-            <a:r>
-              <a:rPr lang="en-US" dirty="0"/>
-              <a:t> push origin :refs/tags/[</a:t>
-            </a:r>
-            <a:r>
-              <a:rPr lang="en-US" dirty="0" err="1"/>
-              <a:t>tagName</a:t>
-            </a:r>
-            <a:r>
-              <a:rPr lang="en-US" dirty="0"/>
-              <a:t>] # </a:t>
-            </a:r>
-            <a:r>
-              <a:rPr lang="en-US" dirty="0" err="1"/>
-              <a:t>查看tag信息</a:t>
-            </a:r>
-            <a:r>
-              <a:rPr lang="en-US" dirty="0"/>
-              <a:t> $ </a:t>
-            </a:r>
-            <a:r>
-              <a:rPr lang="en-US" dirty="0" err="1"/>
-              <a:t>git</a:t>
-            </a:r>
-            <a:r>
-              <a:rPr lang="en-US" dirty="0"/>
-              <a:t> show [tag] # </a:t>
-            </a:r>
-            <a:r>
-              <a:rPr lang="en-US" dirty="0" err="1"/>
-              <a:t>提交指定tag</a:t>
-            </a:r>
-            <a:r>
-              <a:rPr lang="en-US" dirty="0"/>
-              <a:t> $ </a:t>
-            </a:r>
-            <a:r>
-              <a:rPr lang="en-US" dirty="0" err="1"/>
-              <a:t>git</a:t>
-            </a:r>
-            <a:r>
-              <a:rPr lang="en-US" dirty="0"/>
-              <a:t> push [remote] [tag] # </a:t>
-            </a:r>
-            <a:r>
-              <a:rPr lang="en-US" dirty="0" err="1"/>
-              <a:t>提交所有tag</a:t>
-            </a:r>
-            <a:r>
-              <a:rPr lang="en-US" dirty="0"/>
-              <a:t> $ </a:t>
-            </a:r>
-            <a:r>
-              <a:rPr lang="en-US" dirty="0" err="1"/>
-              <a:t>git</a:t>
-            </a:r>
-            <a:r>
-              <a:rPr lang="en-US" dirty="0"/>
-              <a:t> push [remote] --tags # </a:t>
-            </a:r>
-            <a:r>
-              <a:rPr lang="en-US" dirty="0" err="1"/>
-              <a:t>新建一个分支，指向某个tag</a:t>
-            </a:r>
-            <a:r>
-              <a:rPr lang="en-US" dirty="0"/>
-              <a:t> $ </a:t>
-            </a:r>
-            <a:r>
-              <a:rPr lang="en-US" dirty="0" err="1"/>
-              <a:t>git</a:t>
-            </a:r>
-            <a:r>
-              <a:rPr lang="en-US" dirty="0"/>
-              <a:t> checkout -b [branch] [tag]</a:t>
+              <a:t> cherry-pick [commit] # 删除分支 $ </a:t>
+            </a:r>
+            <a:r>
+              <a:rPr lang="en-US" dirty="0" err="1"/>
+              <a:t>git</a:t>
+            </a:r>
+            <a:r>
+              <a:rPr lang="en-US" dirty="0"/>
+              <a:t> branch -d [branch-name] # 删除远程分支 $ </a:t>
+            </a:r>
+            <a:r>
+              <a:rPr lang="en-US" dirty="0" err="1"/>
+              <a:t>git</a:t>
+            </a:r>
+            <a:r>
+              <a:rPr lang="en-US" dirty="0"/>
+              <a:t> push origin --delete [branch-name] $ </a:t>
+            </a:r>
+            <a:r>
+              <a:rPr lang="en-US" dirty="0" err="1"/>
+              <a:t>git</a:t>
+            </a:r>
+            <a:r>
+              <a:rPr lang="en-US" dirty="0"/>
+              <a:t> branch -</a:t>
+            </a:r>
+            <a:r>
+              <a:rPr lang="en-US" dirty="0" err="1"/>
+              <a:t>dr</a:t>
+            </a:r>
+            <a:r>
+              <a:rPr lang="en-US" dirty="0"/>
+              <a:t> [remote/branch]</a:t>
             </a:r>
           </a:p>
         </p:txBody>
@@ -6905,7 +6829,7 @@
     </p:spTree>
     <p:extLst>
       <p:ext uri="{BB962C8B-B14F-4D97-AF65-F5344CB8AC3E}">
-        <p14:creationId xmlns:p14="http://schemas.microsoft.com/office/powerpoint/2010/main" val="1900630121"/>
+        <p14:creationId xmlns:p14="http://schemas.microsoft.com/office/powerpoint/2010/main" val="137075088"/>
       </p:ext>
     </p:extLst>
   </p:cSld>
@@ -7001,7 +6925,7 @@
           <a:p>
             <a:r>
               <a:rPr lang="zh-CN" altLang="en-US" b="0" dirty="0"/>
-              <a:t>查看信息</a:t>
+              <a:t>标签</a:t>
             </a:r>
           </a:p>
         </p:txBody>
@@ -7015,7 +6939,7 @@
         <p:spPr>
           <a:xfrm>
             <a:off x="250825" y="1143000"/>
-            <a:ext cx="8207375" cy="4524315"/>
+            <a:ext cx="8207375" cy="1477328"/>
           </a:xfrm>
           <a:prstGeom prst="rect">
             <a:avLst/>
@@ -7030,27 +6954,11 @@
           <a:p>
             <a:r>
               <a:rPr lang="en-US" dirty="0"/>
-              <a:t># 显示有变更的文件 $ </a:t>
-            </a:r>
-            <a:r>
-              <a:rPr lang="en-US" dirty="0" err="1"/>
-              <a:t>git</a:t>
-            </a:r>
-            <a:r>
-              <a:rPr lang="en-US" dirty="0"/>
-              <a:t> status # 显示当前分支的版本历史 $ </a:t>
-            </a:r>
-            <a:r>
-              <a:rPr lang="en-US" dirty="0" err="1"/>
-              <a:t>git</a:t>
-            </a:r>
-            <a:r>
-              <a:rPr lang="en-US" dirty="0"/>
-              <a:t> log # </a:t>
-            </a:r>
-            <a:r>
-              <a:rPr lang="en-US" dirty="0" err="1"/>
-              <a:t>显示commit历史，以及每次commit发生变更的文件</a:t>
+              <a:t># </a:t>
+            </a:r>
+            <a:r>
+              <a:rPr lang="en-US" dirty="0" err="1"/>
+              <a:t>列出所有tag</a:t>
             </a:r>
             <a:r>
               <a:rPr lang="en-US" dirty="0"/>
@@ -7062,19 +6970,11 @@
             </a:r>
             <a:r>
               <a:rPr lang="en-US" dirty="0"/>
-              <a:t> log --stat # 搜索提交历史，根据关键词 $ </a:t>
-            </a:r>
-            <a:r>
-              <a:rPr lang="en-US" dirty="0" err="1"/>
-              <a:t>git</a:t>
-            </a:r>
-            <a:r>
-              <a:rPr lang="en-US" dirty="0"/>
-              <a:t> log -S [keyword] # </a:t>
-            </a:r>
-            <a:r>
-              <a:rPr lang="en-US" dirty="0" err="1"/>
-              <a:t>显示某个commit之后的所有变动，每个commit占据一行</a:t>
+              <a:t> tag # </a:t>
+            </a:r>
+            <a:r>
+              <a:rPr lang="en-US" dirty="0" err="1"/>
+              <a:t>新建一个tag在当前commit</a:t>
             </a:r>
             <a:r>
               <a:rPr lang="en-US" dirty="0"/>
@@ -7086,11 +6986,11 @@
             </a:r>
             <a:r>
               <a:rPr lang="en-US" dirty="0"/>
-              <a:t> log [tag] HEAD --pretty=format:%s # </a:t>
-            </a:r>
-            <a:r>
-              <a:rPr lang="en-US" dirty="0" err="1"/>
-              <a:t>显示某个commit之后的所有变动，其"提交说明"必须符合搜索条件</a:t>
+              <a:t> tag [tag] # </a:t>
+            </a:r>
+            <a:r>
+              <a:rPr lang="en-US" dirty="0" err="1"/>
+              <a:t>新建一个tag在指定commit</a:t>
             </a:r>
             <a:r>
               <a:rPr lang="en-US" dirty="0"/>
@@ -7102,43 +7002,11 @@
             </a:r>
             <a:r>
               <a:rPr lang="en-US" dirty="0"/>
-              <a:t> log [tag] HEAD --</a:t>
-            </a:r>
-            <a:r>
-              <a:rPr lang="en-US" dirty="0" err="1"/>
-              <a:t>grep</a:t>
-            </a:r>
-            <a:r>
-              <a:rPr lang="en-US" dirty="0"/>
-              <a:t> feature # 显示某个文件的版本历史，包括文件改名 $ </a:t>
-            </a:r>
-            <a:r>
-              <a:rPr lang="en-US" dirty="0" err="1"/>
-              <a:t>git</a:t>
-            </a:r>
-            <a:r>
-              <a:rPr lang="en-US" dirty="0"/>
-              <a:t> log --follow [file] $ </a:t>
-            </a:r>
-            <a:r>
-              <a:rPr lang="en-US" dirty="0" err="1"/>
-              <a:t>git</a:t>
-            </a:r>
-            <a:r>
-              <a:rPr lang="en-US" dirty="0"/>
-              <a:t> </a:t>
-            </a:r>
-            <a:r>
-              <a:rPr lang="en-US" dirty="0" err="1"/>
-              <a:t>whatchanged</a:t>
-            </a:r>
-            <a:r>
-              <a:rPr lang="en-US" dirty="0"/>
-              <a:t> [file] # </a:t>
-            </a:r>
-            <a:r>
-              <a:rPr lang="en-US" dirty="0" err="1"/>
-              <a:t>显示指定文件相关的每一次diff</a:t>
+              <a:t> tag [tag] [commit] # </a:t>
+            </a:r>
+            <a:r>
+              <a:rPr lang="en-US" dirty="0" err="1"/>
+              <a:t>删除本地tag</a:t>
             </a:r>
             <a:r>
               <a:rPr lang="en-US" dirty="0"/>
@@ -7150,67 +7018,11 @@
             </a:r>
             <a:r>
               <a:rPr lang="en-US" dirty="0"/>
-              <a:t> log -p [file] # 显示过去5次提交 $ </a:t>
-            </a:r>
-            <a:r>
-              <a:rPr lang="en-US" dirty="0" err="1"/>
-              <a:t>git</a:t>
-            </a:r>
-            <a:r>
-              <a:rPr lang="en-US" dirty="0"/>
-              <a:t> log -5 --pretty --</a:t>
-            </a:r>
-            <a:r>
-              <a:rPr lang="en-US" dirty="0" err="1"/>
-              <a:t>oneline</a:t>
-            </a:r>
-            <a:r>
-              <a:rPr lang="en-US" dirty="0"/>
-              <a:t> # 显示所有提交过的用户，按提交次数排序 $ </a:t>
-            </a:r>
-            <a:r>
-              <a:rPr lang="en-US" dirty="0" err="1"/>
-              <a:t>git</a:t>
-            </a:r>
-            <a:r>
-              <a:rPr lang="en-US" dirty="0"/>
-              <a:t> </a:t>
-            </a:r>
-            <a:r>
-              <a:rPr lang="en-US" dirty="0" err="1"/>
-              <a:t>shortlog</a:t>
-            </a:r>
-            <a:r>
-              <a:rPr lang="en-US" dirty="0"/>
-              <a:t> -</a:t>
-            </a:r>
-            <a:r>
-              <a:rPr lang="en-US" dirty="0" err="1"/>
-              <a:t>sn</a:t>
-            </a:r>
-            <a:r>
-              <a:rPr lang="en-US" dirty="0"/>
-              <a:t> # 显示指定文件是什么人在什么时间修改过 $ </a:t>
-            </a:r>
-            <a:r>
-              <a:rPr lang="en-US" dirty="0" err="1"/>
-              <a:t>git</a:t>
-            </a:r>
-            <a:r>
-              <a:rPr lang="en-US" dirty="0"/>
-              <a:t> blame [file] # 显示暂存区和工作区的差异 $ </a:t>
-            </a:r>
-            <a:r>
-              <a:rPr lang="en-US" dirty="0" err="1"/>
-              <a:t>git</a:t>
-            </a:r>
-            <a:r>
-              <a:rPr lang="en-US" dirty="0"/>
-              <a:t> diff # </a:t>
-            </a:r>
-            <a:r>
-              <a:rPr lang="en-US" dirty="0" err="1"/>
-              <a:t>显示暂存区和上一个commit的差异</a:t>
+              <a:t> tag -d [tag] # </a:t>
+            </a:r>
+            <a:r>
+              <a:rPr lang="en-US" dirty="0" err="1"/>
+              <a:t>删除远程tag</a:t>
             </a:r>
             <a:r>
               <a:rPr lang="en-US" dirty="0"/>
@@ -7222,11 +7034,19 @@
             </a:r>
             <a:r>
               <a:rPr lang="en-US" dirty="0"/>
-              <a:t> diff --cached [file] # </a:t>
-            </a:r>
-            <a:r>
-              <a:rPr lang="en-US" dirty="0" err="1"/>
-              <a:t>显示工作区与当前分支最新commit之间的差异</a:t>
+              <a:t> push origin :refs/tags/[</a:t>
+            </a:r>
+            <a:r>
+              <a:rPr lang="en-US" dirty="0" err="1"/>
+              <a:t>tagName</a:t>
+            </a:r>
+            <a:r>
+              <a:rPr lang="en-US" dirty="0"/>
+              <a:t>] # </a:t>
+            </a:r>
+            <a:r>
+              <a:rPr lang="en-US" dirty="0" err="1"/>
+              <a:t>查看tag信息</a:t>
             </a:r>
             <a:r>
               <a:rPr lang="en-US" dirty="0"/>
@@ -7238,76 +7058,63 @@
             </a:r>
             <a:r>
               <a:rPr lang="en-US" dirty="0"/>
-              <a:t> diff HEAD # 显示两次提交之间的差异 $ </a:t>
-            </a:r>
-            <a:r>
-              <a:rPr lang="en-US" dirty="0" err="1"/>
-              <a:t>git</a:t>
-            </a:r>
-            <a:r>
-              <a:rPr lang="en-US" dirty="0"/>
-              <a:t> diff [first-branch]...[second-branch] # 显示今天你写了多少行代码 $ </a:t>
-            </a:r>
-            <a:r>
-              <a:rPr lang="en-US" dirty="0" err="1"/>
-              <a:t>git</a:t>
-            </a:r>
-            <a:r>
-              <a:rPr lang="en-US" dirty="0"/>
-              <a:t> diff --</a:t>
-            </a:r>
-            <a:r>
-              <a:rPr lang="en-US" dirty="0" err="1"/>
-              <a:t>shortstat</a:t>
-            </a:r>
-            <a:r>
-              <a:rPr lang="en-US" dirty="0"/>
-              <a:t> "@{0 day ago}" # 显示某次提交的元数据和内容变化 $ </a:t>
-            </a:r>
-            <a:r>
-              <a:rPr lang="en-US" dirty="0" err="1"/>
-              <a:t>git</a:t>
-            </a:r>
-            <a:r>
-              <a:rPr lang="en-US" dirty="0"/>
-              <a:t> show [commit] # 显示某次提交发生变化的文件 $ </a:t>
-            </a:r>
-            <a:r>
-              <a:rPr lang="en-US" dirty="0" err="1"/>
-              <a:t>git</a:t>
-            </a:r>
-            <a:r>
-              <a:rPr lang="en-US" dirty="0"/>
-              <a:t> show --name-only [commit] # 显示某次提交时，某个文件的内容 $ </a:t>
-            </a:r>
-            <a:r>
-              <a:rPr lang="en-US" dirty="0" err="1"/>
-              <a:t>git</a:t>
-            </a:r>
-            <a:r>
-              <a:rPr lang="en-US" dirty="0"/>
-              <a:t> show [commit]:[filename] # 显示当前分支的最近几次提交 $ </a:t>
-            </a:r>
-            <a:r>
-              <a:rPr lang="en-US" dirty="0" err="1"/>
-              <a:t>git</a:t>
-            </a:r>
-            <a:r>
-              <a:rPr lang="en-US" dirty="0"/>
-              <a:t> </a:t>
-            </a:r>
-            <a:r>
-              <a:rPr lang="en-US" dirty="0" err="1"/>
-              <a:t>reflog</a:t>
-            </a:r>
-            <a:endParaRPr lang="en-US" dirty="0"/>
+              <a:t> show [tag] # </a:t>
+            </a:r>
+            <a:r>
+              <a:rPr lang="en-US" dirty="0" err="1"/>
+              <a:t>提交指定tag</a:t>
+            </a:r>
+            <a:r>
+              <a:rPr lang="en-US" dirty="0"/>
+              <a:t> $ </a:t>
+            </a:r>
+            <a:r>
+              <a:rPr lang="en-US" dirty="0" err="1"/>
+              <a:t>git</a:t>
+            </a:r>
+            <a:r>
+              <a:rPr lang="en-US" dirty="0"/>
+              <a:t> push [remote] [tag] # </a:t>
+            </a:r>
+            <a:r>
+              <a:rPr lang="en-US" dirty="0" err="1"/>
+              <a:t>提交所有tag</a:t>
+            </a:r>
+            <a:r>
+              <a:rPr lang="en-US" dirty="0"/>
+              <a:t> $ </a:t>
+            </a:r>
+            <a:r>
+              <a:rPr lang="en-US" dirty="0" err="1"/>
+              <a:t>git</a:t>
+            </a:r>
+            <a:r>
+              <a:rPr lang="en-US" dirty="0"/>
+              <a:t> push [remote] --tags # </a:t>
+            </a:r>
+            <a:r>
+              <a:rPr lang="en-US" dirty="0" err="1"/>
+              <a:t>新建一个分支，指向某个tag</a:t>
+            </a:r>
+            <a:r>
+              <a:rPr lang="en-US" dirty="0"/>
+              <a:t> $ </a:t>
+            </a:r>
+            <a:r>
+              <a:rPr lang="en-US" dirty="0" err="1"/>
+              <a:t>git</a:t>
+            </a:r>
+            <a:r>
+              <a:rPr lang="en-US" dirty="0"/>
+              <a:t> checkout -b [branch] [tag]</a:t>
+            </a:r>
           </a:p>
         </p:txBody>
       </p:sp>
     </p:spTree>
     <p:extLst>
       <p:ext uri="{BB962C8B-B14F-4D97-AF65-F5344CB8AC3E}">
-        <p14:creationId xmlns:p14="http://schemas.microsoft.com/office/powerpoint/2010/main" val="1305964966"/>
+        <p14:creationId xmlns:p14="http://schemas.microsoft.com/office/powerpoint/2010/main" val="1900630121"/>
       </p:ext>
     </p:extLst>
   </p:cSld>
@@ -7403,13 +7210,8 @@
           <a:p>
             <a:r>
               <a:rPr lang="zh-CN" altLang="en-US" b="0" dirty="0"/>
-              <a:t>远程</a:t>
-            </a:r>
-            <a:r>
-              <a:rPr lang="zh-CN" altLang="en-US" b="0" dirty="0" smtClean="0"/>
-              <a:t>同步</a:t>
-            </a:r>
-            <a:endParaRPr lang="zh-CN" altLang="en-US" b="0" dirty="0"/>
+              <a:t>查看信息</a:t>
+            </a:r>
           </a:p>
         </p:txBody>
       </p:sp>
@@ -7422,7 +7224,7 @@
         <p:spPr>
           <a:xfrm>
             <a:off x="250825" y="1143000"/>
-            <a:ext cx="8207375" cy="1754326"/>
+            <a:ext cx="8207375" cy="4524315"/>
           </a:xfrm>
           <a:prstGeom prst="rect">
             <a:avLst/>
@@ -7437,95 +7239,284 @@
           <a:p>
             <a:r>
               <a:rPr lang="en-US" dirty="0"/>
-              <a:t># 下载远程仓库的所有变动 $ </a:t>
-            </a:r>
-            <a:r>
-              <a:rPr lang="en-US" dirty="0" err="1"/>
-              <a:t>git</a:t>
-            </a:r>
-            <a:r>
-              <a:rPr lang="en-US" dirty="0"/>
-              <a:t> fetch [remote] # 显示所有远程仓库 $ </a:t>
-            </a:r>
-            <a:r>
-              <a:rPr lang="en-US" dirty="0" err="1"/>
-              <a:t>git</a:t>
-            </a:r>
-            <a:r>
-              <a:rPr lang="en-US" dirty="0"/>
-              <a:t> remote -v # 显示某个远程仓库的信息 $ </a:t>
-            </a:r>
-            <a:r>
-              <a:rPr lang="en-US" dirty="0" err="1"/>
-              <a:t>git</a:t>
-            </a:r>
-            <a:r>
-              <a:rPr lang="en-US" dirty="0"/>
-              <a:t> remote show [remote] # 增加一个新的远程仓库，并命名 $ </a:t>
-            </a:r>
-            <a:r>
-              <a:rPr lang="en-US" dirty="0" err="1"/>
-              <a:t>git</a:t>
-            </a:r>
-            <a:r>
-              <a:rPr lang="en-US" dirty="0"/>
-              <a:t> remote add [</a:t>
-            </a:r>
-            <a:r>
-              <a:rPr lang="en-US" dirty="0" err="1"/>
-              <a:t>shortname</a:t>
-            </a:r>
-            <a:r>
-              <a:rPr lang="en-US" dirty="0"/>
-              <a:t>] [</a:t>
-            </a:r>
-            <a:r>
-              <a:rPr lang="en-US" dirty="0" err="1"/>
-              <a:t>url</a:t>
-            </a:r>
-            <a:r>
-              <a:rPr lang="en-US" dirty="0"/>
-              <a:t>] # 取回远程仓库的变化，并与本地分支合并 $ </a:t>
-            </a:r>
-            <a:r>
-              <a:rPr lang="en-US" dirty="0" err="1"/>
-              <a:t>git</a:t>
-            </a:r>
-            <a:r>
-              <a:rPr lang="en-US" dirty="0"/>
-              <a:t> pull [remote] [branch] # 上传本地指定分支到远程仓库 $ </a:t>
-            </a:r>
-            <a:r>
-              <a:rPr lang="en-US" dirty="0" err="1"/>
-              <a:t>git</a:t>
-            </a:r>
-            <a:r>
-              <a:rPr lang="en-US" dirty="0"/>
-              <a:t> push [remote] [branch] # 强行推送当前分支到远程仓库，即使有冲突 $ </a:t>
-            </a:r>
-            <a:r>
-              <a:rPr lang="en-US" dirty="0" err="1"/>
-              <a:t>git</a:t>
-            </a:r>
-            <a:r>
-              <a:rPr lang="en-US" dirty="0"/>
-              <a:t> push [remote] --force # 推送所有分支到远程仓库 $ </a:t>
-            </a:r>
-            <a:r>
-              <a:rPr lang="en-US" dirty="0" err="1"/>
-              <a:t>git</a:t>
-            </a:r>
-            <a:r>
-              <a:rPr lang="en-US" dirty="0"/>
-              <a:t> push [remote] --all</a:t>
-            </a:r>
+              <a:t># 显示有变更的文件 $ </a:t>
+            </a:r>
+            <a:r>
+              <a:rPr lang="en-US" dirty="0" err="1"/>
+              <a:t>git</a:t>
+            </a:r>
+            <a:r>
+              <a:rPr lang="en-US" dirty="0"/>
+              <a:t> status # 显示当前分支的版本历史 $ </a:t>
+            </a:r>
+            <a:r>
+              <a:rPr lang="en-US" dirty="0" err="1"/>
+              <a:t>git</a:t>
+            </a:r>
+            <a:r>
+              <a:rPr lang="en-US" dirty="0"/>
+              <a:t> log # </a:t>
+            </a:r>
+            <a:r>
+              <a:rPr lang="en-US" dirty="0" err="1"/>
+              <a:t>显示commit历史，以及每次commit发生变更的文件</a:t>
+            </a:r>
+            <a:r>
+              <a:rPr lang="en-US" dirty="0"/>
+              <a:t> $ </a:t>
+            </a:r>
+            <a:r>
+              <a:rPr lang="en-US" dirty="0" err="1"/>
+              <a:t>git</a:t>
+            </a:r>
+            <a:r>
+              <a:rPr lang="en-US" dirty="0"/>
+              <a:t> log --stat # 搜索提交历史，根据关键词 $ </a:t>
+            </a:r>
+            <a:r>
+              <a:rPr lang="en-US" dirty="0" err="1"/>
+              <a:t>git</a:t>
+            </a:r>
+            <a:r>
+              <a:rPr lang="en-US" dirty="0"/>
+              <a:t> log -S [keyword] # </a:t>
+            </a:r>
+            <a:r>
+              <a:rPr lang="en-US" dirty="0" err="1"/>
+              <a:t>显示某个commit之后的所有变动，每个commit占据一行</a:t>
+            </a:r>
+            <a:r>
+              <a:rPr lang="en-US" dirty="0"/>
+              <a:t> $ </a:t>
+            </a:r>
+            <a:r>
+              <a:rPr lang="en-US" dirty="0" err="1"/>
+              <a:t>git</a:t>
+            </a:r>
+            <a:r>
+              <a:rPr lang="en-US" dirty="0"/>
+              <a:t> log [tag] HEAD --pretty=format:%s # </a:t>
+            </a:r>
+            <a:r>
+              <a:rPr lang="en-US" dirty="0" err="1"/>
+              <a:t>显示某个commit之后的所有变动，其"提交说明"必须符合搜索条件</a:t>
+            </a:r>
+            <a:r>
+              <a:rPr lang="en-US" dirty="0"/>
+              <a:t> $ </a:t>
+            </a:r>
+            <a:r>
+              <a:rPr lang="en-US" dirty="0" err="1"/>
+              <a:t>git</a:t>
+            </a:r>
+            <a:r>
+              <a:rPr lang="en-US" dirty="0"/>
+              <a:t> log [tag] HEAD --</a:t>
+            </a:r>
+            <a:r>
+              <a:rPr lang="en-US" dirty="0" err="1"/>
+              <a:t>grep</a:t>
+            </a:r>
+            <a:r>
+              <a:rPr lang="en-US" dirty="0"/>
+              <a:t> feature # 显示某个文件的版本历史，包括文件改名 $ </a:t>
+            </a:r>
+            <a:r>
+              <a:rPr lang="en-US" dirty="0" err="1"/>
+              <a:t>git</a:t>
+            </a:r>
+            <a:r>
+              <a:rPr lang="en-US" dirty="0"/>
+              <a:t> log --follow [file] $ </a:t>
+            </a:r>
+            <a:r>
+              <a:rPr lang="en-US" dirty="0" err="1"/>
+              <a:t>git</a:t>
+            </a:r>
+            <a:r>
+              <a:rPr lang="en-US" dirty="0"/>
+              <a:t> </a:t>
+            </a:r>
+            <a:r>
+              <a:rPr lang="en-US" dirty="0" err="1"/>
+              <a:t>whatchanged</a:t>
+            </a:r>
+            <a:r>
+              <a:rPr lang="en-US" dirty="0"/>
+              <a:t> [file] # </a:t>
+            </a:r>
+            <a:r>
+              <a:rPr lang="en-US" dirty="0" err="1"/>
+              <a:t>显示指定文件相关的每一次diff</a:t>
+            </a:r>
+            <a:r>
+              <a:rPr lang="en-US" dirty="0"/>
+              <a:t> $ </a:t>
+            </a:r>
+            <a:r>
+              <a:rPr lang="en-US" dirty="0" err="1"/>
+              <a:t>git</a:t>
+            </a:r>
+            <a:r>
+              <a:rPr lang="en-US" dirty="0"/>
+              <a:t> log -p [file] # 显示过去5次提交 $ </a:t>
+            </a:r>
+            <a:r>
+              <a:rPr lang="en-US" dirty="0" err="1"/>
+              <a:t>git</a:t>
+            </a:r>
+            <a:r>
+              <a:rPr lang="en-US" dirty="0"/>
+              <a:t> log -5 --pretty --</a:t>
+            </a:r>
+            <a:r>
+              <a:rPr lang="en-US" dirty="0" err="1"/>
+              <a:t>oneline</a:t>
+            </a:r>
+            <a:r>
+              <a:rPr lang="en-US" dirty="0"/>
+              <a:t> # 显示所有提交过的用户，按提交次数排序 $ </a:t>
+            </a:r>
+            <a:r>
+              <a:rPr lang="en-US" dirty="0" err="1"/>
+              <a:t>git</a:t>
+            </a:r>
+            <a:r>
+              <a:rPr lang="en-US" dirty="0"/>
+              <a:t> </a:t>
+            </a:r>
+            <a:r>
+              <a:rPr lang="en-US" dirty="0" err="1"/>
+              <a:t>shortlog</a:t>
+            </a:r>
+            <a:r>
+              <a:rPr lang="en-US" dirty="0"/>
+              <a:t> -</a:t>
+            </a:r>
+            <a:r>
+              <a:rPr lang="en-US" dirty="0" err="1"/>
+              <a:t>sn</a:t>
+            </a:r>
+            <a:r>
+              <a:rPr lang="en-US" dirty="0"/>
+              <a:t> # 显示指定文件是什么人在什么时间修改过 $ </a:t>
+            </a:r>
+            <a:r>
+              <a:rPr lang="en-US" dirty="0" err="1"/>
+              <a:t>git</a:t>
+            </a:r>
+            <a:r>
+              <a:rPr lang="en-US" dirty="0"/>
+              <a:t> blame [file] # 显示暂存区和工作区的差异 $ </a:t>
+            </a:r>
+            <a:r>
+              <a:rPr lang="en-US" dirty="0" err="1"/>
+              <a:t>git</a:t>
+            </a:r>
+            <a:r>
+              <a:rPr lang="en-US" dirty="0"/>
+              <a:t> diff # </a:t>
+            </a:r>
+            <a:r>
+              <a:rPr lang="en-US" dirty="0" err="1"/>
+              <a:t>显示暂存区和上一个commit的差异</a:t>
+            </a:r>
+            <a:r>
+              <a:rPr lang="en-US" dirty="0"/>
+              <a:t> $ </a:t>
+            </a:r>
+            <a:r>
+              <a:rPr lang="en-US" dirty="0" err="1"/>
+              <a:t>git</a:t>
+            </a:r>
+            <a:r>
+              <a:rPr lang="en-US" dirty="0"/>
+              <a:t> diff --cached [file] # </a:t>
+            </a:r>
+            <a:r>
+              <a:rPr lang="en-US" dirty="0" err="1"/>
+              <a:t>显示工作区与当前分支最新commit之间的差异</a:t>
+            </a:r>
+            <a:r>
+              <a:rPr lang="en-US" dirty="0"/>
+              <a:t> $ </a:t>
+            </a:r>
+            <a:r>
+              <a:rPr lang="en-US" dirty="0" err="1"/>
+              <a:t>git</a:t>
+            </a:r>
+            <a:r>
+              <a:rPr lang="en-US" dirty="0"/>
+              <a:t> diff HEAD # 显示两次提交之间的差异 $ </a:t>
+            </a:r>
+            <a:r>
+              <a:rPr lang="en-US" dirty="0" err="1"/>
+              <a:t>git</a:t>
+            </a:r>
+            <a:r>
+              <a:rPr lang="en-US" dirty="0"/>
+              <a:t> diff [first-branch]...[second-branch] # 显示今天你写了多少行代码 $ </a:t>
+            </a:r>
+            <a:r>
+              <a:rPr lang="en-US" dirty="0" err="1"/>
+              <a:t>git</a:t>
+            </a:r>
+            <a:r>
+              <a:rPr lang="en-US" dirty="0"/>
+              <a:t> diff --</a:t>
+            </a:r>
+            <a:r>
+              <a:rPr lang="en-US" dirty="0" err="1"/>
+              <a:t>shortstat</a:t>
+            </a:r>
+            <a:r>
+              <a:rPr lang="en-US" dirty="0"/>
+              <a:t> "@{0 day ago}" # 显示某次提交的元数据和内容变化 $ </a:t>
+            </a:r>
+            <a:r>
+              <a:rPr lang="en-US" dirty="0" err="1"/>
+              <a:t>git</a:t>
+            </a:r>
+            <a:r>
+              <a:rPr lang="en-US" dirty="0"/>
+              <a:t> show [commit] # 显示某次提交发生变化的文件 $ </a:t>
+            </a:r>
+            <a:r>
+              <a:rPr lang="en-US" dirty="0" err="1"/>
+              <a:t>git</a:t>
+            </a:r>
+            <a:r>
+              <a:rPr lang="en-US" dirty="0"/>
+              <a:t> show --name-only [commit] # 显示某次提交时，某个文件的内容 $ </a:t>
+            </a:r>
+            <a:r>
+              <a:rPr lang="en-US" dirty="0" err="1"/>
+              <a:t>git</a:t>
+            </a:r>
+            <a:r>
+              <a:rPr lang="en-US" dirty="0"/>
+              <a:t> show [commit]:[filename] # 显示当前分支的最近几次提交 $ </a:t>
+            </a:r>
+            <a:r>
+              <a:rPr lang="en-US" dirty="0" err="1"/>
+              <a:t>git</a:t>
+            </a:r>
+            <a:r>
+              <a:rPr lang="en-US" dirty="0"/>
+              <a:t> </a:t>
+            </a:r>
+            <a:r>
+              <a:rPr lang="en-US" dirty="0" err="1"/>
+              <a:t>reflog</a:t>
+            </a:r>
+            <a:endParaRPr lang="en-US" dirty="0"/>
           </a:p>
         </p:txBody>
       </p:sp>
     </p:spTree>
     <p:extLst>
       <p:ext uri="{BB962C8B-B14F-4D97-AF65-F5344CB8AC3E}">
-        <p14:creationId xmlns:p14="http://schemas.microsoft.com/office/powerpoint/2010/main" val="43175813"/>
+        <p14:creationId xmlns:p14="http://schemas.microsoft.com/office/powerpoint/2010/main" val="1305964966"/>
       </p:ext>
     </p:extLst>
   </p:cSld>
@@ -7621,8 +7612,13 @@
           <a:p>
             <a:r>
               <a:rPr lang="zh-CN" altLang="en-US" b="0" dirty="0"/>
-              <a:t>撤销</a:t>
-            </a:r>
+              <a:t>远程</a:t>
+            </a:r>
+            <a:r>
+              <a:rPr lang="zh-CN" altLang="en-US" b="0" dirty="0" smtClean="0"/>
+              <a:t>同步</a:t>
+            </a:r>
+            <a:endParaRPr lang="zh-CN" altLang="en-US" b="0" dirty="0"/>
           </a:p>
         </p:txBody>
       </p:sp>
@@ -7635,7 +7631,7 @@
         <p:spPr>
           <a:xfrm>
             <a:off x="250825" y="1143000"/>
-            <a:ext cx="8207375" cy="3139321"/>
+            <a:ext cx="8207375" cy="1754326"/>
           </a:xfrm>
           <a:prstGeom prst="rect">
             <a:avLst/>
@@ -7650,151 +7646,87 @@
           <a:p>
             <a:r>
               <a:rPr lang="en-US" dirty="0"/>
-              <a:t># 恢复暂存区的指定文件到工作区 $ </a:t>
-            </a:r>
-            <a:r>
-              <a:rPr lang="en-US" dirty="0" err="1"/>
-              <a:t>git</a:t>
-            </a:r>
-            <a:r>
-              <a:rPr lang="en-US" dirty="0"/>
-              <a:t> checkout [file] # </a:t>
-            </a:r>
-            <a:r>
-              <a:rPr lang="en-US" dirty="0" err="1"/>
-              <a:t>恢复某个commit的指定文件到暂存区和工作区</a:t>
-            </a:r>
-            <a:r>
-              <a:rPr lang="en-US" dirty="0"/>
-              <a:t> $ </a:t>
-            </a:r>
-            <a:r>
-              <a:rPr lang="en-US" dirty="0" err="1"/>
-              <a:t>git</a:t>
-            </a:r>
-            <a:r>
-              <a:rPr lang="en-US" dirty="0"/>
-              <a:t> checkout [commit] [file] # 恢复暂存区的所有文件到工作区 $ </a:t>
-            </a:r>
-            <a:r>
-              <a:rPr lang="en-US" dirty="0" err="1"/>
-              <a:t>git</a:t>
-            </a:r>
-            <a:r>
-              <a:rPr lang="en-US" dirty="0"/>
-              <a:t> checkout . # </a:t>
-            </a:r>
-            <a:r>
-              <a:rPr lang="en-US" dirty="0" err="1"/>
-              <a:t>重置暂存区的指定文件，与上一次commit保持一致，但工作区不变</a:t>
-            </a:r>
-            <a:r>
-              <a:rPr lang="en-US" dirty="0"/>
-              <a:t> $ </a:t>
-            </a:r>
-            <a:r>
-              <a:rPr lang="en-US" dirty="0" err="1"/>
-              <a:t>git</a:t>
-            </a:r>
-            <a:r>
-              <a:rPr lang="en-US" dirty="0"/>
-              <a:t> reset [file] # </a:t>
-            </a:r>
-            <a:r>
-              <a:rPr lang="en-US" dirty="0" err="1"/>
-              <a:t>重置暂存区与工作区，与上一次commit保持一致</a:t>
-            </a:r>
-            <a:r>
-              <a:rPr lang="en-US" dirty="0"/>
-              <a:t> $ </a:t>
-            </a:r>
-            <a:r>
-              <a:rPr lang="en-US" dirty="0" err="1"/>
-              <a:t>git</a:t>
-            </a:r>
-            <a:r>
-              <a:rPr lang="en-US" dirty="0"/>
-              <a:t> reset --hard # </a:t>
-            </a:r>
-            <a:r>
-              <a:rPr lang="en-US" dirty="0" err="1"/>
-              <a:t>重置当前分支的指针为指定commit，同时重置暂存区，但工作区不变</a:t>
-            </a:r>
-            <a:r>
-              <a:rPr lang="en-US" dirty="0"/>
-              <a:t> $ </a:t>
-            </a:r>
-            <a:r>
-              <a:rPr lang="en-US" dirty="0" err="1"/>
-              <a:t>git</a:t>
-            </a:r>
-            <a:r>
-              <a:rPr lang="en-US" dirty="0"/>
-              <a:t> reset [commit] # </a:t>
-            </a:r>
-            <a:r>
-              <a:rPr lang="en-US" dirty="0" err="1"/>
-              <a:t>重置当前分支的HEAD为指定commit，同时重置暂存区和工作区，与指定commit一致</a:t>
-            </a:r>
-            <a:r>
-              <a:rPr lang="en-US" dirty="0"/>
-              <a:t> $ </a:t>
-            </a:r>
-            <a:r>
-              <a:rPr lang="en-US" dirty="0" err="1"/>
-              <a:t>git</a:t>
-            </a:r>
-            <a:r>
-              <a:rPr lang="en-US" dirty="0"/>
-              <a:t> reset --hard [commit] # </a:t>
-            </a:r>
-            <a:r>
-              <a:rPr lang="en-US" dirty="0" err="1"/>
-              <a:t>重置当前HEAD为指定commit，但保持暂存区和工作区不变</a:t>
-            </a:r>
-            <a:r>
-              <a:rPr lang="en-US" dirty="0"/>
-              <a:t> $ </a:t>
-            </a:r>
-            <a:r>
-              <a:rPr lang="en-US" dirty="0" err="1"/>
-              <a:t>git</a:t>
-            </a:r>
-            <a:r>
-              <a:rPr lang="en-US" dirty="0"/>
-              <a:t> reset --keep [commit] # </a:t>
-            </a:r>
-            <a:r>
-              <a:rPr lang="en-US" dirty="0" err="1"/>
-              <a:t>新建一个commit，用来撤销指定commit</a:t>
-            </a:r>
-            <a:r>
-              <a:rPr lang="en-US" dirty="0"/>
-              <a:t> # 后者的所有变化都将被前者抵消，并且应用到当前分支 $ </a:t>
-            </a:r>
-            <a:r>
-              <a:rPr lang="en-US" dirty="0" err="1"/>
-              <a:t>git</a:t>
-            </a:r>
-            <a:r>
-              <a:rPr lang="en-US" dirty="0"/>
-              <a:t> revert [commit] # 暂时将未提交的变化移除，稍后再移入 $ </a:t>
-            </a:r>
-            <a:r>
-              <a:rPr lang="en-US" dirty="0" err="1"/>
-              <a:t>git</a:t>
-            </a:r>
-            <a:r>
-              <a:rPr lang="en-US" dirty="0"/>
-              <a:t> stash $ </a:t>
-            </a:r>
-            <a:r>
-              <a:rPr lang="en-US" dirty="0" err="1"/>
-              <a:t>git</a:t>
-            </a:r>
-            <a:r>
-              <a:rPr lang="en-US" dirty="0"/>
-              <a:t> stash pop</a:t>
+              <a:t># 下载远程仓库的所有变动 $ </a:t>
+            </a:r>
+            <a:r>
+              <a:rPr lang="en-US" dirty="0" err="1"/>
+              <a:t>git</a:t>
+            </a:r>
+            <a:r>
+              <a:rPr lang="en-US" dirty="0"/>
+              <a:t> fetch [remote] # 显示所有远程仓库 $ </a:t>
+            </a:r>
+            <a:r>
+              <a:rPr lang="en-US" dirty="0" err="1"/>
+              <a:t>git</a:t>
+            </a:r>
+            <a:r>
+              <a:rPr lang="en-US" dirty="0"/>
+              <a:t> remote -v # 显示某个远程仓库的信息 $ </a:t>
+            </a:r>
+            <a:r>
+              <a:rPr lang="en-US" dirty="0" err="1"/>
+              <a:t>git</a:t>
+            </a:r>
+            <a:r>
+              <a:rPr lang="en-US" dirty="0"/>
+              <a:t> remote show [remote] # 增加一个新的远程仓库，并命名 $ </a:t>
+            </a:r>
+            <a:r>
+              <a:rPr lang="en-US" dirty="0" err="1"/>
+              <a:t>git</a:t>
+            </a:r>
+            <a:r>
+              <a:rPr lang="en-US" dirty="0"/>
+              <a:t> remote add [</a:t>
+            </a:r>
+            <a:r>
+              <a:rPr lang="en-US" dirty="0" err="1"/>
+              <a:t>shortname</a:t>
+            </a:r>
+            <a:r>
+              <a:rPr lang="en-US" dirty="0"/>
+              <a:t>] [</a:t>
+            </a:r>
+            <a:r>
+              <a:rPr lang="en-US" dirty="0" err="1"/>
+              <a:t>url</a:t>
+            </a:r>
+            <a:r>
+              <a:rPr lang="en-US" dirty="0"/>
+              <a:t>] # 取回远程仓库的变化，并与本地分支合并 $ </a:t>
+            </a:r>
+            <a:r>
+              <a:rPr lang="en-US" dirty="0" err="1"/>
+              <a:t>git</a:t>
+            </a:r>
+            <a:r>
+              <a:rPr lang="en-US" dirty="0"/>
+              <a:t> pull [remote] [branch] # 上传本地指定分支到远程仓库 $ </a:t>
+            </a:r>
+            <a:r>
+              <a:rPr lang="en-US" dirty="0" err="1"/>
+              <a:t>git</a:t>
+            </a:r>
+            <a:r>
+              <a:rPr lang="en-US" dirty="0"/>
+              <a:t> push [remote] [branch] # 强行推送当前分支到远程仓库，即使有冲突 $ </a:t>
+            </a:r>
+            <a:r>
+              <a:rPr lang="en-US" dirty="0" err="1"/>
+              <a:t>git</a:t>
+            </a:r>
+            <a:r>
+              <a:rPr lang="en-US" dirty="0"/>
+              <a:t> push [remote] --force # 推送所有分支到远程仓库 $ </a:t>
+            </a:r>
+            <a:r>
+              <a:rPr lang="en-US" dirty="0" err="1"/>
+              <a:t>git</a:t>
+            </a:r>
+            <a:r>
+              <a:rPr lang="en-US" dirty="0"/>
+              <a:t> push [remote] --all</a:t>
             </a:r>
           </a:p>
         </p:txBody>
@@ -7802,7 +7734,7 @@
     </p:spTree>
     <p:extLst>
       <p:ext uri="{BB962C8B-B14F-4D97-AF65-F5344CB8AC3E}">
-        <p14:creationId xmlns:p14="http://schemas.microsoft.com/office/powerpoint/2010/main" val="1476544542"/>
+        <p14:creationId xmlns:p14="http://schemas.microsoft.com/office/powerpoint/2010/main" val="43175813"/>
       </p:ext>
     </p:extLst>
   </p:cSld>
@@ -7897,6 +7829,283 @@
           <a:lstStyle/>
           <a:p>
             <a:r>
+              <a:rPr lang="zh-CN" altLang="en-US" b="0" dirty="0"/>
+              <a:t>撤销</a:t>
+            </a:r>
+          </a:p>
+        </p:txBody>
+      </p:sp>
+      <p:sp>
+        <p:nvSpPr>
+          <p:cNvPr id="3" name="TextBox 2"/>
+          <p:cNvSpPr txBox="1"/>
+          <p:nvPr/>
+        </p:nvSpPr>
+        <p:spPr>
+          <a:xfrm>
+            <a:off x="250825" y="1143000"/>
+            <a:ext cx="8207375" cy="3139321"/>
+          </a:xfrm>
+          <a:prstGeom prst="rect">
+            <a:avLst/>
+          </a:prstGeom>
+          <a:noFill/>
+        </p:spPr>
+        <p:txBody>
+          <a:bodyPr wrap="square" rtlCol="0">
+            <a:spAutoFit/>
+          </a:bodyPr>
+          <a:lstStyle/>
+          <a:p>
+            <a:r>
+              <a:rPr lang="en-US" dirty="0"/>
+              <a:t># 恢复暂存区的指定文件到工作区 $ </a:t>
+            </a:r>
+            <a:r>
+              <a:rPr lang="en-US" dirty="0" err="1"/>
+              <a:t>git</a:t>
+            </a:r>
+            <a:r>
+              <a:rPr lang="en-US" dirty="0"/>
+              <a:t> checkout [file] # </a:t>
+            </a:r>
+            <a:r>
+              <a:rPr lang="en-US" dirty="0" err="1"/>
+              <a:t>恢复某个commit的指定文件到暂存区和工作区</a:t>
+            </a:r>
+            <a:r>
+              <a:rPr lang="en-US" dirty="0"/>
+              <a:t> $ </a:t>
+            </a:r>
+            <a:r>
+              <a:rPr lang="en-US" dirty="0" err="1"/>
+              <a:t>git</a:t>
+            </a:r>
+            <a:r>
+              <a:rPr lang="en-US" dirty="0"/>
+              <a:t> checkout [commit] [file] # 恢复暂存区的所有文件到工作区 $ </a:t>
+            </a:r>
+            <a:r>
+              <a:rPr lang="en-US" dirty="0" err="1"/>
+              <a:t>git</a:t>
+            </a:r>
+            <a:r>
+              <a:rPr lang="en-US" dirty="0"/>
+              <a:t> checkout . # </a:t>
+            </a:r>
+            <a:r>
+              <a:rPr lang="en-US" dirty="0" err="1"/>
+              <a:t>重置暂存区的指定文件，与上一次commit保持一致，但工作区不变</a:t>
+            </a:r>
+            <a:r>
+              <a:rPr lang="en-US" dirty="0"/>
+              <a:t> $ </a:t>
+            </a:r>
+            <a:r>
+              <a:rPr lang="en-US" dirty="0" err="1"/>
+              <a:t>git</a:t>
+            </a:r>
+            <a:r>
+              <a:rPr lang="en-US" dirty="0"/>
+              <a:t> reset [file] # </a:t>
+            </a:r>
+            <a:r>
+              <a:rPr lang="en-US" dirty="0" err="1"/>
+              <a:t>重置暂存区与工作区，与上一次commit保持一致</a:t>
+            </a:r>
+            <a:r>
+              <a:rPr lang="en-US" dirty="0"/>
+              <a:t> $ </a:t>
+            </a:r>
+            <a:r>
+              <a:rPr lang="en-US" dirty="0" err="1"/>
+              <a:t>git</a:t>
+            </a:r>
+            <a:r>
+              <a:rPr lang="en-US" dirty="0"/>
+              <a:t> reset --hard # </a:t>
+            </a:r>
+            <a:r>
+              <a:rPr lang="en-US" dirty="0" err="1"/>
+              <a:t>重置当前分支的指针为指定commit，同时重置暂存区，但工作区不变</a:t>
+            </a:r>
+            <a:r>
+              <a:rPr lang="en-US" dirty="0"/>
+              <a:t> $ </a:t>
+            </a:r>
+            <a:r>
+              <a:rPr lang="en-US" dirty="0" err="1"/>
+              <a:t>git</a:t>
+            </a:r>
+            <a:r>
+              <a:rPr lang="en-US" dirty="0"/>
+              <a:t> reset [commit] # </a:t>
+            </a:r>
+            <a:r>
+              <a:rPr lang="en-US" dirty="0" err="1"/>
+              <a:t>重置当前分支的HEAD为指定commit，同时重置暂存区和工作区，与指定commit一致</a:t>
+            </a:r>
+            <a:r>
+              <a:rPr lang="en-US" dirty="0"/>
+              <a:t> $ </a:t>
+            </a:r>
+            <a:r>
+              <a:rPr lang="en-US" dirty="0" err="1"/>
+              <a:t>git</a:t>
+            </a:r>
+            <a:r>
+              <a:rPr lang="en-US" dirty="0"/>
+              <a:t> reset --hard [commit] # </a:t>
+            </a:r>
+            <a:r>
+              <a:rPr lang="en-US" dirty="0" err="1"/>
+              <a:t>重置当前HEAD为指定commit，但保持暂存区和工作区不变</a:t>
+            </a:r>
+            <a:r>
+              <a:rPr lang="en-US" dirty="0"/>
+              <a:t> $ </a:t>
+            </a:r>
+            <a:r>
+              <a:rPr lang="en-US" dirty="0" err="1"/>
+              <a:t>git</a:t>
+            </a:r>
+            <a:r>
+              <a:rPr lang="en-US" dirty="0"/>
+              <a:t> reset --keep [commit] # </a:t>
+            </a:r>
+            <a:r>
+              <a:rPr lang="en-US" dirty="0" err="1"/>
+              <a:t>新建一个commit，用来撤销指定commit</a:t>
+            </a:r>
+            <a:r>
+              <a:rPr lang="en-US" dirty="0"/>
+              <a:t> # 后者的所有变化都将被前者抵消，并且应用到当前分支 $ </a:t>
+            </a:r>
+            <a:r>
+              <a:rPr lang="en-US" dirty="0" err="1"/>
+              <a:t>git</a:t>
+            </a:r>
+            <a:r>
+              <a:rPr lang="en-US" dirty="0"/>
+              <a:t> revert [commit] # 暂时将未提交的变化移除，稍后再移入 $ </a:t>
+            </a:r>
+            <a:r>
+              <a:rPr lang="en-US" dirty="0" err="1"/>
+              <a:t>git</a:t>
+            </a:r>
+            <a:r>
+              <a:rPr lang="en-US" dirty="0"/>
+              <a:t> stash $ </a:t>
+            </a:r>
+            <a:r>
+              <a:rPr lang="en-US" dirty="0" err="1"/>
+              <a:t>git</a:t>
+            </a:r>
+            <a:r>
+              <a:rPr lang="en-US" dirty="0"/>
+              <a:t> stash pop</a:t>
+            </a:r>
+          </a:p>
+        </p:txBody>
+      </p:sp>
+    </p:spTree>
+    <p:extLst>
+      <p:ext uri="{BB962C8B-B14F-4D97-AF65-F5344CB8AC3E}">
+        <p14:creationId xmlns:p14="http://schemas.microsoft.com/office/powerpoint/2010/main" val="1476544542"/>
+      </p:ext>
+    </p:extLst>
+  </p:cSld>
+  <p:clrMapOvr>
+    <a:masterClrMapping/>
+  </p:clrMapOvr>
+  <p:timing>
+    <p:tnLst>
+      <p:par>
+        <p:cTn id="1" dur="indefinite" restart="never" nodeType="tmRoot"/>
+      </p:par>
+    </p:tnLst>
+  </p:timing>
+</p:sld>
+</file>
+
+<file path=ppt/slides/slide25.xml><?xml version="1.0" encoding="utf-8"?>
+<p:sld xmlns:a="http://schemas.openxmlformats.org/drawingml/2006/main" xmlns:r="http://schemas.openxmlformats.org/officeDocument/2006/relationships" xmlns:p="http://schemas.openxmlformats.org/presentationml/2006/main">
+  <p:cSld>
+    <p:spTree>
+      <p:nvGrpSpPr>
+        <p:cNvPr id="1" name=""/>
+        <p:cNvGrpSpPr/>
+        <p:nvPr/>
+      </p:nvGrpSpPr>
+      <p:grpSpPr>
+        <a:xfrm>
+          <a:off x="0" y="0"/>
+          <a:ext cx="0" cy="0"/>
+          <a:chOff x="0" y="0"/>
+          <a:chExt cx="0" cy="0"/>
+        </a:xfrm>
+      </p:grpSpPr>
+      <p:sp>
+        <p:nvSpPr>
+          <p:cNvPr id="4" name="Date Placeholder 3"/>
+          <p:cNvSpPr>
+            <a:spLocks noGrp="1"/>
+          </p:cNvSpPr>
+          <p:nvPr>
+            <p:ph type="dt" sz="half" idx="10"/>
+          </p:nvPr>
+        </p:nvSpPr>
+        <p:spPr/>
+        <p:txBody>
+          <a:bodyPr/>
+          <a:lstStyle/>
+          <a:p>
+            <a:r>
+              <a:rPr lang="en-US" altLang="ko-KR" dirty="0" err="1" smtClean="0"/>
+              <a:t>www.ooooo.com</a:t>
+            </a:r>
+            <a:endParaRPr lang="en-US" altLang="ko-KR" dirty="0"/>
+          </a:p>
+        </p:txBody>
+      </p:sp>
+      <p:sp>
+        <p:nvSpPr>
+          <p:cNvPr id="5" name="Footer Placeholder 4"/>
+          <p:cNvSpPr>
+            <a:spLocks noGrp="1"/>
+          </p:cNvSpPr>
+          <p:nvPr>
+            <p:ph type="ftr" sz="quarter" idx="11"/>
+          </p:nvPr>
+        </p:nvSpPr>
+        <p:spPr/>
+        <p:txBody>
+          <a:bodyPr/>
+          <a:lstStyle/>
+          <a:p>
+            <a:r>
+              <a:rPr lang="en-US" altLang="ko-KR"/>
+              <a:t>Company Logo</a:t>
+            </a:r>
+          </a:p>
+        </p:txBody>
+      </p:sp>
+      <p:sp>
+        <p:nvSpPr>
+          <p:cNvPr id="37890" name="Rectangle 2"/>
+          <p:cNvSpPr>
+            <a:spLocks noGrp="1" noChangeArrowheads="1"/>
+          </p:cNvSpPr>
+          <p:nvPr>
+            <p:ph type="title"/>
+          </p:nvPr>
+        </p:nvSpPr>
+        <p:spPr/>
+        <p:txBody>
+          <a:bodyPr/>
+          <a:lstStyle/>
+          <a:p>
+            <a:r>
               <a:rPr lang="zh-CN" altLang="en-US" b="0" dirty="0" smtClean="0"/>
               <a:t>常见问题</a:t>
             </a:r>
@@ -7966,11 +8175,7 @@
             </a:r>
             <a:r>
               <a:rPr lang="zh-CN" altLang="en-US" dirty="0" smtClean="0"/>
-              <a:t> 怎么搜索单个</a:t>
-            </a:r>
-            <a:r>
-              <a:rPr lang="zh-CN" altLang="en-US" dirty="0" smtClean="0"/>
-              <a:t>文件</a:t>
+              <a:t> 怎么搜索单个文件</a:t>
             </a:r>
           </a:p>
           <a:p>
@@ -7992,11 +8197,7 @@
             </a:r>
             <a:r>
               <a:rPr lang="en-US" altLang="zh-CN" dirty="0" smtClean="0"/>
-              <a:t>s</a:t>
-            </a:r>
-            <a:r>
-              <a:rPr lang="en-US" altLang="zh-CN" dirty="0" smtClean="0"/>
-              <a:t>tash</a:t>
+              <a:t>stash</a:t>
             </a:r>
             <a:endParaRPr lang="zh-CN" altLang="en-US" dirty="0" smtClean="0"/>
           </a:p>
@@ -8017,15 +8218,7 @@
             </a:r>
             <a:r>
               <a:rPr lang="zh-CN" altLang="en-US" dirty="0" smtClean="0"/>
-              <a:t> </a:t>
-            </a:r>
-            <a:r>
-              <a:rPr lang="zh-CN" altLang="en-US" dirty="0" smtClean="0"/>
-              <a:t>怎么</a:t>
-            </a:r>
-            <a:r>
-              <a:rPr lang="zh-CN" altLang="en-US" dirty="0" smtClean="0"/>
-              <a:t>撤销</a:t>
+              <a:t> 怎么撤销</a:t>
             </a:r>
             <a:r>
               <a:rPr lang="zh-CN" altLang="en-US" dirty="0"/>
@@ -9035,7 +9228,7 @@
         <p:spPr>
           <a:xfrm>
             <a:off x="250825" y="1143000"/>
-            <a:ext cx="8207375" cy="3416320"/>
+            <a:ext cx="8207375" cy="2308324"/>
           </a:xfrm>
           <a:prstGeom prst="rect">
             <a:avLst/>
@@ -9049,81 +9242,139 @@
           <a:lstStyle/>
           <a:p>
             <a:r>
-              <a:rPr lang="zh-CN" altLang="en-US" dirty="0" smtClean="0"/>
-              <a:t>用不超过</a:t>
+              <a:rPr lang="en-US" dirty="0" err="1"/>
+              <a:t>每次提交，Commit</a:t>
+            </a:r>
+            <a:r>
+              <a:rPr lang="en-US" dirty="0"/>
+              <a:t> message </a:t>
+            </a:r>
+            <a:r>
+              <a:rPr lang="en-US" dirty="0" err="1"/>
+              <a:t>都包括三个部分：header，body</a:t>
+            </a:r>
+            <a:r>
+              <a:rPr lang="en-US" dirty="0"/>
+              <a:t> 和 footer</a:t>
+            </a:r>
+            <a:r>
+              <a:rPr lang="en-US" dirty="0" smtClean="0"/>
+              <a:t>。</a:t>
+            </a:r>
+            <a:endParaRPr lang="zh-CN" altLang="en-US" dirty="0"/>
+          </a:p>
+          <a:p>
+            <a:r>
+              <a:rPr lang="en-US" dirty="0" err="1"/>
+              <a:t>其中，header</a:t>
+            </a:r>
+            <a:r>
+              <a:rPr lang="en-US" dirty="0"/>
+              <a:t> </a:t>
+            </a:r>
+            <a:r>
+              <a:rPr lang="en-US" dirty="0" err="1"/>
+              <a:t>是必需的，body</a:t>
+            </a:r>
+            <a:r>
+              <a:rPr lang="en-US" dirty="0"/>
+              <a:t> 和 footer </a:t>
+            </a:r>
+            <a:r>
+              <a:rPr lang="en-US" dirty="0" smtClean="0"/>
+              <a:t>可以省略</a:t>
             </a:r>
             <a:r>
               <a:rPr lang="en-US" altLang="zh-CN" dirty="0" smtClean="0"/>
-              <a:t>50</a:t>
-            </a:r>
-            <a:r>
-              <a:rPr lang="zh-CN" altLang="en-US" dirty="0" smtClean="0"/>
-              <a:t>个字简述一下有哪些改变 如果必要的话，写更多的细节。每行不要超过</a:t>
-            </a:r>
-            <a:r>
-              <a:rPr lang="en-US" altLang="zh-CN" dirty="0" smtClean="0"/>
-              <a:t>72</a:t>
-            </a:r>
-            <a:r>
-              <a:rPr lang="zh-CN" altLang="en-US" dirty="0" smtClean="0"/>
-              <a:t>个字。第一行被视为 </a:t>
-            </a:r>
-            <a:r>
-              <a:rPr lang="en-US" altLang="zh-CN" dirty="0" smtClean="0"/>
-              <a:t>commit </a:t>
-            </a:r>
-            <a:r>
-              <a:rPr lang="zh-CN" altLang="en-US" dirty="0" smtClean="0"/>
-              <a:t>信息以及余下正文的主题。空行分开标题和正文是非常必要的</a:t>
-            </a:r>
-            <a:r>
-              <a:rPr lang="en-US" altLang="zh-CN" dirty="0" smtClean="0"/>
+              <a:t>.</a:t>
+            </a:r>
+            <a:endParaRPr lang="zh-CN" altLang="en-US" dirty="0"/>
+          </a:p>
+          <a:p>
+            <a:r>
+              <a:rPr lang="en-US" dirty="0"/>
+              <a:t>&lt;type&gt;</a:t>
+            </a:r>
+            <a:r>
+              <a:rPr lang="en-US" dirty="0"/>
               <a:t>(</a:t>
             </a:r>
             <a:r>
-              <a:rPr lang="zh-CN" altLang="en-US" dirty="0" smtClean="0"/>
-              <a:t>除非你不写正文</a:t>
-            </a:r>
-            <a:r>
-              <a:rPr lang="en-US" altLang="zh-CN" dirty="0" smtClean="0"/>
-              <a:t>);</a:t>
+              <a:rPr lang="en-US" dirty="0"/>
+              <a:t>&lt;scope&gt;</a:t>
+            </a:r>
+            <a:r>
+              <a:rPr lang="en-US" dirty="0"/>
+              <a:t>): </a:t>
+            </a:r>
+            <a:r>
+              <a:rPr lang="en-US" dirty="0"/>
+              <a:t>&lt;subject&gt;</a:t>
+            </a:r>
+            <a:r>
+              <a:rPr lang="en-US" dirty="0"/>
+              <a:t> </a:t>
             </a:r>
             <a:endParaRPr lang="zh-CN" altLang="en-US" dirty="0" smtClean="0"/>
           </a:p>
           <a:p>
-            <a:endParaRPr lang="zh-CN" altLang="en-US" dirty="0"/>
-          </a:p>
-          <a:p>
-            <a:r>
-              <a:rPr lang="zh-CN" altLang="en-US" dirty="0" smtClean="0"/>
-              <a:t>解释一下这个</a:t>
-            </a:r>
-            <a:r>
-              <a:rPr lang="en-US" altLang="zh-CN" dirty="0" smtClean="0"/>
-              <a:t>commit</a:t>
-            </a:r>
-            <a:r>
-              <a:rPr lang="zh-CN" altLang="en-US" dirty="0" smtClean="0"/>
-              <a:t>解决了什么问题。专注于为什么这么做而不是怎么做的（代码已经解释了）。这个改变是否有副作用或其他不直观的后果。这里就是解释这些事情的地方。 空行之后还有段落。 </a:t>
-            </a:r>
-            <a:r>
-              <a:rPr lang="en-US" altLang="zh-CN" dirty="0" smtClean="0"/>
-              <a:t>- </a:t>
-            </a:r>
-            <a:r>
-              <a:rPr lang="zh-CN" altLang="en-US" dirty="0" smtClean="0"/>
-              <a:t>要点符号也是可以的 </a:t>
-            </a:r>
-            <a:r>
-              <a:rPr lang="en-US" altLang="zh-CN" dirty="0" smtClean="0"/>
-              <a:t>- </a:t>
-            </a:r>
-            <a:r>
-              <a:rPr lang="zh-CN" altLang="en-US" dirty="0" smtClean="0"/>
-              <a:t>通常用连字符，星号来表示要点符号。用一个空格起头，用空行隔开，当然，惯例没有这么详细 </a:t>
-            </a:r>
-          </a:p>
-          <a:p>
+            <a:r>
+              <a:rPr lang="en-US" dirty="0" smtClean="0"/>
+              <a:t>&lt;</a:t>
+            </a:r>
+            <a:r>
+              <a:rPr lang="en-US" dirty="0"/>
+              <a:t>BLANK LINE&gt;</a:t>
+            </a:r>
+            <a:r>
+              <a:rPr lang="en-US" dirty="0"/>
+              <a:t> </a:t>
+            </a:r>
+            <a:endParaRPr lang="zh-CN" altLang="en-US" dirty="0" smtClean="0"/>
+          </a:p>
+          <a:p>
+            <a:r>
+              <a:rPr lang="en-US" dirty="0" smtClean="0"/>
+              <a:t>&lt;</a:t>
+            </a:r>
+            <a:r>
+              <a:rPr lang="en-US" dirty="0"/>
+              <a:t>body&gt;</a:t>
+            </a:r>
+            <a:r>
+              <a:rPr lang="en-US" dirty="0"/>
+              <a:t> </a:t>
+            </a:r>
+            <a:endParaRPr lang="zh-CN" altLang="en-US" dirty="0" smtClean="0"/>
+          </a:p>
+          <a:p>
+            <a:r>
+              <a:rPr lang="en-US" dirty="0" smtClean="0"/>
+              <a:t>&lt;</a:t>
+            </a:r>
+            <a:r>
+              <a:rPr lang="en-US" dirty="0"/>
+              <a:t>BLANK LINE&gt;</a:t>
+            </a:r>
+            <a:r>
+              <a:rPr lang="en-US" dirty="0"/>
+              <a:t> </a:t>
+            </a:r>
+            <a:endParaRPr lang="zh-CN" altLang="en-US" dirty="0" smtClean="0"/>
+          </a:p>
+          <a:p>
+            <a:r>
+              <a:rPr lang="en-US" dirty="0" smtClean="0"/>
+              <a:t>&lt;</a:t>
+            </a:r>
+            <a:r>
+              <a:rPr lang="en-US" dirty="0"/>
+              <a:t>footer</a:t>
+            </a:r>
+            <a:r>
+              <a:rPr lang="en-US" dirty="0" smtClean="0"/>
+              <a:t>&gt;</a:t>
+            </a:r>
             <a:endParaRPr lang="zh-CN" altLang="en-US" dirty="0"/>
           </a:p>
           <a:p>
@@ -9137,22 +9388,12 @@
             </a:r>
             <a:r>
               <a:rPr lang="zh-CN" altLang="en-US" dirty="0" smtClean="0"/>
-              <a:t>， 把这些引用放在底部，就像这样： 解决了：</a:t>
-            </a:r>
-            <a:r>
-              <a:rPr lang="en-US" altLang="zh-CN" dirty="0" smtClean="0"/>
-              <a:t>#123 </a:t>
+              <a:t>， 把这些引用放在底部</a:t>
             </a:r>
             <a:r>
               <a:rPr lang="zh-CN" altLang="en-US" dirty="0" smtClean="0"/>
-              <a:t>参考： </a:t>
-            </a:r>
-            <a:r>
-              <a:rPr lang="en-US" altLang="zh-CN" dirty="0" smtClean="0"/>
-              <a:t>#456, #789</a:t>
-            </a:r>
-          </a:p>
-          <a:p>
+              <a:t>，</a:t>
+            </a:r>
             <a:endParaRPr lang="zh-CN" altLang="en-US" dirty="0"/>
           </a:p>
         </p:txBody>
@@ -9165,8 +9406,8 @@
         </p:nvSpPr>
         <p:spPr>
           <a:xfrm>
-            <a:off x="250825" y="4349629"/>
-            <a:ext cx="5692775" cy="646331"/>
+            <a:off x="327025" y="3841797"/>
+            <a:ext cx="5692775" cy="2308324"/>
           </a:xfrm>
           <a:prstGeom prst="rect">
             <a:avLst/>
@@ -9180,142 +9421,122 @@
           <a:lstStyle/>
           <a:p>
             <a:r>
-              <a:rPr lang="en-US" dirty="0" err="1" smtClean="0"/>
-              <a:t>git</a:t>
-            </a:r>
-            <a:r>
-              <a:rPr lang="en-US" dirty="0" smtClean="0"/>
-              <a:t> log --</a:t>
-            </a:r>
-            <a:r>
-              <a:rPr lang="en-US" dirty="0" err="1" smtClean="0"/>
-              <a:t>oneline</a:t>
-            </a:r>
-            <a:r>
-              <a:rPr lang="en-US" dirty="0"/>
-              <a:t>， </a:t>
-            </a:r>
-            <a:r>
-              <a:rPr lang="en-US" dirty="0" smtClean="0"/>
-              <a:t>只输出主题行</a:t>
-            </a:r>
-            <a:endParaRPr lang="zh-CN" altLang="en-US" dirty="0" smtClean="0"/>
-          </a:p>
-          <a:p>
-            <a:r>
-              <a:rPr lang="en-US" altLang="zh-CN" dirty="0" err="1" smtClean="0"/>
-              <a:t>git</a:t>
-            </a:r>
-            <a:r>
               <a:rPr lang="en-US" altLang="zh-CN" dirty="0" smtClean="0"/>
+              <a:t>Type</a:t>
+            </a:r>
+            <a:r>
+              <a:rPr lang="zh-CN" altLang="en-US" dirty="0" smtClean="0"/>
               <a:t> </a:t>
             </a:r>
             <a:r>
-              <a:rPr lang="en-US" altLang="zh-CN" dirty="0" err="1" smtClean="0"/>
-              <a:t>shortlog</a:t>
-            </a:r>
+              <a:rPr lang="zh-CN" altLang="en-US" dirty="0" smtClean="0"/>
+              <a:t>只</a:t>
+            </a:r>
+            <a:r>
+              <a:rPr lang="zh-CN" altLang="en-US" dirty="0"/>
+              <a:t>允许使用</a:t>
+            </a:r>
+            <a:r>
+              <a:rPr lang="zh-CN" altLang="en-US" dirty="0" smtClean="0"/>
+              <a:t>下面标识</a:t>
+            </a:r>
+            <a:r>
+              <a:rPr lang="zh-CN" altLang="en-US" dirty="0"/>
+              <a:t>。</a:t>
+            </a:r>
+          </a:p>
+          <a:p>
             <a:r>
               <a:rPr lang="en-US" altLang="zh-CN" dirty="0"/>
-              <a:t>, </a:t>
+              <a:t>feat</a:t>
             </a:r>
             <a:r>
               <a:rPr lang="zh-CN" altLang="en-US" dirty="0"/>
-              <a:t>按照贡献者分组，按行输出主题</a:t>
-            </a:r>
-            <a:endParaRPr lang="en-US" dirty="0"/>
-          </a:p>
-        </p:txBody>
-      </p:sp>
-      <p:sp>
-        <p:nvSpPr>
-          <p:cNvPr id="6" name="TextBox 5"/>
-          <p:cNvSpPr txBox="1"/>
-          <p:nvPr/>
-        </p:nvSpPr>
-        <p:spPr>
-          <a:xfrm>
-            <a:off x="327025" y="5117030"/>
-            <a:ext cx="5387975" cy="1200329"/>
-          </a:xfrm>
-          <a:prstGeom prst="rect">
-            <a:avLst/>
-          </a:prstGeom>
-          <a:noFill/>
-        </p:spPr>
-        <p:txBody>
-          <a:bodyPr wrap="square" rtlCol="0">
-            <a:spAutoFit/>
-          </a:bodyPr>
-          <a:lstStyle/>
-          <a:p>
-            <a:r>
-              <a:rPr lang="zh-TW" altLang="en-US" dirty="0"/>
-              <a:t>小技巧： </a:t>
-            </a:r>
-            <a:endParaRPr lang="zh-CN" altLang="en-US" dirty="0" smtClean="0"/>
-          </a:p>
-          <a:p>
+              <a:t>：新功能（</a:t>
+            </a:r>
+            <a:r>
+              <a:rPr lang="en-US" altLang="zh-CN" dirty="0"/>
+              <a:t>feature</a:t>
+            </a:r>
             <a:r>
               <a:rPr lang="zh-CN" altLang="en-US" dirty="0"/>
-              <a:t>如果</a:t>
+              <a:t>）</a:t>
+            </a:r>
+          </a:p>
+          <a:p>
+            <a:r>
+              <a:rPr lang="en-US" altLang="zh-CN" dirty="0"/>
+              <a:t>fix</a:t>
+            </a:r>
+            <a:r>
+              <a:rPr lang="zh-CN" altLang="en-US" dirty="0"/>
+              <a:t>：修补</a:t>
+            </a:r>
+            <a:r>
+              <a:rPr lang="en-US" altLang="zh-CN" dirty="0"/>
+              <a:t>bug</a:t>
+            </a:r>
+          </a:p>
+          <a:p>
+            <a:r>
+              <a:rPr lang="en-US" altLang="zh-CN" dirty="0"/>
+              <a:t>docs</a:t>
+            </a:r>
+            <a:r>
+              <a:rPr lang="zh-CN" altLang="en-US" dirty="0"/>
+              <a:t>：文档（</a:t>
+            </a:r>
+            <a:r>
+              <a:rPr lang="en-US" altLang="zh-CN" dirty="0"/>
+              <a:t>documentation</a:t>
+            </a:r>
+            <a:r>
+              <a:rPr lang="zh-CN" altLang="en-US" dirty="0"/>
+              <a:t>）</a:t>
+            </a:r>
+          </a:p>
+          <a:p>
+            <a:r>
+              <a:rPr lang="en-US" altLang="zh-CN" dirty="0"/>
+              <a:t>style</a:t>
+            </a:r>
+            <a:r>
+              <a:rPr lang="zh-CN" altLang="en-US" dirty="0"/>
+              <a:t>： 格式（不影响代码运行的变动）</a:t>
+            </a:r>
+          </a:p>
+          <a:p>
+            <a:r>
+              <a:rPr lang="en-US" altLang="zh-CN" dirty="0"/>
+              <a:t>refactor</a:t>
+            </a:r>
+            <a:r>
+              <a:rPr lang="zh-CN" altLang="en-US" dirty="0"/>
+              <a:t>：重构（即不是新增功能，也不是修改</a:t>
+            </a:r>
+            <a:r>
+              <a:rPr lang="en-US" altLang="zh-CN" dirty="0"/>
+              <a:t>bug</a:t>
+            </a:r>
+            <a:r>
+              <a:rPr lang="zh-CN" altLang="en-US" dirty="0"/>
+              <a:t>的代码变动）</a:t>
+            </a:r>
+          </a:p>
+          <a:p>
+            <a:r>
+              <a:rPr lang="en-US" altLang="zh-CN" dirty="0"/>
+              <a:t>test</a:t>
+            </a:r>
+            <a:r>
+              <a:rPr lang="zh-CN" altLang="en-US" dirty="0"/>
+              <a:t>：增加</a:t>
             </a:r>
             <a:r>
               <a:rPr lang="zh-CN" altLang="en-US" dirty="0" smtClean="0"/>
-              <a:t>你发现写</a:t>
-            </a:r>
-            <a:r>
-              <a:rPr lang="en-US" altLang="zh-CN" dirty="0" smtClean="0"/>
-              <a:t>commit</a:t>
-            </a:r>
-            <a:r>
-              <a:rPr lang="zh-CN" altLang="en-US" dirty="0" smtClean="0"/>
-              <a:t>很困难</a:t>
-            </a:r>
-            <a:r>
-              <a:rPr lang="en-US" altLang="zh-CN" dirty="0" smtClean="0"/>
-              <a:t>,</a:t>
-            </a:r>
-            <a:r>
-              <a:rPr lang="zh-CN" altLang="en-US" dirty="0" smtClean="0"/>
-              <a:t>可能</a:t>
-            </a:r>
-            <a:r>
-              <a:rPr lang="zh-CN" altLang="en-US" dirty="0"/>
-              <a:t>是因为你一次 </a:t>
-            </a:r>
-            <a:r>
-              <a:rPr lang="en-US" altLang="zh-CN" dirty="0"/>
-              <a:t>commit </a:t>
-            </a:r>
-            <a:r>
-              <a:rPr lang="zh-CN" altLang="en-US" dirty="0"/>
-              <a:t>太多改动了。尽可能</a:t>
-            </a:r>
-            <a:r>
-              <a:rPr lang="zh-CN" altLang="en-US" dirty="0" smtClean="0"/>
-              <a:t>做到</a:t>
-            </a:r>
-            <a:r>
-              <a:rPr lang="en-US" altLang="zh-CN" dirty="0" smtClean="0"/>
-              <a:t> (</a:t>
-            </a:r>
-            <a:r>
-              <a:rPr lang="zh-CN" altLang="en-US" dirty="0"/>
-              <a:t>每次</a:t>
-            </a:r>
-            <a:r>
-              <a:rPr lang="en-US" altLang="zh-CN" dirty="0"/>
-              <a:t>post</a:t>
-            </a:r>
-            <a:r>
-              <a:rPr lang="zh-CN" altLang="en-US" dirty="0"/>
-              <a:t>一个主题</a:t>
-            </a:r>
-            <a:r>
-              <a:rPr lang="en-US" altLang="zh-CN" dirty="0"/>
-              <a:t>)</a:t>
-            </a:r>
-            <a:endParaRPr lang="en-US" dirty="0"/>
+              <a:t>测试</a:t>
+            </a:r>
+            <a:endParaRPr lang="zh-CN" altLang="en-US" dirty="0"/>
           </a:p>
         </p:txBody>
       </p:sp>
@@ -9417,34 +9638,30 @@
           <a:lstStyle/>
           <a:p>
             <a:r>
-              <a:rPr lang="zh-CN" altLang="en-US" b="0" dirty="0" smtClean="0">
-                <a:latin typeface="Arial Narrow" charset="0"/>
-                <a:ea typeface="Arial Narrow" charset="0"/>
-                <a:cs typeface="Arial Narrow" charset="0"/>
-              </a:rPr>
-              <a:t>与</a:t>
-            </a:r>
-            <a:r>
-              <a:rPr lang="zh-CN" altLang="en-US" b="0" dirty="0">
-                <a:latin typeface="Arial Narrow" charset="0"/>
-                <a:ea typeface="Arial Narrow" charset="0"/>
-                <a:cs typeface="Arial Narrow" charset="0"/>
-              </a:rPr>
-              <a:t>主干同步</a:t>
-            </a:r>
-          </a:p>
-        </p:txBody>
-      </p:sp>
-      <p:sp>
-        <p:nvSpPr>
-          <p:cNvPr id="3" name="TextBox 2"/>
+              <a:rPr lang="zh-CN" altLang="en-US" b="0" dirty="0" smtClean="0"/>
+              <a:t>查看</a:t>
+            </a:r>
+            <a:r>
+              <a:rPr lang="zh-CN" altLang="en-US" b="0" dirty="0" smtClean="0"/>
+              <a:t>提交</a:t>
+            </a:r>
+            <a:r>
+              <a:rPr lang="zh-CN" altLang="en-US" b="0" dirty="0"/>
+              <a:t>信息</a:t>
+            </a:r>
+          </a:p>
+        </p:txBody>
+      </p:sp>
+      <p:sp>
+        <p:nvSpPr>
+          <p:cNvPr id="2" name="TextBox 1"/>
           <p:cNvSpPr txBox="1"/>
           <p:nvPr/>
         </p:nvSpPr>
         <p:spPr>
           <a:xfrm>
-            <a:off x="250825" y="1143000"/>
-            <a:ext cx="8207375" cy="646331"/>
+            <a:off x="250825" y="1828800"/>
+            <a:ext cx="5692775" cy="646331"/>
           </a:xfrm>
           <a:prstGeom prst="rect">
             <a:avLst/>
@@ -9458,39 +9675,140 @@
           <a:lstStyle/>
           <a:p>
             <a:r>
+              <a:rPr lang="en-US" dirty="0" err="1" smtClean="0"/>
+              <a:t>git</a:t>
+            </a:r>
+            <a:r>
               <a:rPr lang="en-US" dirty="0" smtClean="0"/>
-              <a:t>$ </a:t>
+              <a:t> log --</a:t>
             </a:r>
             <a:r>
               <a:rPr lang="en-US" dirty="0" err="1" smtClean="0"/>
-              <a:t>git</a:t>
+              <a:t>oneline</a:t>
+            </a:r>
+            <a:r>
+              <a:rPr lang="en-US" dirty="0"/>
+              <a:t>， </a:t>
             </a:r>
             <a:r>
               <a:rPr lang="en-US" dirty="0" smtClean="0"/>
-              <a:t> fetch origin </a:t>
-            </a:r>
-            <a:endParaRPr lang="zh-CN" altLang="en-US" dirty="0"/>
-          </a:p>
-          <a:p>
-            <a:r>
-              <a:rPr lang="en-US" dirty="0" smtClean="0"/>
-              <a:t>$ </a:t>
-            </a:r>
-            <a:r>
-              <a:rPr lang="en-US" dirty="0" err="1" smtClean="0"/>
-              <a:t>git</a:t>
-            </a:r>
-            <a:r>
-              <a:rPr lang="en-US" dirty="0" smtClean="0"/>
-              <a:t> rebase origin</a:t>
-            </a:r>
-            <a:r>
-              <a:rPr lang="en-US" dirty="0"/>
-              <a:t>/</a:t>
-            </a:r>
-            <a:r>
-              <a:rPr lang="en-US" dirty="0" smtClean="0"/>
-              <a:t>master</a:t>
+              <a:t>只输出主题行</a:t>
+            </a:r>
+            <a:endParaRPr lang="zh-CN" altLang="en-US" dirty="0" smtClean="0"/>
+          </a:p>
+          <a:p>
+            <a:r>
+              <a:rPr lang="en-US" altLang="zh-CN" dirty="0" err="1" smtClean="0"/>
+              <a:t>git</a:t>
+            </a:r>
+            <a:r>
+              <a:rPr lang="en-US" altLang="zh-CN" dirty="0" smtClean="0"/>
+              <a:t> </a:t>
+            </a:r>
+            <a:r>
+              <a:rPr lang="en-US" altLang="zh-CN" dirty="0" err="1" smtClean="0"/>
+              <a:t>shortlog</a:t>
+            </a:r>
+            <a:r>
+              <a:rPr lang="en-US" altLang="zh-CN" dirty="0"/>
+              <a:t>, </a:t>
+            </a:r>
+            <a:r>
+              <a:rPr lang="zh-CN" altLang="en-US" dirty="0"/>
+              <a:t>按照贡献者分组，按行输出主题</a:t>
+            </a:r>
+            <a:endParaRPr lang="en-US" dirty="0"/>
+          </a:p>
+        </p:txBody>
+      </p:sp>
+      <p:sp>
+        <p:nvSpPr>
+          <p:cNvPr id="6" name="TextBox 5"/>
+          <p:cNvSpPr txBox="1"/>
+          <p:nvPr/>
+        </p:nvSpPr>
+        <p:spPr>
+          <a:xfrm>
+            <a:off x="327025" y="2596201"/>
+            <a:ext cx="5387975" cy="1200329"/>
+          </a:xfrm>
+          <a:prstGeom prst="rect">
+            <a:avLst/>
+          </a:prstGeom>
+          <a:noFill/>
+        </p:spPr>
+        <p:txBody>
+          <a:bodyPr wrap="square" rtlCol="0">
+            <a:spAutoFit/>
+          </a:bodyPr>
+          <a:lstStyle/>
+          <a:p>
+            <a:r>
+              <a:rPr lang="zh-TW" altLang="en-US" dirty="0"/>
+              <a:t>小技巧： </a:t>
+            </a:r>
+            <a:endParaRPr lang="zh-CN" altLang="en-US" dirty="0" smtClean="0"/>
+          </a:p>
+          <a:p>
+            <a:r>
+              <a:rPr lang="zh-CN" altLang="en-US" dirty="0"/>
+              <a:t>如果</a:t>
+            </a:r>
+            <a:r>
+              <a:rPr lang="zh-CN" altLang="en-US" dirty="0" smtClean="0"/>
+              <a:t>你发现写</a:t>
+            </a:r>
+            <a:r>
+              <a:rPr lang="en-US" altLang="zh-CN" dirty="0" smtClean="0"/>
+              <a:t>commit</a:t>
+            </a:r>
+            <a:r>
+              <a:rPr lang="zh-CN" altLang="en-US" dirty="0" smtClean="0"/>
+              <a:t>很困难</a:t>
+            </a:r>
+            <a:r>
+              <a:rPr lang="en-US" altLang="zh-CN" dirty="0" smtClean="0"/>
+              <a:t>,</a:t>
+            </a:r>
+            <a:r>
+              <a:rPr lang="zh-CN" altLang="en-US" dirty="0" smtClean="0"/>
+              <a:t>可能</a:t>
+            </a:r>
+            <a:r>
+              <a:rPr lang="zh-CN" altLang="en-US" dirty="0"/>
+              <a:t>是因为你一次 </a:t>
+            </a:r>
+            <a:r>
+              <a:rPr lang="en-US" altLang="zh-CN" dirty="0"/>
+              <a:t>commit </a:t>
+            </a:r>
+            <a:r>
+              <a:rPr lang="zh-CN" altLang="en-US" dirty="0"/>
+              <a:t>太多改动了。尽可能</a:t>
+            </a:r>
+            <a:r>
+              <a:rPr lang="zh-CN" altLang="en-US" dirty="0" smtClean="0"/>
+              <a:t>做到</a:t>
+            </a:r>
+            <a:r>
+              <a:rPr lang="en-US" altLang="zh-CN" dirty="0" smtClean="0"/>
+              <a:t> (</a:t>
+            </a:r>
+            <a:r>
+              <a:rPr lang="zh-CN" altLang="en-US" dirty="0"/>
+              <a:t>每次</a:t>
+            </a:r>
+            <a:r>
+              <a:rPr lang="en-US" altLang="zh-CN" dirty="0"/>
+              <a:t>post</a:t>
+            </a:r>
+            <a:r>
+              <a:rPr lang="zh-CN" altLang="en-US" dirty="0"/>
+              <a:t>一个主题</a:t>
+            </a:r>
+            <a:r>
+              <a:rPr lang="en-US" altLang="zh-CN" dirty="0"/>
+              <a:t>)</a:t>
             </a:r>
             <a:endParaRPr lang="en-US" dirty="0"/>
           </a:p>
@@ -9499,7 +9817,7 @@
     </p:spTree>
     <p:extLst>
       <p:ext uri="{BB962C8B-B14F-4D97-AF65-F5344CB8AC3E}">
-        <p14:creationId xmlns:p14="http://schemas.microsoft.com/office/powerpoint/2010/main" val="199740011"/>
+        <p14:creationId xmlns:p14="http://schemas.microsoft.com/office/powerpoint/2010/main" val="37553475"/>
       </p:ext>
     </p:extLst>
   </p:cSld>
@@ -9594,10 +9912,21 @@
           <a:lstStyle/>
           <a:p>
             <a:r>
-              <a:rPr lang="en-US" b="0" dirty="0" err="1"/>
-              <a:t>合并commit</a:t>
-            </a:r>
-            <a:endParaRPr lang="en-US" b="0" dirty="0"/>
+              <a:rPr lang="zh-CN" altLang="en-US" b="0" dirty="0" smtClean="0">
+                <a:latin typeface="Arial Narrow" charset="0"/>
+                <a:ea typeface="Arial Narrow" charset="0"/>
+                <a:cs typeface="Arial Narrow" charset="0"/>
+              </a:rPr>
+              <a:t>与</a:t>
+            </a:r>
+            <a:r>
+              <a:rPr lang="zh-CN" altLang="en-US" b="0" dirty="0">
+                <a:latin typeface="Arial Narrow" charset="0"/>
+                <a:ea typeface="Arial Narrow" charset="0"/>
+                <a:cs typeface="Arial Narrow" charset="0"/>
+              </a:rPr>
+              <a:t>主干同步</a:t>
+            </a:r>
           </a:p>
         </p:txBody>
       </p:sp>
@@ -9610,7 +9939,7 @@
         <p:spPr>
           <a:xfrm>
             <a:off x="250825" y="1143000"/>
-            <a:ext cx="8207375" cy="369332"/>
+            <a:ext cx="8207375" cy="646331"/>
           </a:xfrm>
           <a:prstGeom prst="rect">
             <a:avLst/>
@@ -9633,19 +9962,22 @@
             </a:r>
             <a:r>
               <a:rPr lang="en-US" dirty="0" smtClean="0"/>
-              <a:t> rebase </a:t>
-            </a:r>
-            <a:r>
-              <a:rPr lang="en-US" dirty="0"/>
-              <a:t>-</a:t>
+              <a:t> fetch origin </a:t>
+            </a:r>
+            <a:endParaRPr lang="zh-CN" altLang="en-US" dirty="0"/>
+          </a:p>
+          <a:p>
+            <a:r>
+              <a:rPr lang="en-US" dirty="0" smtClean="0"/>
+              <a:t>$ </a:t>
             </a:r>
             <a:r>
               <a:rPr lang="en-US" dirty="0" err="1" smtClean="0"/>
-              <a:t>i</a:t>
+              <a:t>git</a:t>
             </a:r>
             <a:r>
               <a:rPr lang="en-US" dirty="0" smtClean="0"/>
-              <a:t> origin</a:t>
+              <a:t> rebase origin</a:t>
             </a:r>
             <a:r>
               <a:rPr lang="en-US" dirty="0"/>
@@ -9654,52 +9986,6 @@
             <a:r>
               <a:rPr lang="en-US" dirty="0" smtClean="0"/>
               <a:t>master</a:t>
-            </a:r>
-            <a:endParaRPr lang="en-US" dirty="0"/>
-          </a:p>
-        </p:txBody>
-      </p:sp>
-      <p:sp>
-        <p:nvSpPr>
-          <p:cNvPr id="2" name="TextBox 1"/>
-          <p:cNvSpPr txBox="1"/>
-          <p:nvPr/>
-        </p:nvSpPr>
-        <p:spPr>
-          <a:xfrm>
-            <a:off x="250825" y="2540079"/>
-            <a:ext cx="6553200" cy="923330"/>
-          </a:xfrm>
-          <a:prstGeom prst="rect">
-            <a:avLst/>
-          </a:prstGeom>
-          <a:noFill/>
-        </p:spPr>
-        <p:txBody>
-          <a:bodyPr wrap="square" rtlCol="0">
-            <a:spAutoFit/>
-          </a:bodyPr>
-          <a:lstStyle/>
-          <a:p>
-            <a:r>
-              <a:rPr lang="zh-CN" altLang="en-US" dirty="0"/>
-              <a:t>分支开发完成后，很可能有一堆</a:t>
-            </a:r>
-            <a:r>
-              <a:rPr lang="en-US" altLang="zh-CN" dirty="0"/>
-              <a:t>commit</a:t>
-            </a:r>
-            <a:r>
-              <a:rPr lang="zh-CN" altLang="en-US" dirty="0"/>
-              <a:t>，但是合并到主干的时候，往往希望只有一个（或最多两三个）</a:t>
-            </a:r>
-            <a:r>
-              <a:rPr lang="en-US" altLang="zh-CN" dirty="0"/>
-              <a:t>commit</a:t>
-            </a:r>
-            <a:r>
-              <a:rPr lang="zh-CN" altLang="en-US" dirty="0"/>
-              <a:t>，这样不仅清晰，也容易管理。</a:t>
             </a:r>
             <a:endParaRPr lang="en-US" dirty="0"/>
           </a:p>
@@ -9708,7 +9994,7 @@
     </p:spTree>
     <p:extLst>
       <p:ext uri="{BB962C8B-B14F-4D97-AF65-F5344CB8AC3E}">
-        <p14:creationId xmlns:p14="http://schemas.microsoft.com/office/powerpoint/2010/main" val="552380089"/>
+        <p14:creationId xmlns:p14="http://schemas.microsoft.com/office/powerpoint/2010/main" val="199740011"/>
       </p:ext>
     </p:extLst>
   </p:cSld>

</xml_diff>